<commit_message>
update the design document and readme file.
</commit_message>
<xml_diff>
--- a/doc/designDoc.pptx
+++ b/doc/designDoc.pptx
@@ -6,6 +6,7 @@
   </p:sldMasterIdLst>
   <p:sldIdLst>
     <p:sldId id="256" r:id="rId2"/>
+    <p:sldId id="257" r:id="rId3"/>
   </p:sldIdLst>
   <p:sldSz cx="12192000" cy="6858000"/>
   <p:notesSz cx="6858000" cy="9144000"/>
@@ -104,6 +105,11 @@
       </a:defRPr>
     </a:lvl9pPr>
   </p:defaultTextStyle>
+  <p:extLst>
+    <p:ext uri="{EFAFB233-063F-42B5-8137-9DF3F51BA10A}">
+      <p15:sldGuideLst xmlns:p15="http://schemas.microsoft.com/office/powerpoint/2012/main"/>
+    </p:ext>
+  </p:extLst>
 </p:presentation>
 </file>
 
@@ -256,7 +262,7 @@
           <a:p>
             <a:fld id="{812C36AB-F3D7-405F-BF47-DB86BB3C67A5}" type="datetimeFigureOut">
               <a:rPr lang="en-SG" smtClean="0"/>
-              <a:t>1/11/2023</a:t>
+              <a:t>3/11/2023</a:t>
             </a:fld>
             <a:endParaRPr lang="en-SG"/>
           </a:p>
@@ -456,7 +462,7 @@
           <a:p>
             <a:fld id="{812C36AB-F3D7-405F-BF47-DB86BB3C67A5}" type="datetimeFigureOut">
               <a:rPr lang="en-SG" smtClean="0"/>
-              <a:t>1/11/2023</a:t>
+              <a:t>3/11/2023</a:t>
             </a:fld>
             <a:endParaRPr lang="en-SG"/>
           </a:p>
@@ -666,7 +672,7 @@
           <a:p>
             <a:fld id="{812C36AB-F3D7-405F-BF47-DB86BB3C67A5}" type="datetimeFigureOut">
               <a:rPr lang="en-SG" smtClean="0"/>
-              <a:t>1/11/2023</a:t>
+              <a:t>3/11/2023</a:t>
             </a:fld>
             <a:endParaRPr lang="en-SG"/>
           </a:p>
@@ -866,7 +872,7 @@
           <a:p>
             <a:fld id="{812C36AB-F3D7-405F-BF47-DB86BB3C67A5}" type="datetimeFigureOut">
               <a:rPr lang="en-SG" smtClean="0"/>
-              <a:t>1/11/2023</a:t>
+              <a:t>3/11/2023</a:t>
             </a:fld>
             <a:endParaRPr lang="en-SG"/>
           </a:p>
@@ -1142,7 +1148,7 @@
           <a:p>
             <a:fld id="{812C36AB-F3D7-405F-BF47-DB86BB3C67A5}" type="datetimeFigureOut">
               <a:rPr lang="en-SG" smtClean="0"/>
-              <a:t>1/11/2023</a:t>
+              <a:t>3/11/2023</a:t>
             </a:fld>
             <a:endParaRPr lang="en-SG"/>
           </a:p>
@@ -1410,7 +1416,7 @@
           <a:p>
             <a:fld id="{812C36AB-F3D7-405F-BF47-DB86BB3C67A5}" type="datetimeFigureOut">
               <a:rPr lang="en-SG" smtClean="0"/>
-              <a:t>1/11/2023</a:t>
+              <a:t>3/11/2023</a:t>
             </a:fld>
             <a:endParaRPr lang="en-SG"/>
           </a:p>
@@ -1825,7 +1831,7 @@
           <a:p>
             <a:fld id="{812C36AB-F3D7-405F-BF47-DB86BB3C67A5}" type="datetimeFigureOut">
               <a:rPr lang="en-SG" smtClean="0"/>
-              <a:t>1/11/2023</a:t>
+              <a:t>3/11/2023</a:t>
             </a:fld>
             <a:endParaRPr lang="en-SG"/>
           </a:p>
@@ -1967,7 +1973,7 @@
           <a:p>
             <a:fld id="{812C36AB-F3D7-405F-BF47-DB86BB3C67A5}" type="datetimeFigureOut">
               <a:rPr lang="en-SG" smtClean="0"/>
-              <a:t>1/11/2023</a:t>
+              <a:t>3/11/2023</a:t>
             </a:fld>
             <a:endParaRPr lang="en-SG"/>
           </a:p>
@@ -2080,7 +2086,7 @@
           <a:p>
             <a:fld id="{812C36AB-F3D7-405F-BF47-DB86BB3C67A5}" type="datetimeFigureOut">
               <a:rPr lang="en-SG" smtClean="0"/>
-              <a:t>1/11/2023</a:t>
+              <a:t>3/11/2023</a:t>
             </a:fld>
             <a:endParaRPr lang="en-SG"/>
           </a:p>
@@ -2393,7 +2399,7 @@
           <a:p>
             <a:fld id="{812C36AB-F3D7-405F-BF47-DB86BB3C67A5}" type="datetimeFigureOut">
               <a:rPr lang="en-SG" smtClean="0"/>
-              <a:t>1/11/2023</a:t>
+              <a:t>3/11/2023</a:t>
             </a:fld>
             <a:endParaRPr lang="en-SG"/>
           </a:p>
@@ -2682,7 +2688,7 @@
           <a:p>
             <a:fld id="{812C36AB-F3D7-405F-BF47-DB86BB3C67A5}" type="datetimeFigureOut">
               <a:rPr lang="en-SG" smtClean="0"/>
-              <a:t>1/11/2023</a:t>
+              <a:t>3/11/2023</a:t>
             </a:fld>
             <a:endParaRPr lang="en-SG"/>
           </a:p>
@@ -2925,7 +2931,7 @@
           <a:p>
             <a:fld id="{812C36AB-F3D7-405F-BF47-DB86BB3C67A5}" type="datetimeFigureOut">
               <a:rPr lang="en-SG" smtClean="0"/>
-              <a:t>1/11/2023</a:t>
+              <a:t>3/11/2023</a:t>
             </a:fld>
             <a:endParaRPr lang="en-SG"/>
           </a:p>
@@ -3724,6 +3730,36 @@
 </p:sld>
 </file>
 
+<file path=ppt/slides/slide2.xml><?xml version="1.0" encoding="utf-8"?>
+<p:sld xmlns:a="http://schemas.openxmlformats.org/drawingml/2006/main" xmlns:r="http://schemas.openxmlformats.org/officeDocument/2006/relationships" xmlns:p="http://schemas.openxmlformats.org/presentationml/2006/main">
+  <p:cSld>
+    <p:spTree>
+      <p:nvGrpSpPr>
+        <p:cNvPr id="1" name=""/>
+        <p:cNvGrpSpPr/>
+        <p:nvPr/>
+      </p:nvGrpSpPr>
+      <p:grpSpPr>
+        <a:xfrm>
+          <a:off x="0" y="0"/>
+          <a:ext cx="0" cy="0"/>
+          <a:chOff x="0" y="0"/>
+          <a:chExt cx="0" cy="0"/>
+        </a:xfrm>
+      </p:grpSpPr>
+    </p:spTree>
+    <p:extLst>
+      <p:ext uri="{BB962C8B-B14F-4D97-AF65-F5344CB8AC3E}">
+        <p14:creationId xmlns:p14="http://schemas.microsoft.com/office/powerpoint/2010/main" val="3678672705"/>
+      </p:ext>
+    </p:extLst>
+  </p:cSld>
+  <p:clrMapOvr>
+    <a:masterClrMapping/>
+  </p:clrMapOvr>
+</p:sld>
+</file>
+
 <file path=ppt/theme/theme1.xml><?xml version="1.0" encoding="utf-8"?>
 <a:theme xmlns:a="http://schemas.openxmlformats.org/drawingml/2006/main" name="Office Theme">
   <a:themeElements>

</xml_diff>

<commit_message>
Added the communication selection code and update the design document.
</commit_message>
<xml_diff>
--- a/doc/designDoc.pptx
+++ b/doc/designDoc.pptx
@@ -3747,6 +3747,690 @@
           <a:chExt cx="0" cy="0"/>
         </a:xfrm>
       </p:grpSpPr>
+      <p:sp>
+        <p:nvSpPr>
+          <p:cNvPr id="2" name="Rectangle 1">
+            <a:extLst>
+              <a:ext uri="{FF2B5EF4-FFF2-40B4-BE49-F238E27FC236}">
+                <a16:creationId xmlns:a16="http://schemas.microsoft.com/office/drawing/2014/main" id="{C58901D2-8050-D33A-DCC7-271188474879}"/>
+              </a:ext>
+            </a:extLst>
+          </p:cNvPr>
+          <p:cNvSpPr/>
+          <p:nvPr/>
+        </p:nvSpPr>
+        <p:spPr>
+          <a:xfrm>
+            <a:off x="1428257" y="1133167"/>
+            <a:ext cx="1706829" cy="369061"/>
+          </a:xfrm>
+          <a:prstGeom prst="rect">
+            <a:avLst/>
+          </a:prstGeom>
+          <a:solidFill>
+            <a:schemeClr val="accent6">
+              <a:lumMod val="75000"/>
+            </a:schemeClr>
+          </a:solidFill>
+        </p:spPr>
+        <p:style>
+          <a:lnRef idx="2">
+            <a:schemeClr val="accent1">
+              <a:shade val="50000"/>
+            </a:schemeClr>
+          </a:lnRef>
+          <a:fillRef idx="1">
+            <a:schemeClr val="accent1"/>
+          </a:fillRef>
+          <a:effectRef idx="0">
+            <a:schemeClr val="accent1"/>
+          </a:effectRef>
+          <a:fontRef idx="minor">
+            <a:schemeClr val="lt1"/>
+          </a:fontRef>
+        </p:style>
+        <p:txBody>
+          <a:bodyPr rtlCol="0" anchor="ctr"/>
+          <a:lstStyle/>
+          <a:p>
+            <a:r>
+              <a:rPr lang="en-SG" sz="1200" b="1" dirty="0"/>
+              <a:t>Braccio Controller start </a:t>
+            </a:r>
+          </a:p>
+        </p:txBody>
+      </p:sp>
+      <p:sp>
+        <p:nvSpPr>
+          <p:cNvPr id="3" name="Rectangle 2">
+            <a:extLst>
+              <a:ext uri="{FF2B5EF4-FFF2-40B4-BE49-F238E27FC236}">
+                <a16:creationId xmlns:a16="http://schemas.microsoft.com/office/drawing/2014/main" id="{196804F9-56AE-C70C-4AF5-817F31DCB64A}"/>
+              </a:ext>
+            </a:extLst>
+          </p:cNvPr>
+          <p:cNvSpPr/>
+          <p:nvPr/>
+        </p:nvSpPr>
+        <p:spPr>
+          <a:xfrm>
+            <a:off x="1428258" y="1938710"/>
+            <a:ext cx="1129886" cy="369061"/>
+          </a:xfrm>
+          <a:prstGeom prst="rect">
+            <a:avLst/>
+          </a:prstGeom>
+          <a:solidFill>
+            <a:schemeClr val="accent6">
+              <a:lumMod val="75000"/>
+            </a:schemeClr>
+          </a:solidFill>
+        </p:spPr>
+        <p:style>
+          <a:lnRef idx="2">
+            <a:schemeClr val="accent1">
+              <a:shade val="50000"/>
+            </a:schemeClr>
+          </a:lnRef>
+          <a:fillRef idx="1">
+            <a:schemeClr val="accent1"/>
+          </a:fillRef>
+          <a:effectRef idx="0">
+            <a:schemeClr val="accent1"/>
+          </a:effectRef>
+          <a:fontRef idx="minor">
+            <a:schemeClr val="lt1"/>
+          </a:fontRef>
+        </p:style>
+        <p:txBody>
+          <a:bodyPr rtlCol="0" anchor="ctr"/>
+          <a:lstStyle/>
+          <a:p>
+            <a:r>
+              <a:rPr lang="en-SG" sz="1200" b="1" dirty="0"/>
+              <a:t>User interface </a:t>
+            </a:r>
+          </a:p>
+        </p:txBody>
+      </p:sp>
+      <p:cxnSp>
+        <p:nvCxnSpPr>
+          <p:cNvPr id="4" name="Straight Arrow Connector 3">
+            <a:extLst>
+              <a:ext uri="{FF2B5EF4-FFF2-40B4-BE49-F238E27FC236}">
+                <a16:creationId xmlns:a16="http://schemas.microsoft.com/office/drawing/2014/main" id="{40DDE467-99C0-24C7-8B21-DF0D159B8E13}"/>
+              </a:ext>
+            </a:extLst>
+          </p:cNvPr>
+          <p:cNvCxnSpPr>
+            <a:cxnSpLocks/>
+          </p:cNvCxnSpPr>
+          <p:nvPr/>
+        </p:nvCxnSpPr>
+        <p:spPr>
+          <a:xfrm>
+            <a:off x="1765962" y="1500013"/>
+            <a:ext cx="0" cy="438697"/>
+          </a:xfrm>
+          <a:prstGeom prst="straightConnector1">
+            <a:avLst/>
+          </a:prstGeom>
+          <a:ln>
+            <a:solidFill>
+              <a:schemeClr val="accent6">
+                <a:lumMod val="50000"/>
+              </a:schemeClr>
+            </a:solidFill>
+            <a:tailEnd type="triangle"/>
+          </a:ln>
+        </p:spPr>
+        <p:style>
+          <a:lnRef idx="1">
+            <a:schemeClr val="accent1"/>
+          </a:lnRef>
+          <a:fillRef idx="0">
+            <a:schemeClr val="accent1"/>
+          </a:fillRef>
+          <a:effectRef idx="0">
+            <a:schemeClr val="accent1"/>
+          </a:effectRef>
+          <a:fontRef idx="minor">
+            <a:schemeClr val="tx1"/>
+          </a:fontRef>
+        </p:style>
+      </p:cxnSp>
+      <p:sp>
+        <p:nvSpPr>
+          <p:cNvPr id="5" name="TextBox 4">
+            <a:extLst>
+              <a:ext uri="{FF2B5EF4-FFF2-40B4-BE49-F238E27FC236}">
+                <a16:creationId xmlns:a16="http://schemas.microsoft.com/office/drawing/2014/main" id="{8E5C6B8F-84BC-1EEB-E277-61FBE360C8BF}"/>
+              </a:ext>
+            </a:extLst>
+          </p:cNvPr>
+          <p:cNvSpPr txBox="1"/>
+          <p:nvPr/>
+        </p:nvSpPr>
+        <p:spPr>
+          <a:xfrm>
+            <a:off x="1765962" y="1592075"/>
+            <a:ext cx="1023748" cy="276999"/>
+          </a:xfrm>
+          <a:prstGeom prst="rect">
+            <a:avLst/>
+          </a:prstGeom>
+          <a:noFill/>
+        </p:spPr>
+        <p:txBody>
+          <a:bodyPr wrap="square" rtlCol="0">
+            <a:spAutoFit/>
+          </a:bodyPr>
+          <a:lstStyle/>
+          <a:p>
+            <a:r>
+              <a:rPr lang="en-SG" sz="1200" b="1" dirty="0">
+                <a:solidFill>
+                  <a:schemeClr val="accent6">
+                    <a:lumMod val="75000"/>
+                  </a:schemeClr>
+                </a:solidFill>
+              </a:rPr>
+              <a:t>Main thread</a:t>
+            </a:r>
+          </a:p>
+        </p:txBody>
+      </p:sp>
+      <p:cxnSp>
+        <p:nvCxnSpPr>
+          <p:cNvPr id="7" name="Straight Arrow Connector 6">
+            <a:extLst>
+              <a:ext uri="{FF2B5EF4-FFF2-40B4-BE49-F238E27FC236}">
+                <a16:creationId xmlns:a16="http://schemas.microsoft.com/office/drawing/2014/main" id="{40F94D72-1A91-CCF1-863C-D8CDB0A0C7A9}"/>
+              </a:ext>
+            </a:extLst>
+          </p:cNvPr>
+          <p:cNvCxnSpPr>
+            <a:cxnSpLocks/>
+          </p:cNvCxnSpPr>
+          <p:nvPr/>
+        </p:nvCxnSpPr>
+        <p:spPr>
+          <a:xfrm>
+            <a:off x="2919848" y="1511225"/>
+            <a:ext cx="0" cy="992489"/>
+          </a:xfrm>
+          <a:prstGeom prst="straightConnector1">
+            <a:avLst/>
+          </a:prstGeom>
+          <a:ln>
+            <a:solidFill>
+              <a:schemeClr val="accent6">
+                <a:lumMod val="50000"/>
+              </a:schemeClr>
+            </a:solidFill>
+            <a:tailEnd type="triangle"/>
+          </a:ln>
+        </p:spPr>
+        <p:style>
+          <a:lnRef idx="1">
+            <a:schemeClr val="accent1"/>
+          </a:lnRef>
+          <a:fillRef idx="0">
+            <a:schemeClr val="accent1"/>
+          </a:fillRef>
+          <a:effectRef idx="0">
+            <a:schemeClr val="accent1"/>
+          </a:effectRef>
+          <a:fontRef idx="minor">
+            <a:schemeClr val="tx1"/>
+          </a:fontRef>
+        </p:style>
+      </p:cxnSp>
+      <p:sp>
+        <p:nvSpPr>
+          <p:cNvPr id="9" name="TextBox 8">
+            <a:extLst>
+              <a:ext uri="{FF2B5EF4-FFF2-40B4-BE49-F238E27FC236}">
+                <a16:creationId xmlns:a16="http://schemas.microsoft.com/office/drawing/2014/main" id="{6585C793-C491-B44E-A8E2-1354913DE05D}"/>
+              </a:ext>
+            </a:extLst>
+          </p:cNvPr>
+          <p:cNvSpPr txBox="1"/>
+          <p:nvPr/>
+        </p:nvSpPr>
+        <p:spPr>
+          <a:xfrm>
+            <a:off x="2895848" y="1592075"/>
+            <a:ext cx="1565067" cy="461665"/>
+          </a:xfrm>
+          <a:prstGeom prst="rect">
+            <a:avLst/>
+          </a:prstGeom>
+          <a:noFill/>
+        </p:spPr>
+        <p:txBody>
+          <a:bodyPr wrap="square" rtlCol="0">
+            <a:spAutoFit/>
+          </a:bodyPr>
+          <a:lstStyle/>
+          <a:p>
+            <a:r>
+              <a:rPr lang="en-SG" sz="1200" b="1" dirty="0">
+                <a:solidFill>
+                  <a:schemeClr val="accent6">
+                    <a:lumMod val="75000"/>
+                  </a:schemeClr>
+                </a:solidFill>
+              </a:rPr>
+              <a:t>Communication thread </a:t>
+            </a:r>
+          </a:p>
+        </p:txBody>
+      </p:sp>
+      <p:sp>
+        <p:nvSpPr>
+          <p:cNvPr id="10" name="Rectangle 9">
+            <a:extLst>
+              <a:ext uri="{FF2B5EF4-FFF2-40B4-BE49-F238E27FC236}">
+                <a16:creationId xmlns:a16="http://schemas.microsoft.com/office/drawing/2014/main" id="{9D646F2C-F43F-46D5-6FDB-5C20CEB8ED45}"/>
+              </a:ext>
+            </a:extLst>
+          </p:cNvPr>
+          <p:cNvSpPr/>
+          <p:nvPr/>
+        </p:nvSpPr>
+        <p:spPr>
+          <a:xfrm>
+            <a:off x="2789710" y="2503714"/>
+            <a:ext cx="1259776" cy="369061"/>
+          </a:xfrm>
+          <a:prstGeom prst="rect">
+            <a:avLst/>
+          </a:prstGeom>
+          <a:solidFill>
+            <a:schemeClr val="accent6">
+              <a:lumMod val="75000"/>
+            </a:schemeClr>
+          </a:solidFill>
+        </p:spPr>
+        <p:style>
+          <a:lnRef idx="2">
+            <a:schemeClr val="accent1">
+              <a:shade val="50000"/>
+            </a:schemeClr>
+          </a:lnRef>
+          <a:fillRef idx="1">
+            <a:schemeClr val="accent1"/>
+          </a:fillRef>
+          <a:effectRef idx="0">
+            <a:schemeClr val="accent1"/>
+          </a:effectRef>
+          <a:fontRef idx="minor">
+            <a:schemeClr val="lt1"/>
+          </a:fontRef>
+        </p:style>
+        <p:txBody>
+          <a:bodyPr rtlCol="0" anchor="ctr"/>
+          <a:lstStyle/>
+          <a:p>
+            <a:r>
+              <a:rPr lang="en-SG" sz="1200" b="1" dirty="0"/>
+              <a:t>Comm manager </a:t>
+            </a:r>
+          </a:p>
+        </p:txBody>
+      </p:sp>
+      <p:cxnSp>
+        <p:nvCxnSpPr>
+          <p:cNvPr id="11" name="Connector: Elbow 10">
+            <a:extLst>
+              <a:ext uri="{FF2B5EF4-FFF2-40B4-BE49-F238E27FC236}">
+                <a16:creationId xmlns:a16="http://schemas.microsoft.com/office/drawing/2014/main" id="{1775CCD7-1467-DEBE-9B63-59A21A52D924}"/>
+              </a:ext>
+            </a:extLst>
+          </p:cNvPr>
+          <p:cNvCxnSpPr>
+            <a:cxnSpLocks/>
+            <a:stCxn id="14" idx="3"/>
+            <a:endCxn id="10" idx="2"/>
+          </p:cNvCxnSpPr>
+          <p:nvPr/>
+        </p:nvCxnSpPr>
+        <p:spPr>
+          <a:xfrm flipV="1">
+            <a:off x="2891764" y="2872775"/>
+            <a:ext cx="527834" cy="354515"/>
+          </a:xfrm>
+          <a:prstGeom prst="bentConnector2">
+            <a:avLst/>
+          </a:prstGeom>
+          <a:ln w="19050">
+            <a:solidFill>
+              <a:schemeClr val="accent6">
+                <a:lumMod val="75000"/>
+              </a:schemeClr>
+            </a:solidFill>
+            <a:prstDash val="sysDash"/>
+            <a:tailEnd type="triangle"/>
+          </a:ln>
+        </p:spPr>
+        <p:style>
+          <a:lnRef idx="1">
+            <a:schemeClr val="dk1"/>
+          </a:lnRef>
+          <a:fillRef idx="0">
+            <a:schemeClr val="dk1"/>
+          </a:fillRef>
+          <a:effectRef idx="0">
+            <a:schemeClr val="dk1"/>
+          </a:effectRef>
+          <a:fontRef idx="minor">
+            <a:schemeClr val="tx1"/>
+          </a:fontRef>
+        </p:style>
+      </p:cxnSp>
+      <p:sp>
+        <p:nvSpPr>
+          <p:cNvPr id="14" name="Rectangle 13">
+            <a:extLst>
+              <a:ext uri="{FF2B5EF4-FFF2-40B4-BE49-F238E27FC236}">
+                <a16:creationId xmlns:a16="http://schemas.microsoft.com/office/drawing/2014/main" id="{AFC630D3-CB45-C903-A3E9-4686F86D9618}"/>
+              </a:ext>
+            </a:extLst>
+          </p:cNvPr>
+          <p:cNvSpPr/>
+          <p:nvPr/>
+        </p:nvSpPr>
+        <p:spPr>
+          <a:xfrm>
+            <a:off x="1663907" y="3004659"/>
+            <a:ext cx="1227857" cy="445262"/>
+          </a:xfrm>
+          <a:prstGeom prst="rect">
+            <a:avLst/>
+          </a:prstGeom>
+          <a:solidFill>
+            <a:schemeClr val="accent6">
+              <a:lumMod val="75000"/>
+            </a:schemeClr>
+          </a:solidFill>
+        </p:spPr>
+        <p:style>
+          <a:lnRef idx="2">
+            <a:schemeClr val="accent1">
+              <a:shade val="50000"/>
+            </a:schemeClr>
+          </a:lnRef>
+          <a:fillRef idx="1">
+            <a:schemeClr val="accent1"/>
+          </a:fillRef>
+          <a:effectRef idx="0">
+            <a:schemeClr val="accent1"/>
+          </a:effectRef>
+          <a:fontRef idx="minor">
+            <a:schemeClr val="lt1"/>
+          </a:fontRef>
+        </p:style>
+        <p:txBody>
+          <a:bodyPr rtlCol="0" anchor="ctr"/>
+          <a:lstStyle/>
+          <a:p>
+            <a:r>
+              <a:rPr lang="en-SG" sz="1200" b="1" dirty="0"/>
+              <a:t>User action handler </a:t>
+            </a:r>
+          </a:p>
+        </p:txBody>
+      </p:sp>
+      <p:cxnSp>
+        <p:nvCxnSpPr>
+          <p:cNvPr id="15" name="Straight Arrow Connector 14">
+            <a:extLst>
+              <a:ext uri="{FF2B5EF4-FFF2-40B4-BE49-F238E27FC236}">
+                <a16:creationId xmlns:a16="http://schemas.microsoft.com/office/drawing/2014/main" id="{5644961B-A16E-D2C2-1A93-E36ABCF85C56}"/>
+              </a:ext>
+            </a:extLst>
+          </p:cNvPr>
+          <p:cNvCxnSpPr>
+            <a:cxnSpLocks/>
+          </p:cNvCxnSpPr>
+          <p:nvPr/>
+        </p:nvCxnSpPr>
+        <p:spPr>
+          <a:xfrm>
+            <a:off x="1993201" y="2305286"/>
+            <a:ext cx="0" cy="699373"/>
+          </a:xfrm>
+          <a:prstGeom prst="straightConnector1">
+            <a:avLst/>
+          </a:prstGeom>
+          <a:ln>
+            <a:solidFill>
+              <a:schemeClr val="accent6">
+                <a:lumMod val="50000"/>
+              </a:schemeClr>
+            </a:solidFill>
+            <a:tailEnd type="triangle"/>
+          </a:ln>
+        </p:spPr>
+        <p:style>
+          <a:lnRef idx="1">
+            <a:schemeClr val="accent1"/>
+          </a:lnRef>
+          <a:fillRef idx="0">
+            <a:schemeClr val="accent1"/>
+          </a:fillRef>
+          <a:effectRef idx="0">
+            <a:schemeClr val="accent1"/>
+          </a:effectRef>
+          <a:fontRef idx="minor">
+            <a:schemeClr val="tx1"/>
+          </a:fontRef>
+        </p:style>
+      </p:cxnSp>
+      <p:sp>
+        <p:nvSpPr>
+          <p:cNvPr id="19" name="TextBox 18">
+            <a:extLst>
+              <a:ext uri="{FF2B5EF4-FFF2-40B4-BE49-F238E27FC236}">
+                <a16:creationId xmlns:a16="http://schemas.microsoft.com/office/drawing/2014/main" id="{CC64ECC3-53D8-88D7-5E0D-74133BC23D49}"/>
+              </a:ext>
+            </a:extLst>
+          </p:cNvPr>
+          <p:cNvSpPr txBox="1"/>
+          <p:nvPr/>
+        </p:nvSpPr>
+        <p:spPr>
+          <a:xfrm>
+            <a:off x="4770041" y="3311651"/>
+            <a:ext cx="2381495" cy="646331"/>
+          </a:xfrm>
+          <a:prstGeom prst="rect">
+            <a:avLst/>
+          </a:prstGeom>
+          <a:noFill/>
+        </p:spPr>
+        <p:txBody>
+          <a:bodyPr wrap="square" rtlCol="0">
+            <a:spAutoFit/>
+          </a:bodyPr>
+          <a:lstStyle/>
+          <a:p>
+            <a:pPr marL="228600" indent="-228600">
+              <a:buAutoNum type="arabicPeriod"/>
+            </a:pPr>
+            <a:r>
+              <a:rPr lang="en-SG" sz="1200" b="1" dirty="0"/>
+              <a:t>Selection communication type</a:t>
+            </a:r>
+          </a:p>
+          <a:p>
+            <a:pPr marL="228600" indent="-228600">
+              <a:buAutoNum type="arabicPeriod"/>
+            </a:pPr>
+            <a:r>
+              <a:rPr lang="en-SG" sz="1200" b="1" dirty="0"/>
+              <a:t>Change motor axis/angle</a:t>
+            </a:r>
+          </a:p>
+          <a:p>
+            <a:pPr marL="228600" indent="-228600">
+              <a:buAutoNum type="arabicPeriod"/>
+            </a:pPr>
+            <a:r>
+              <a:rPr lang="en-SG" sz="1200" b="1" dirty="0"/>
+              <a:t>Load arm action play book </a:t>
+            </a:r>
+          </a:p>
+        </p:txBody>
+      </p:sp>
+      <p:sp>
+        <p:nvSpPr>
+          <p:cNvPr id="20" name="Rectangle 19">
+            <a:extLst>
+              <a:ext uri="{FF2B5EF4-FFF2-40B4-BE49-F238E27FC236}">
+                <a16:creationId xmlns:a16="http://schemas.microsoft.com/office/drawing/2014/main" id="{9DD66738-8ED3-6062-9E2E-C6FFCAC5C8EA}"/>
+              </a:ext>
+            </a:extLst>
+          </p:cNvPr>
+          <p:cNvSpPr/>
+          <p:nvPr/>
+        </p:nvSpPr>
+        <p:spPr>
+          <a:xfrm>
+            <a:off x="1428256" y="3944490"/>
+            <a:ext cx="1227857" cy="445262"/>
+          </a:xfrm>
+          <a:prstGeom prst="rect">
+            <a:avLst/>
+          </a:prstGeom>
+          <a:solidFill>
+            <a:schemeClr val="accent6">
+              <a:lumMod val="75000"/>
+            </a:schemeClr>
+          </a:solidFill>
+        </p:spPr>
+        <p:style>
+          <a:lnRef idx="2">
+            <a:schemeClr val="accent1">
+              <a:shade val="50000"/>
+            </a:schemeClr>
+          </a:lnRef>
+          <a:fillRef idx="1">
+            <a:schemeClr val="accent1"/>
+          </a:fillRef>
+          <a:effectRef idx="0">
+            <a:schemeClr val="accent1"/>
+          </a:effectRef>
+          <a:fontRef idx="minor">
+            <a:schemeClr val="lt1"/>
+          </a:fontRef>
+        </p:style>
+        <p:txBody>
+          <a:bodyPr rtlCol="0" anchor="ctr"/>
+          <a:lstStyle/>
+          <a:p>
+            <a:r>
+              <a:rPr lang="en-SG" sz="1200" b="1" dirty="0"/>
+              <a:t>potentiometer display panel </a:t>
+            </a:r>
+          </a:p>
+        </p:txBody>
+      </p:sp>
+      <p:cxnSp>
+        <p:nvCxnSpPr>
+          <p:cNvPr id="22" name="Straight Arrow Connector 21">
+            <a:extLst>
+              <a:ext uri="{FF2B5EF4-FFF2-40B4-BE49-F238E27FC236}">
+                <a16:creationId xmlns:a16="http://schemas.microsoft.com/office/drawing/2014/main" id="{AC7AF82A-8C15-392C-B0B4-09F26A36B0C0}"/>
+              </a:ext>
+            </a:extLst>
+          </p:cNvPr>
+          <p:cNvCxnSpPr>
+            <a:cxnSpLocks/>
+          </p:cNvCxnSpPr>
+          <p:nvPr/>
+        </p:nvCxnSpPr>
+        <p:spPr>
+          <a:xfrm>
+            <a:off x="1536001" y="2305286"/>
+            <a:ext cx="0" cy="1639204"/>
+          </a:xfrm>
+          <a:prstGeom prst="straightConnector1">
+            <a:avLst/>
+          </a:prstGeom>
+          <a:ln>
+            <a:solidFill>
+              <a:schemeClr val="accent6">
+                <a:lumMod val="50000"/>
+              </a:schemeClr>
+            </a:solidFill>
+            <a:tailEnd type="triangle"/>
+          </a:ln>
+        </p:spPr>
+        <p:style>
+          <a:lnRef idx="1">
+            <a:schemeClr val="accent1"/>
+          </a:lnRef>
+          <a:fillRef idx="0">
+            <a:schemeClr val="accent1"/>
+          </a:fillRef>
+          <a:effectRef idx="0">
+            <a:schemeClr val="accent1"/>
+          </a:effectRef>
+          <a:fontRef idx="minor">
+            <a:schemeClr val="tx1"/>
+          </a:fontRef>
+        </p:style>
+      </p:cxnSp>
+      <p:cxnSp>
+        <p:nvCxnSpPr>
+          <p:cNvPr id="24" name="Connector: Elbow 23">
+            <a:extLst>
+              <a:ext uri="{FF2B5EF4-FFF2-40B4-BE49-F238E27FC236}">
+                <a16:creationId xmlns:a16="http://schemas.microsoft.com/office/drawing/2014/main" id="{E427A5A5-7306-0E0F-D72C-E1454D936AF5}"/>
+              </a:ext>
+            </a:extLst>
+          </p:cNvPr>
+          <p:cNvCxnSpPr>
+            <a:cxnSpLocks/>
+            <a:endCxn id="20" idx="3"/>
+          </p:cNvCxnSpPr>
+          <p:nvPr/>
+        </p:nvCxnSpPr>
+        <p:spPr>
+          <a:xfrm rot="5400000">
+            <a:off x="2520075" y="3008814"/>
+            <a:ext cx="1294345" cy="1022268"/>
+          </a:xfrm>
+          <a:prstGeom prst="bentConnector2">
+            <a:avLst/>
+          </a:prstGeom>
+          <a:ln w="19050">
+            <a:solidFill>
+              <a:schemeClr val="accent6">
+                <a:lumMod val="75000"/>
+              </a:schemeClr>
+            </a:solidFill>
+            <a:prstDash val="sysDash"/>
+            <a:tailEnd type="triangle"/>
+          </a:ln>
+        </p:spPr>
+        <p:style>
+          <a:lnRef idx="1">
+            <a:schemeClr val="dk1"/>
+          </a:lnRef>
+          <a:fillRef idx="0">
+            <a:schemeClr val="dk1"/>
+          </a:fillRef>
+          <a:effectRef idx="0">
+            <a:schemeClr val="dk1"/>
+          </a:effectRef>
+          <a:fontRef idx="minor">
+            <a:schemeClr val="tx1"/>
+          </a:fontRef>
+        </p:style>
+      </p:cxnSp>
     </p:spTree>
     <p:extLst>
       <p:ext uri="{BB962C8B-B14F-4D97-AF65-F5344CB8AC3E}">

</xml_diff>

<commit_message>
update the design document.
</commit_message>
<xml_diff>
--- a/doc/designDoc.pptx
+++ b/doc/designDoc.pptx
@@ -3761,8 +3761,8 @@
         </p:nvSpPr>
         <p:spPr>
           <a:xfrm>
-            <a:off x="1428257" y="1133167"/>
-            <a:ext cx="1706829" cy="369061"/>
+            <a:off x="1428257" y="1209368"/>
+            <a:ext cx="1706829" cy="292860"/>
           </a:xfrm>
           <a:prstGeom prst="rect">
             <a:avLst/>
@@ -4041,8 +4041,8 @@
         </p:nvSpPr>
         <p:spPr>
           <a:xfrm>
-            <a:off x="2789710" y="2503714"/>
-            <a:ext cx="1259776" cy="369061"/>
+            <a:off x="2656113" y="2503714"/>
+            <a:ext cx="1393373" cy="369061"/>
           </a:xfrm>
           <a:prstGeom prst="rect">
             <a:avLst/>
@@ -4075,7 +4075,7 @@
           <a:p>
             <a:r>
               <a:rPr lang="en-SG" sz="1200" b="1" dirty="0"/>
-              <a:t>Comm manager </a:t>
+              <a:t>Request manager </a:t>
             </a:r>
           </a:p>
         </p:txBody>
@@ -4092,14 +4092,14 @@
           <p:cNvCxnSpPr>
             <a:cxnSpLocks/>
             <a:stCxn id="14" idx="3"/>
-            <a:endCxn id="10" idx="2"/>
+            <a:endCxn id="106" idx="2"/>
           </p:cNvCxnSpPr>
           <p:nvPr/>
         </p:nvCxnSpPr>
         <p:spPr>
           <a:xfrm flipV="1">
-            <a:off x="2891764" y="2872775"/>
-            <a:ext cx="527834" cy="354515"/>
+            <a:off x="2773621" y="3800031"/>
+            <a:ext cx="910744" cy="777522"/>
           </a:xfrm>
           <a:prstGeom prst="bentConnector2">
             <a:avLst/>
@@ -4143,8 +4143,8 @@
         </p:nvSpPr>
         <p:spPr>
           <a:xfrm>
-            <a:off x="1663907" y="3004659"/>
-            <a:ext cx="1227857" cy="445262"/>
+            <a:off x="1380418" y="4404932"/>
+            <a:ext cx="1393203" cy="345242"/>
           </a:xfrm>
           <a:prstGeom prst="rect">
             <a:avLst/>
@@ -4176,7 +4176,7 @@
           <a:lstStyle/>
           <a:p>
             <a:r>
-              <a:rPr lang="en-SG" sz="1200" b="1" dirty="0"/>
+              <a:rPr lang="en-SG" sz="1100" b="1" dirty="0"/>
               <a:t>User action handler </a:t>
             </a:r>
           </a:p>
@@ -4199,7 +4199,7 @@
         <p:spPr>
           <a:xfrm>
             <a:off x="1993201" y="2305286"/>
-            <a:ext cx="0" cy="699373"/>
+            <a:ext cx="0" cy="930322"/>
           </a:xfrm>
           <a:prstGeom prst="straightConnector1">
             <a:avLst/>
@@ -4242,8 +4242,8 @@
         </p:nvSpPr>
         <p:spPr>
           <a:xfrm>
-            <a:off x="4770041" y="3311651"/>
-            <a:ext cx="2381495" cy="646331"/>
+            <a:off x="1336874" y="4771508"/>
+            <a:ext cx="2381495" cy="600164"/>
           </a:xfrm>
           <a:prstGeom prst="rect">
             <a:avLst/>
@@ -4260,7 +4260,7 @@
               <a:buAutoNum type="arabicPeriod"/>
             </a:pPr>
             <a:r>
-              <a:rPr lang="en-SG" sz="1200" b="1" dirty="0"/>
+              <a:rPr lang="en-SG" sz="1100" dirty="0"/>
               <a:t>Selection communication type</a:t>
             </a:r>
           </a:p>
@@ -4269,7 +4269,7 @@
               <a:buAutoNum type="arabicPeriod"/>
             </a:pPr>
             <a:r>
-              <a:rPr lang="en-SG" sz="1200" b="1" dirty="0"/>
+              <a:rPr lang="en-SG" sz="1100" dirty="0"/>
               <a:t>Change motor axis/angle</a:t>
             </a:r>
           </a:p>
@@ -4278,7 +4278,7 @@
               <a:buAutoNum type="arabicPeriod"/>
             </a:pPr>
             <a:r>
-              <a:rPr lang="en-SG" sz="1200" b="1" dirty="0"/>
+              <a:rPr lang="en-SG" sz="1100" dirty="0"/>
               <a:t>Load arm action play book </a:t>
             </a:r>
           </a:p>
@@ -4298,7 +4298,7 @@
         </p:nvSpPr>
         <p:spPr>
           <a:xfrm>
-            <a:off x="1428256" y="3944490"/>
+            <a:off x="1645796" y="3235608"/>
             <a:ext cx="1227857" cy="445262"/>
           </a:xfrm>
           <a:prstGeom prst="rect">
@@ -4332,7 +4332,7 @@
           <a:p>
             <a:r>
               <a:rPr lang="en-SG" sz="1200" b="1" dirty="0"/>
-              <a:t>potentiometer display panel </a:t>
+              <a:t>Potentiometer display panel </a:t>
             </a:r>
           </a:p>
         </p:txBody>
@@ -4353,8 +4353,8 @@
         </p:nvCxnSpPr>
         <p:spPr>
           <a:xfrm>
-            <a:off x="1536001" y="2305286"/>
-            <a:ext cx="0" cy="1639204"/>
+            <a:off x="1508569" y="2305286"/>
+            <a:ext cx="0" cy="2099646"/>
           </a:xfrm>
           <a:prstGeom prst="straightConnector1">
             <a:avLst/>
@@ -4394,14 +4394,15 @@
           </p:cNvPr>
           <p:cNvCxnSpPr>
             <a:cxnSpLocks/>
-            <a:endCxn id="20" idx="3"/>
+            <a:stCxn id="10" idx="1"/>
+            <a:endCxn id="20" idx="0"/>
           </p:cNvCxnSpPr>
           <p:nvPr/>
         </p:nvCxnSpPr>
         <p:spPr>
-          <a:xfrm rot="5400000">
-            <a:off x="2520075" y="3008814"/>
-            <a:ext cx="1294345" cy="1022268"/>
+          <a:xfrm rot="10800000" flipV="1">
+            <a:off x="2259725" y="2688244"/>
+            <a:ext cx="396388" cy="547363"/>
           </a:xfrm>
           <a:prstGeom prst="bentConnector2">
             <a:avLst/>
@@ -4431,6 +4432,2070 @@
           </a:fontRef>
         </p:style>
       </p:cxnSp>
+      <p:sp>
+        <p:nvSpPr>
+          <p:cNvPr id="6" name="Rectangle 5">
+            <a:extLst>
+              <a:ext uri="{FF2B5EF4-FFF2-40B4-BE49-F238E27FC236}">
+                <a16:creationId xmlns:a16="http://schemas.microsoft.com/office/drawing/2014/main" id="{E57C79E7-CD32-6916-3DD6-21186960C9C9}"/>
+              </a:ext>
+            </a:extLst>
+          </p:cNvPr>
+          <p:cNvSpPr/>
+          <p:nvPr/>
+        </p:nvSpPr>
+        <p:spPr>
+          <a:xfrm>
+            <a:off x="4460424" y="3183304"/>
+            <a:ext cx="1259776" cy="266617"/>
+          </a:xfrm>
+          <a:prstGeom prst="rect">
+            <a:avLst/>
+          </a:prstGeom>
+          <a:solidFill>
+            <a:schemeClr val="accent6">
+              <a:lumMod val="75000"/>
+            </a:schemeClr>
+          </a:solidFill>
+        </p:spPr>
+        <p:style>
+          <a:lnRef idx="2">
+            <a:schemeClr val="accent1">
+              <a:shade val="50000"/>
+            </a:schemeClr>
+          </a:lnRef>
+          <a:fillRef idx="1">
+            <a:schemeClr val="accent1"/>
+          </a:fillRef>
+          <a:effectRef idx="0">
+            <a:schemeClr val="accent1"/>
+          </a:effectRef>
+          <a:fontRef idx="minor">
+            <a:schemeClr val="lt1"/>
+          </a:fontRef>
+        </p:style>
+        <p:txBody>
+          <a:bodyPr rtlCol="0" anchor="ctr"/>
+          <a:lstStyle/>
+          <a:p>
+            <a:r>
+              <a:rPr lang="en-US" sz="1200" b="1" dirty="0"/>
+              <a:t>Serial Connector </a:t>
+            </a:r>
+            <a:endParaRPr lang="en-SG" sz="1200" b="1" dirty="0"/>
+          </a:p>
+        </p:txBody>
+      </p:sp>
+      <p:sp>
+        <p:nvSpPr>
+          <p:cNvPr id="8" name="Rectangle 7">
+            <a:extLst>
+              <a:ext uri="{FF2B5EF4-FFF2-40B4-BE49-F238E27FC236}">
+                <a16:creationId xmlns:a16="http://schemas.microsoft.com/office/drawing/2014/main" id="{333174CA-1E38-3D4C-FB0F-13EDA7AFE612}"/>
+              </a:ext>
+            </a:extLst>
+          </p:cNvPr>
+          <p:cNvSpPr/>
+          <p:nvPr/>
+        </p:nvSpPr>
+        <p:spPr>
+          <a:xfrm>
+            <a:off x="4460423" y="2545013"/>
+            <a:ext cx="1259776" cy="276538"/>
+          </a:xfrm>
+          <a:prstGeom prst="rect">
+            <a:avLst/>
+          </a:prstGeom>
+          <a:solidFill>
+            <a:schemeClr val="accent6">
+              <a:lumMod val="75000"/>
+            </a:schemeClr>
+          </a:solidFill>
+        </p:spPr>
+        <p:style>
+          <a:lnRef idx="2">
+            <a:schemeClr val="accent1">
+              <a:shade val="50000"/>
+            </a:schemeClr>
+          </a:lnRef>
+          <a:fillRef idx="1">
+            <a:schemeClr val="accent1"/>
+          </a:fillRef>
+          <a:effectRef idx="0">
+            <a:schemeClr val="accent1"/>
+          </a:effectRef>
+          <a:fontRef idx="minor">
+            <a:schemeClr val="lt1"/>
+          </a:fontRef>
+        </p:style>
+        <p:txBody>
+          <a:bodyPr rtlCol="0" anchor="ctr"/>
+          <a:lstStyle/>
+          <a:p>
+            <a:r>
+              <a:rPr lang="en-US" sz="1200" b="1" dirty="0"/>
+              <a:t>UDP client </a:t>
+            </a:r>
+            <a:endParaRPr lang="en-SG" sz="1200" b="1" dirty="0"/>
+          </a:p>
+        </p:txBody>
+      </p:sp>
+      <p:sp>
+        <p:nvSpPr>
+          <p:cNvPr id="12" name="Rectangle 11">
+            <a:extLst>
+              <a:ext uri="{FF2B5EF4-FFF2-40B4-BE49-F238E27FC236}">
+                <a16:creationId xmlns:a16="http://schemas.microsoft.com/office/drawing/2014/main" id="{FE4C7195-C18B-3DF9-F599-211F1AE75081}"/>
+              </a:ext>
+            </a:extLst>
+          </p:cNvPr>
+          <p:cNvSpPr/>
+          <p:nvPr/>
+        </p:nvSpPr>
+        <p:spPr>
+          <a:xfrm>
+            <a:off x="4460424" y="2012440"/>
+            <a:ext cx="1259775" cy="266617"/>
+          </a:xfrm>
+          <a:prstGeom prst="rect">
+            <a:avLst/>
+          </a:prstGeom>
+          <a:solidFill>
+            <a:schemeClr val="accent6">
+              <a:lumMod val="75000"/>
+            </a:schemeClr>
+          </a:solidFill>
+        </p:spPr>
+        <p:style>
+          <a:lnRef idx="2">
+            <a:schemeClr val="accent1">
+              <a:shade val="50000"/>
+            </a:schemeClr>
+          </a:lnRef>
+          <a:fillRef idx="1">
+            <a:schemeClr val="accent1"/>
+          </a:fillRef>
+          <a:effectRef idx="0">
+            <a:schemeClr val="accent1"/>
+          </a:effectRef>
+          <a:fontRef idx="minor">
+            <a:schemeClr val="lt1"/>
+          </a:fontRef>
+        </p:style>
+        <p:txBody>
+          <a:bodyPr rtlCol="0" anchor="ctr"/>
+          <a:lstStyle/>
+          <a:p>
+            <a:r>
+              <a:rPr lang="en-US" sz="1200" b="1" dirty="0"/>
+              <a:t>TCP client </a:t>
+            </a:r>
+            <a:endParaRPr lang="en-SG" sz="1200" b="1" dirty="0"/>
+          </a:p>
+        </p:txBody>
+      </p:sp>
+      <p:cxnSp>
+        <p:nvCxnSpPr>
+          <p:cNvPr id="16" name="Connector: Elbow 15">
+            <a:extLst>
+              <a:ext uri="{FF2B5EF4-FFF2-40B4-BE49-F238E27FC236}">
+                <a16:creationId xmlns:a16="http://schemas.microsoft.com/office/drawing/2014/main" id="{2BB26479-73FC-7593-3E29-AD019F4A9EF2}"/>
+              </a:ext>
+            </a:extLst>
+          </p:cNvPr>
+          <p:cNvCxnSpPr>
+            <a:cxnSpLocks/>
+            <a:stCxn id="10" idx="3"/>
+            <a:endCxn id="6" idx="1"/>
+          </p:cNvCxnSpPr>
+          <p:nvPr/>
+        </p:nvCxnSpPr>
+        <p:spPr>
+          <a:xfrm>
+            <a:off x="4049486" y="2688245"/>
+            <a:ext cx="410938" cy="628368"/>
+          </a:xfrm>
+          <a:prstGeom prst="bentConnector3">
+            <a:avLst/>
+          </a:prstGeom>
+          <a:ln>
+            <a:tailEnd type="triangle"/>
+          </a:ln>
+        </p:spPr>
+        <p:style>
+          <a:lnRef idx="1">
+            <a:schemeClr val="dk1"/>
+          </a:lnRef>
+          <a:fillRef idx="0">
+            <a:schemeClr val="dk1"/>
+          </a:fillRef>
+          <a:effectRef idx="0">
+            <a:schemeClr val="dk1"/>
+          </a:effectRef>
+          <a:fontRef idx="minor">
+            <a:schemeClr val="tx1"/>
+          </a:fontRef>
+        </p:style>
+      </p:cxnSp>
+      <p:cxnSp>
+        <p:nvCxnSpPr>
+          <p:cNvPr id="17" name="Connector: Elbow 16">
+            <a:extLst>
+              <a:ext uri="{FF2B5EF4-FFF2-40B4-BE49-F238E27FC236}">
+                <a16:creationId xmlns:a16="http://schemas.microsoft.com/office/drawing/2014/main" id="{B67E78BD-592C-DD4E-AD44-E7F44B51ADE3}"/>
+              </a:ext>
+            </a:extLst>
+          </p:cNvPr>
+          <p:cNvCxnSpPr>
+            <a:cxnSpLocks/>
+            <a:stCxn id="10" idx="3"/>
+            <a:endCxn id="12" idx="1"/>
+          </p:cNvCxnSpPr>
+          <p:nvPr/>
+        </p:nvCxnSpPr>
+        <p:spPr>
+          <a:xfrm flipV="1">
+            <a:off x="4049486" y="2145749"/>
+            <a:ext cx="410938" cy="542496"/>
+          </a:xfrm>
+          <a:prstGeom prst="bentConnector3">
+            <a:avLst>
+              <a:gd name="adj1" fmla="val 50000"/>
+            </a:avLst>
+          </a:prstGeom>
+          <a:ln>
+            <a:tailEnd type="triangle"/>
+          </a:ln>
+        </p:spPr>
+        <p:style>
+          <a:lnRef idx="1">
+            <a:schemeClr val="dk1"/>
+          </a:lnRef>
+          <a:fillRef idx="0">
+            <a:schemeClr val="dk1"/>
+          </a:fillRef>
+          <a:effectRef idx="0">
+            <a:schemeClr val="dk1"/>
+          </a:effectRef>
+          <a:fontRef idx="minor">
+            <a:schemeClr val="tx1"/>
+          </a:fontRef>
+        </p:style>
+      </p:cxnSp>
+      <p:cxnSp>
+        <p:nvCxnSpPr>
+          <p:cNvPr id="25" name="Straight Arrow Connector 24">
+            <a:extLst>
+              <a:ext uri="{FF2B5EF4-FFF2-40B4-BE49-F238E27FC236}">
+                <a16:creationId xmlns:a16="http://schemas.microsoft.com/office/drawing/2014/main" id="{6034DE21-7D5F-1968-A78C-CA0CDC413202}"/>
+              </a:ext>
+            </a:extLst>
+          </p:cNvPr>
+          <p:cNvCxnSpPr>
+            <a:cxnSpLocks/>
+            <a:stCxn id="10" idx="3"/>
+            <a:endCxn id="8" idx="1"/>
+          </p:cNvCxnSpPr>
+          <p:nvPr/>
+        </p:nvCxnSpPr>
+        <p:spPr>
+          <a:xfrm flipV="1">
+            <a:off x="4049486" y="2683282"/>
+            <a:ext cx="410937" cy="4963"/>
+          </a:xfrm>
+          <a:prstGeom prst="straightConnector1">
+            <a:avLst/>
+          </a:prstGeom>
+          <a:ln>
+            <a:tailEnd type="triangle"/>
+          </a:ln>
+        </p:spPr>
+        <p:style>
+          <a:lnRef idx="1">
+            <a:schemeClr val="dk1"/>
+          </a:lnRef>
+          <a:fillRef idx="0">
+            <a:schemeClr val="dk1"/>
+          </a:fillRef>
+          <a:effectRef idx="0">
+            <a:schemeClr val="dk1"/>
+          </a:effectRef>
+          <a:fontRef idx="minor">
+            <a:schemeClr val="tx1"/>
+          </a:fontRef>
+        </p:style>
+      </p:cxnSp>
+      <p:cxnSp>
+        <p:nvCxnSpPr>
+          <p:cNvPr id="32" name="Straight Arrow Connector 31">
+            <a:extLst>
+              <a:ext uri="{FF2B5EF4-FFF2-40B4-BE49-F238E27FC236}">
+                <a16:creationId xmlns:a16="http://schemas.microsoft.com/office/drawing/2014/main" id="{40DAC498-4AB2-29FB-A967-CB25EFCB1B3D}"/>
+              </a:ext>
+            </a:extLst>
+          </p:cNvPr>
+          <p:cNvCxnSpPr>
+            <a:cxnSpLocks/>
+            <a:stCxn id="12" idx="3"/>
+          </p:cNvCxnSpPr>
+          <p:nvPr/>
+        </p:nvCxnSpPr>
+        <p:spPr>
+          <a:xfrm flipV="1">
+            <a:off x="5720199" y="2145748"/>
+            <a:ext cx="634881" cy="1"/>
+          </a:xfrm>
+          <a:prstGeom prst="straightConnector1">
+            <a:avLst/>
+          </a:prstGeom>
+          <a:ln>
+            <a:headEnd type="triangle"/>
+            <a:tailEnd type="triangle"/>
+          </a:ln>
+        </p:spPr>
+        <p:style>
+          <a:lnRef idx="1">
+            <a:schemeClr val="accent1"/>
+          </a:lnRef>
+          <a:fillRef idx="0">
+            <a:schemeClr val="accent1"/>
+          </a:fillRef>
+          <a:effectRef idx="0">
+            <a:schemeClr val="accent1"/>
+          </a:effectRef>
+          <a:fontRef idx="minor">
+            <a:schemeClr val="tx1"/>
+          </a:fontRef>
+        </p:style>
+      </p:cxnSp>
+      <p:cxnSp>
+        <p:nvCxnSpPr>
+          <p:cNvPr id="33" name="Straight Arrow Connector 32">
+            <a:extLst>
+              <a:ext uri="{FF2B5EF4-FFF2-40B4-BE49-F238E27FC236}">
+                <a16:creationId xmlns:a16="http://schemas.microsoft.com/office/drawing/2014/main" id="{7DD13FA0-ABE5-B2A7-126A-596A9A875C19}"/>
+              </a:ext>
+            </a:extLst>
+          </p:cNvPr>
+          <p:cNvCxnSpPr>
+            <a:cxnSpLocks/>
+          </p:cNvCxnSpPr>
+          <p:nvPr/>
+        </p:nvCxnSpPr>
+        <p:spPr>
+          <a:xfrm>
+            <a:off x="5765919" y="2688243"/>
+            <a:ext cx="589161" cy="0"/>
+          </a:xfrm>
+          <a:prstGeom prst="straightConnector1">
+            <a:avLst/>
+          </a:prstGeom>
+          <a:ln>
+            <a:headEnd type="triangle"/>
+            <a:tailEnd type="triangle"/>
+          </a:ln>
+        </p:spPr>
+        <p:style>
+          <a:lnRef idx="1">
+            <a:schemeClr val="accent1"/>
+          </a:lnRef>
+          <a:fillRef idx="0">
+            <a:schemeClr val="accent1"/>
+          </a:fillRef>
+          <a:effectRef idx="0">
+            <a:schemeClr val="accent1"/>
+          </a:effectRef>
+          <a:fontRef idx="minor">
+            <a:schemeClr val="tx1"/>
+          </a:fontRef>
+        </p:style>
+      </p:cxnSp>
+      <p:sp>
+        <p:nvSpPr>
+          <p:cNvPr id="40" name="Rectangle 39">
+            <a:extLst>
+              <a:ext uri="{FF2B5EF4-FFF2-40B4-BE49-F238E27FC236}">
+                <a16:creationId xmlns:a16="http://schemas.microsoft.com/office/drawing/2014/main" id="{2E9CF8E4-4ADF-6A93-6456-FCE7680EF40B}"/>
+              </a:ext>
+            </a:extLst>
+          </p:cNvPr>
+          <p:cNvSpPr/>
+          <p:nvPr/>
+        </p:nvSpPr>
+        <p:spPr>
+          <a:xfrm>
+            <a:off x="8174269" y="3162383"/>
+            <a:ext cx="1290559" cy="266617"/>
+          </a:xfrm>
+          <a:prstGeom prst="rect">
+            <a:avLst/>
+          </a:prstGeom>
+          <a:solidFill>
+            <a:srgbClr val="009297"/>
+          </a:solidFill>
+          <a:ln>
+            <a:solidFill>
+              <a:schemeClr val="accent1"/>
+            </a:solidFill>
+          </a:ln>
+        </p:spPr>
+        <p:style>
+          <a:lnRef idx="2">
+            <a:schemeClr val="accent1">
+              <a:shade val="50000"/>
+            </a:schemeClr>
+          </a:lnRef>
+          <a:fillRef idx="1">
+            <a:schemeClr val="accent1"/>
+          </a:fillRef>
+          <a:effectRef idx="0">
+            <a:schemeClr val="accent1"/>
+          </a:effectRef>
+          <a:fontRef idx="minor">
+            <a:schemeClr val="lt1"/>
+          </a:fontRef>
+        </p:style>
+        <p:txBody>
+          <a:bodyPr rtlCol="0" anchor="ctr"/>
+          <a:lstStyle/>
+          <a:p>
+            <a:r>
+              <a:rPr lang="en-US" sz="1200" b="1" dirty="0"/>
+              <a:t>Serial Connector </a:t>
+            </a:r>
+            <a:endParaRPr lang="en-SG" sz="1200" b="1" dirty="0"/>
+          </a:p>
+        </p:txBody>
+      </p:sp>
+      <p:sp>
+        <p:nvSpPr>
+          <p:cNvPr id="45" name="Cloud 44">
+            <a:extLst>
+              <a:ext uri="{FF2B5EF4-FFF2-40B4-BE49-F238E27FC236}">
+                <a16:creationId xmlns:a16="http://schemas.microsoft.com/office/drawing/2014/main" id="{73CB11F8-B100-DA93-E12C-13D301A39F7C}"/>
+              </a:ext>
+            </a:extLst>
+          </p:cNvPr>
+          <p:cNvSpPr/>
+          <p:nvPr/>
+        </p:nvSpPr>
+        <p:spPr>
+          <a:xfrm>
+            <a:off x="6309360" y="1909996"/>
+            <a:ext cx="1344168" cy="962777"/>
+          </a:xfrm>
+          <a:prstGeom prst="cloud">
+            <a:avLst/>
+          </a:prstGeom>
+        </p:spPr>
+        <p:style>
+          <a:lnRef idx="2">
+            <a:schemeClr val="accent1">
+              <a:shade val="15000"/>
+            </a:schemeClr>
+          </a:lnRef>
+          <a:fillRef idx="1">
+            <a:schemeClr val="accent1"/>
+          </a:fillRef>
+          <a:effectRef idx="0">
+            <a:schemeClr val="accent1"/>
+          </a:effectRef>
+          <a:fontRef idx="minor">
+            <a:schemeClr val="lt1"/>
+          </a:fontRef>
+        </p:style>
+        <p:txBody>
+          <a:bodyPr rtlCol="0" anchor="ctr"/>
+          <a:lstStyle/>
+          <a:p>
+            <a:pPr algn="ctr"/>
+            <a:r>
+              <a:rPr lang="en-US" sz="1200" dirty="0"/>
+              <a:t>Wireless</a:t>
+            </a:r>
+          </a:p>
+          <a:p>
+            <a:pPr algn="ctr"/>
+            <a:r>
+              <a:rPr lang="en-US" sz="1200" dirty="0"/>
+              <a:t>Network  </a:t>
+            </a:r>
+            <a:endParaRPr lang="en-SG" sz="1200" dirty="0"/>
+          </a:p>
+        </p:txBody>
+      </p:sp>
+      <p:pic>
+        <p:nvPicPr>
+          <p:cNvPr id="30" name="Picture 29">
+            <a:extLst>
+              <a:ext uri="{FF2B5EF4-FFF2-40B4-BE49-F238E27FC236}">
+                <a16:creationId xmlns:a16="http://schemas.microsoft.com/office/drawing/2014/main" id="{7C19DC71-EB21-8F20-CEBD-4CEF7AF7AE7C}"/>
+              </a:ext>
+            </a:extLst>
+          </p:cNvPr>
+          <p:cNvPicPr>
+            <a:picLocks noChangeAspect="1"/>
+          </p:cNvPicPr>
+          <p:nvPr/>
+        </p:nvPicPr>
+        <p:blipFill>
+          <a:blip r:embed="rId2"/>
+          <a:stretch>
+            <a:fillRect/>
+          </a:stretch>
+        </p:blipFill>
+        <p:spPr>
+          <a:xfrm>
+            <a:off x="6682125" y="1845886"/>
+            <a:ext cx="427879" cy="323166"/>
+          </a:xfrm>
+          <a:prstGeom prst="rect">
+            <a:avLst/>
+          </a:prstGeom>
+          <a:ln w="12700">
+            <a:solidFill>
+              <a:schemeClr val="tx1"/>
+            </a:solidFill>
+          </a:ln>
+        </p:spPr>
+      </p:pic>
+      <p:cxnSp>
+        <p:nvCxnSpPr>
+          <p:cNvPr id="57" name="Straight Arrow Connector 56">
+            <a:extLst>
+              <a:ext uri="{FF2B5EF4-FFF2-40B4-BE49-F238E27FC236}">
+                <a16:creationId xmlns:a16="http://schemas.microsoft.com/office/drawing/2014/main" id="{CEE0A574-6BA6-3D8E-3A41-EBC2DB520301}"/>
+              </a:ext>
+            </a:extLst>
+          </p:cNvPr>
+          <p:cNvCxnSpPr>
+            <a:cxnSpLocks/>
+            <a:stCxn id="6" idx="3"/>
+            <a:endCxn id="40" idx="1"/>
+          </p:cNvCxnSpPr>
+          <p:nvPr/>
+        </p:nvCxnSpPr>
+        <p:spPr>
+          <a:xfrm flipV="1">
+            <a:off x="5720200" y="3295692"/>
+            <a:ext cx="2454069" cy="0"/>
+          </a:xfrm>
+          <a:prstGeom prst="straightConnector1">
+            <a:avLst/>
+          </a:prstGeom>
+          <a:ln>
+            <a:headEnd type="triangle"/>
+            <a:tailEnd type="triangle"/>
+          </a:ln>
+        </p:spPr>
+        <p:style>
+          <a:lnRef idx="1">
+            <a:schemeClr val="accent1"/>
+          </a:lnRef>
+          <a:fillRef idx="0">
+            <a:schemeClr val="accent1"/>
+          </a:fillRef>
+          <a:effectRef idx="0">
+            <a:schemeClr val="accent1"/>
+          </a:effectRef>
+          <a:fontRef idx="minor">
+            <a:schemeClr val="tx1"/>
+          </a:fontRef>
+        </p:style>
+      </p:cxnSp>
+      <p:sp>
+        <p:nvSpPr>
+          <p:cNvPr id="61" name="TextBox 60">
+            <a:extLst>
+              <a:ext uri="{FF2B5EF4-FFF2-40B4-BE49-F238E27FC236}">
+                <a16:creationId xmlns:a16="http://schemas.microsoft.com/office/drawing/2014/main" id="{B4355675-1E84-C06E-FF8D-5F6BABCEAB17}"/>
+              </a:ext>
+            </a:extLst>
+          </p:cNvPr>
+          <p:cNvSpPr txBox="1"/>
+          <p:nvPr/>
+        </p:nvSpPr>
+        <p:spPr>
+          <a:xfrm>
+            <a:off x="6194160" y="3044542"/>
+            <a:ext cx="1750259" cy="261610"/>
+          </a:xfrm>
+          <a:prstGeom prst="rect">
+            <a:avLst/>
+          </a:prstGeom>
+          <a:noFill/>
+        </p:spPr>
+        <p:txBody>
+          <a:bodyPr wrap="square" rtlCol="0">
+            <a:spAutoFit/>
+          </a:bodyPr>
+          <a:lstStyle/>
+          <a:p>
+            <a:r>
+              <a:rPr lang="en-US" sz="1100" dirty="0"/>
+              <a:t>USB cable connection </a:t>
+            </a:r>
+            <a:endParaRPr lang="en-SG" sz="1100" dirty="0"/>
+          </a:p>
+        </p:txBody>
+      </p:sp>
+      <p:sp>
+        <p:nvSpPr>
+          <p:cNvPr id="62" name="Rectangle 61">
+            <a:extLst>
+              <a:ext uri="{FF2B5EF4-FFF2-40B4-BE49-F238E27FC236}">
+                <a16:creationId xmlns:a16="http://schemas.microsoft.com/office/drawing/2014/main" id="{72853829-893B-FEEA-47B5-8FCF46C9AF58}"/>
+              </a:ext>
+            </a:extLst>
+          </p:cNvPr>
+          <p:cNvSpPr/>
+          <p:nvPr/>
+        </p:nvSpPr>
+        <p:spPr>
+          <a:xfrm>
+            <a:off x="8196969" y="1370278"/>
+            <a:ext cx="1059235" cy="292860"/>
+          </a:xfrm>
+          <a:prstGeom prst="rect">
+            <a:avLst/>
+          </a:prstGeom>
+          <a:solidFill>
+            <a:srgbClr val="009297"/>
+          </a:solidFill>
+        </p:spPr>
+        <p:style>
+          <a:lnRef idx="2">
+            <a:schemeClr val="accent1">
+              <a:shade val="50000"/>
+            </a:schemeClr>
+          </a:lnRef>
+          <a:fillRef idx="1">
+            <a:schemeClr val="accent1"/>
+          </a:fillRef>
+          <a:effectRef idx="0">
+            <a:schemeClr val="accent1"/>
+          </a:effectRef>
+          <a:fontRef idx="minor">
+            <a:schemeClr val="lt1"/>
+          </a:fontRef>
+        </p:style>
+        <p:txBody>
+          <a:bodyPr rtlCol="0" anchor="ctr"/>
+          <a:lstStyle/>
+          <a:p>
+            <a:r>
+              <a:rPr lang="en-SG" sz="1200" b="1" dirty="0"/>
+              <a:t>Arduino start </a:t>
+            </a:r>
+          </a:p>
+        </p:txBody>
+      </p:sp>
+      <p:sp>
+        <p:nvSpPr>
+          <p:cNvPr id="63" name="Rectangle 62">
+            <a:extLst>
+              <a:ext uri="{FF2B5EF4-FFF2-40B4-BE49-F238E27FC236}">
+                <a16:creationId xmlns:a16="http://schemas.microsoft.com/office/drawing/2014/main" id="{E593056A-891A-30EB-084A-A090063B97B0}"/>
+              </a:ext>
+            </a:extLst>
+          </p:cNvPr>
+          <p:cNvSpPr/>
+          <p:nvPr/>
+        </p:nvSpPr>
+        <p:spPr>
+          <a:xfrm>
+            <a:off x="8203525" y="2638597"/>
+            <a:ext cx="974468" cy="266617"/>
+          </a:xfrm>
+          <a:prstGeom prst="rect">
+            <a:avLst/>
+          </a:prstGeom>
+          <a:solidFill>
+            <a:srgbClr val="009297"/>
+          </a:solidFill>
+          <a:ln>
+            <a:solidFill>
+              <a:schemeClr val="accent1"/>
+            </a:solidFill>
+          </a:ln>
+        </p:spPr>
+        <p:style>
+          <a:lnRef idx="2">
+            <a:schemeClr val="accent1">
+              <a:shade val="50000"/>
+            </a:schemeClr>
+          </a:lnRef>
+          <a:fillRef idx="1">
+            <a:schemeClr val="accent1"/>
+          </a:fillRef>
+          <a:effectRef idx="0">
+            <a:schemeClr val="accent1"/>
+          </a:effectRef>
+          <a:fontRef idx="minor">
+            <a:schemeClr val="lt1"/>
+          </a:fontRef>
+        </p:style>
+        <p:txBody>
+          <a:bodyPr rtlCol="0" anchor="ctr"/>
+          <a:lstStyle/>
+          <a:p>
+            <a:r>
+              <a:rPr lang="en-US" sz="1200" b="1" dirty="0"/>
+              <a:t>TCP server </a:t>
+            </a:r>
+            <a:endParaRPr lang="en-SG" sz="1200" b="1" dirty="0"/>
+          </a:p>
+        </p:txBody>
+      </p:sp>
+      <p:sp>
+        <p:nvSpPr>
+          <p:cNvPr id="64" name="Rectangle 63">
+            <a:extLst>
+              <a:ext uri="{FF2B5EF4-FFF2-40B4-BE49-F238E27FC236}">
+                <a16:creationId xmlns:a16="http://schemas.microsoft.com/office/drawing/2014/main" id="{672F6E62-33EF-6CCF-3E1D-C5B244B77ADA}"/>
+              </a:ext>
+            </a:extLst>
+          </p:cNvPr>
+          <p:cNvSpPr/>
+          <p:nvPr/>
+        </p:nvSpPr>
+        <p:spPr>
+          <a:xfrm>
+            <a:off x="8196969" y="2193691"/>
+            <a:ext cx="974468" cy="266617"/>
+          </a:xfrm>
+          <a:prstGeom prst="rect">
+            <a:avLst/>
+          </a:prstGeom>
+          <a:solidFill>
+            <a:srgbClr val="009297"/>
+          </a:solidFill>
+          <a:ln>
+            <a:solidFill>
+              <a:schemeClr val="accent1"/>
+            </a:solidFill>
+          </a:ln>
+        </p:spPr>
+        <p:style>
+          <a:lnRef idx="2">
+            <a:schemeClr val="accent1">
+              <a:shade val="50000"/>
+            </a:schemeClr>
+          </a:lnRef>
+          <a:fillRef idx="1">
+            <a:schemeClr val="accent1"/>
+          </a:fillRef>
+          <a:effectRef idx="0">
+            <a:schemeClr val="accent1"/>
+          </a:effectRef>
+          <a:fontRef idx="minor">
+            <a:schemeClr val="lt1"/>
+          </a:fontRef>
+        </p:style>
+        <p:txBody>
+          <a:bodyPr rtlCol="0" anchor="ctr"/>
+          <a:lstStyle/>
+          <a:p>
+            <a:r>
+              <a:rPr lang="en-US" sz="1200" b="1" dirty="0"/>
+              <a:t>UDP server </a:t>
+            </a:r>
+            <a:endParaRPr lang="en-SG" sz="1200" b="1" dirty="0"/>
+          </a:p>
+        </p:txBody>
+      </p:sp>
+      <p:cxnSp>
+        <p:nvCxnSpPr>
+          <p:cNvPr id="65" name="Straight Arrow Connector 64">
+            <a:extLst>
+              <a:ext uri="{FF2B5EF4-FFF2-40B4-BE49-F238E27FC236}">
+                <a16:creationId xmlns:a16="http://schemas.microsoft.com/office/drawing/2014/main" id="{BC56EBA3-9975-620F-528C-18CF57980093}"/>
+              </a:ext>
+            </a:extLst>
+          </p:cNvPr>
+          <p:cNvCxnSpPr>
+            <a:cxnSpLocks/>
+          </p:cNvCxnSpPr>
+          <p:nvPr/>
+        </p:nvCxnSpPr>
+        <p:spPr>
+          <a:xfrm flipV="1">
+            <a:off x="7627556" y="2262614"/>
+            <a:ext cx="544561" cy="0"/>
+          </a:xfrm>
+          <a:prstGeom prst="straightConnector1">
+            <a:avLst/>
+          </a:prstGeom>
+          <a:ln>
+            <a:headEnd type="triangle"/>
+            <a:tailEnd type="triangle"/>
+          </a:ln>
+        </p:spPr>
+        <p:style>
+          <a:lnRef idx="1">
+            <a:schemeClr val="accent1"/>
+          </a:lnRef>
+          <a:fillRef idx="0">
+            <a:schemeClr val="accent1"/>
+          </a:fillRef>
+          <a:effectRef idx="0">
+            <a:schemeClr val="accent1"/>
+          </a:effectRef>
+          <a:fontRef idx="minor">
+            <a:schemeClr val="tx1"/>
+          </a:fontRef>
+        </p:style>
+      </p:cxnSp>
+      <p:cxnSp>
+        <p:nvCxnSpPr>
+          <p:cNvPr id="69" name="Straight Arrow Connector 68">
+            <a:extLst>
+              <a:ext uri="{FF2B5EF4-FFF2-40B4-BE49-F238E27FC236}">
+                <a16:creationId xmlns:a16="http://schemas.microsoft.com/office/drawing/2014/main" id="{2BE6CCDC-3AC5-74DD-0B60-3C0FAAD75D27}"/>
+              </a:ext>
+            </a:extLst>
+          </p:cNvPr>
+          <p:cNvCxnSpPr>
+            <a:cxnSpLocks/>
+            <a:endCxn id="63" idx="1"/>
+          </p:cNvCxnSpPr>
+          <p:nvPr/>
+        </p:nvCxnSpPr>
+        <p:spPr>
+          <a:xfrm>
+            <a:off x="7496928" y="2743736"/>
+            <a:ext cx="706597" cy="0"/>
+          </a:xfrm>
+          <a:prstGeom prst="straightConnector1">
+            <a:avLst/>
+          </a:prstGeom>
+          <a:ln>
+            <a:headEnd type="triangle"/>
+            <a:tailEnd type="triangle"/>
+          </a:ln>
+        </p:spPr>
+        <p:style>
+          <a:lnRef idx="1">
+            <a:schemeClr val="accent1"/>
+          </a:lnRef>
+          <a:fillRef idx="0">
+            <a:schemeClr val="accent1"/>
+          </a:fillRef>
+          <a:effectRef idx="0">
+            <a:schemeClr val="accent1"/>
+          </a:effectRef>
+          <a:fontRef idx="minor">
+            <a:schemeClr val="tx1"/>
+          </a:fontRef>
+        </p:style>
+      </p:cxnSp>
+      <p:cxnSp>
+        <p:nvCxnSpPr>
+          <p:cNvPr id="72" name="Straight Arrow Connector 71">
+            <a:extLst>
+              <a:ext uri="{FF2B5EF4-FFF2-40B4-BE49-F238E27FC236}">
+                <a16:creationId xmlns:a16="http://schemas.microsoft.com/office/drawing/2014/main" id="{38F57F31-07BB-029B-D146-5B7C5F2E3C9B}"/>
+              </a:ext>
+            </a:extLst>
+          </p:cNvPr>
+          <p:cNvCxnSpPr>
+            <a:cxnSpLocks/>
+            <a:stCxn id="62" idx="2"/>
+            <a:endCxn id="73" idx="0"/>
+          </p:cNvCxnSpPr>
+          <p:nvPr/>
+        </p:nvCxnSpPr>
+        <p:spPr>
+          <a:xfrm>
+            <a:off x="8726587" y="1663138"/>
+            <a:ext cx="0" cy="454050"/>
+          </a:xfrm>
+          <a:prstGeom prst="straightConnector1">
+            <a:avLst/>
+          </a:prstGeom>
+          <a:ln>
+            <a:tailEnd type="triangle"/>
+          </a:ln>
+        </p:spPr>
+        <p:style>
+          <a:lnRef idx="1">
+            <a:schemeClr val="dk1"/>
+          </a:lnRef>
+          <a:fillRef idx="0">
+            <a:schemeClr val="dk1"/>
+          </a:fillRef>
+          <a:effectRef idx="0">
+            <a:schemeClr val="dk1"/>
+          </a:effectRef>
+          <a:fontRef idx="minor">
+            <a:schemeClr val="tx1"/>
+          </a:fontRef>
+        </p:style>
+      </p:cxnSp>
+      <p:sp>
+        <p:nvSpPr>
+          <p:cNvPr id="73" name="Rectangle 72">
+            <a:extLst>
+              <a:ext uri="{FF2B5EF4-FFF2-40B4-BE49-F238E27FC236}">
+                <a16:creationId xmlns:a16="http://schemas.microsoft.com/office/drawing/2014/main" id="{D89C91C1-0154-6965-AA8E-7D31BF8CA3DA}"/>
+              </a:ext>
+            </a:extLst>
+          </p:cNvPr>
+          <p:cNvSpPr/>
+          <p:nvPr/>
+        </p:nvSpPr>
+        <p:spPr>
+          <a:xfrm>
+            <a:off x="7997603" y="2117188"/>
+            <a:ext cx="1538284" cy="1500513"/>
+          </a:xfrm>
+          <a:prstGeom prst="rect">
+            <a:avLst/>
+          </a:prstGeom>
+          <a:noFill/>
+          <a:ln w="19050">
+            <a:solidFill>
+              <a:srgbClr val="009297"/>
+            </a:solidFill>
+            <a:prstDash val="sysDash"/>
+          </a:ln>
+        </p:spPr>
+        <p:style>
+          <a:lnRef idx="2">
+            <a:schemeClr val="accent6"/>
+          </a:lnRef>
+          <a:fillRef idx="1">
+            <a:schemeClr val="lt1"/>
+          </a:fillRef>
+          <a:effectRef idx="0">
+            <a:schemeClr val="accent6"/>
+          </a:effectRef>
+          <a:fontRef idx="minor">
+            <a:schemeClr val="dk1"/>
+          </a:fontRef>
+        </p:style>
+        <p:txBody>
+          <a:bodyPr rtlCol="0" anchor="ctr"/>
+          <a:lstStyle/>
+          <a:p>
+            <a:pPr algn="ctr"/>
+            <a:endParaRPr lang="en-SG" dirty="0"/>
+          </a:p>
+        </p:txBody>
+      </p:sp>
+      <p:sp>
+        <p:nvSpPr>
+          <p:cNvPr id="76" name="TextBox 75">
+            <a:extLst>
+              <a:ext uri="{FF2B5EF4-FFF2-40B4-BE49-F238E27FC236}">
+                <a16:creationId xmlns:a16="http://schemas.microsoft.com/office/drawing/2014/main" id="{56AB9F62-D4E7-FD3F-9614-2353A8E93F5B}"/>
+              </a:ext>
+            </a:extLst>
+          </p:cNvPr>
+          <p:cNvSpPr txBox="1"/>
+          <p:nvPr/>
+        </p:nvSpPr>
+        <p:spPr>
+          <a:xfrm>
+            <a:off x="8737954" y="1659331"/>
+            <a:ext cx="2216186" cy="461665"/>
+          </a:xfrm>
+          <a:prstGeom prst="rect">
+            <a:avLst/>
+          </a:prstGeom>
+          <a:noFill/>
+        </p:spPr>
+        <p:txBody>
+          <a:bodyPr wrap="square" rtlCol="0">
+            <a:spAutoFit/>
+          </a:bodyPr>
+          <a:lstStyle/>
+          <a:p>
+            <a:r>
+              <a:rPr lang="en-US" sz="1200" b="1" dirty="0">
+                <a:solidFill>
+                  <a:srgbClr val="009297"/>
+                </a:solidFill>
+              </a:rPr>
+              <a:t>Start related request handler based on the firmware </a:t>
+            </a:r>
+            <a:endParaRPr lang="en-SG" sz="1200" b="1" dirty="0">
+              <a:solidFill>
+                <a:srgbClr val="009297"/>
+              </a:solidFill>
+            </a:endParaRPr>
+          </a:p>
+        </p:txBody>
+      </p:sp>
+      <p:sp>
+        <p:nvSpPr>
+          <p:cNvPr id="78" name="Rectangle 77">
+            <a:extLst>
+              <a:ext uri="{FF2B5EF4-FFF2-40B4-BE49-F238E27FC236}">
+                <a16:creationId xmlns:a16="http://schemas.microsoft.com/office/drawing/2014/main" id="{517D5DE6-2432-8576-D161-73436C355C51}"/>
+              </a:ext>
+            </a:extLst>
+          </p:cNvPr>
+          <p:cNvSpPr/>
+          <p:nvPr/>
+        </p:nvSpPr>
+        <p:spPr>
+          <a:xfrm>
+            <a:off x="8159896" y="3876487"/>
+            <a:ext cx="1213698" cy="322111"/>
+          </a:xfrm>
+          <a:prstGeom prst="rect">
+            <a:avLst/>
+          </a:prstGeom>
+          <a:solidFill>
+            <a:srgbClr val="009297"/>
+          </a:solidFill>
+          <a:ln>
+            <a:solidFill>
+              <a:schemeClr val="accent1"/>
+            </a:solidFill>
+          </a:ln>
+        </p:spPr>
+        <p:style>
+          <a:lnRef idx="2">
+            <a:schemeClr val="accent1">
+              <a:shade val="50000"/>
+            </a:schemeClr>
+          </a:lnRef>
+          <a:fillRef idx="1">
+            <a:schemeClr val="accent1"/>
+          </a:fillRef>
+          <a:effectRef idx="0">
+            <a:schemeClr val="accent1"/>
+          </a:effectRef>
+          <a:fontRef idx="minor">
+            <a:schemeClr val="lt1"/>
+          </a:fontRef>
+        </p:style>
+        <p:txBody>
+          <a:bodyPr rtlCol="0" anchor="ctr"/>
+          <a:lstStyle/>
+          <a:p>
+            <a:r>
+              <a:rPr lang="en-US" sz="1200" b="1" dirty="0"/>
+              <a:t>Braccio ++ API</a:t>
+            </a:r>
+            <a:endParaRPr lang="en-SG" sz="1200" b="1" dirty="0"/>
+          </a:p>
+        </p:txBody>
+      </p:sp>
+      <p:pic>
+        <p:nvPicPr>
+          <p:cNvPr id="80" name="Picture 79">
+            <a:extLst>
+              <a:ext uri="{FF2B5EF4-FFF2-40B4-BE49-F238E27FC236}">
+                <a16:creationId xmlns:a16="http://schemas.microsoft.com/office/drawing/2014/main" id="{1568D65E-00AD-ABBB-1043-345CF90C63F8}"/>
+              </a:ext>
+            </a:extLst>
+          </p:cNvPr>
+          <p:cNvPicPr>
+            <a:picLocks noChangeAspect="1"/>
+          </p:cNvPicPr>
+          <p:nvPr/>
+        </p:nvPicPr>
+        <p:blipFill>
+          <a:blip r:embed="rId3"/>
+          <a:stretch>
+            <a:fillRect/>
+          </a:stretch>
+        </p:blipFill>
+        <p:spPr>
+          <a:xfrm>
+            <a:off x="10016787" y="4214451"/>
+            <a:ext cx="884959" cy="1147170"/>
+          </a:xfrm>
+          <a:prstGeom prst="rect">
+            <a:avLst/>
+          </a:prstGeom>
+          <a:ln w="6350">
+            <a:solidFill>
+              <a:schemeClr val="tx1"/>
+            </a:solidFill>
+          </a:ln>
+        </p:spPr>
+      </p:pic>
+      <p:cxnSp>
+        <p:nvCxnSpPr>
+          <p:cNvPr id="81" name="Straight Arrow Connector 80">
+            <a:extLst>
+              <a:ext uri="{FF2B5EF4-FFF2-40B4-BE49-F238E27FC236}">
+                <a16:creationId xmlns:a16="http://schemas.microsoft.com/office/drawing/2014/main" id="{79BDDCA4-FE1F-D83A-7E19-5FF045CAD9B7}"/>
+              </a:ext>
+            </a:extLst>
+          </p:cNvPr>
+          <p:cNvCxnSpPr>
+            <a:cxnSpLocks/>
+            <a:stCxn id="73" idx="2"/>
+            <a:endCxn id="78" idx="0"/>
+          </p:cNvCxnSpPr>
+          <p:nvPr/>
+        </p:nvCxnSpPr>
+        <p:spPr>
+          <a:xfrm>
+            <a:off x="8766745" y="3617701"/>
+            <a:ext cx="0" cy="258786"/>
+          </a:xfrm>
+          <a:prstGeom prst="straightConnector1">
+            <a:avLst/>
+          </a:prstGeom>
+          <a:ln>
+            <a:headEnd type="triangle"/>
+            <a:tailEnd type="triangle"/>
+          </a:ln>
+        </p:spPr>
+        <p:style>
+          <a:lnRef idx="1">
+            <a:schemeClr val="dk1"/>
+          </a:lnRef>
+          <a:fillRef idx="0">
+            <a:schemeClr val="dk1"/>
+          </a:fillRef>
+          <a:effectRef idx="0">
+            <a:schemeClr val="dk1"/>
+          </a:effectRef>
+          <a:fontRef idx="minor">
+            <a:schemeClr val="tx1"/>
+          </a:fontRef>
+        </p:style>
+      </p:cxnSp>
+      <p:sp>
+        <p:nvSpPr>
+          <p:cNvPr id="87" name="TextBox 86">
+            <a:extLst>
+              <a:ext uri="{FF2B5EF4-FFF2-40B4-BE49-F238E27FC236}">
+                <a16:creationId xmlns:a16="http://schemas.microsoft.com/office/drawing/2014/main" id="{4EEB97D2-6F00-69C5-7F43-F884BEA1B57A}"/>
+              </a:ext>
+            </a:extLst>
+          </p:cNvPr>
+          <p:cNvSpPr txBox="1"/>
+          <p:nvPr/>
+        </p:nvSpPr>
+        <p:spPr>
+          <a:xfrm>
+            <a:off x="2215855" y="2851286"/>
+            <a:ext cx="1227858" cy="430887"/>
+          </a:xfrm>
+          <a:prstGeom prst="rect">
+            <a:avLst/>
+          </a:prstGeom>
+          <a:noFill/>
+        </p:spPr>
+        <p:txBody>
+          <a:bodyPr wrap="square" rtlCol="0">
+            <a:spAutoFit/>
+          </a:bodyPr>
+          <a:lstStyle/>
+          <a:p>
+            <a:r>
+              <a:rPr lang="en-US" sz="1100" dirty="0"/>
+              <a:t>Potentiometer data </a:t>
+            </a:r>
+            <a:endParaRPr lang="en-SG" sz="1100" dirty="0"/>
+          </a:p>
+        </p:txBody>
+      </p:sp>
+      <p:sp>
+        <p:nvSpPr>
+          <p:cNvPr id="92" name="Rectangle 91">
+            <a:extLst>
+              <a:ext uri="{FF2B5EF4-FFF2-40B4-BE49-F238E27FC236}">
+                <a16:creationId xmlns:a16="http://schemas.microsoft.com/office/drawing/2014/main" id="{447AA491-0282-D126-365B-488B0E5E6403}"/>
+              </a:ext>
+            </a:extLst>
+          </p:cNvPr>
+          <p:cNvSpPr/>
+          <p:nvPr/>
+        </p:nvSpPr>
+        <p:spPr>
+          <a:xfrm>
+            <a:off x="4194398" y="1934025"/>
+            <a:ext cx="1726247" cy="1738701"/>
+          </a:xfrm>
+          <a:prstGeom prst="rect">
+            <a:avLst/>
+          </a:prstGeom>
+          <a:noFill/>
+          <a:ln w="19050">
+            <a:solidFill>
+              <a:schemeClr val="accent6">
+                <a:lumMod val="75000"/>
+              </a:schemeClr>
+            </a:solidFill>
+            <a:prstDash val="sysDash"/>
+          </a:ln>
+        </p:spPr>
+        <p:style>
+          <a:lnRef idx="2">
+            <a:schemeClr val="accent6"/>
+          </a:lnRef>
+          <a:fillRef idx="1">
+            <a:schemeClr val="lt1"/>
+          </a:fillRef>
+          <a:effectRef idx="0">
+            <a:schemeClr val="accent6"/>
+          </a:effectRef>
+          <a:fontRef idx="minor">
+            <a:schemeClr val="dk1"/>
+          </a:fontRef>
+        </p:style>
+        <p:txBody>
+          <a:bodyPr rtlCol="0" anchor="ctr"/>
+          <a:lstStyle/>
+          <a:p>
+            <a:pPr algn="ctr"/>
+            <a:endParaRPr lang="en-SG" dirty="0"/>
+          </a:p>
+        </p:txBody>
+      </p:sp>
+      <p:sp>
+        <p:nvSpPr>
+          <p:cNvPr id="93" name="TextBox 92">
+            <a:extLst>
+              <a:ext uri="{FF2B5EF4-FFF2-40B4-BE49-F238E27FC236}">
+                <a16:creationId xmlns:a16="http://schemas.microsoft.com/office/drawing/2014/main" id="{F74C3FC2-D182-8A54-B884-FB842394B3EA}"/>
+              </a:ext>
+            </a:extLst>
+          </p:cNvPr>
+          <p:cNvSpPr txBox="1"/>
+          <p:nvPr/>
+        </p:nvSpPr>
+        <p:spPr>
+          <a:xfrm>
+            <a:off x="4115403" y="1691210"/>
+            <a:ext cx="1750259" cy="261610"/>
+          </a:xfrm>
+          <a:prstGeom prst="rect">
+            <a:avLst/>
+          </a:prstGeom>
+          <a:noFill/>
+        </p:spPr>
+        <p:txBody>
+          <a:bodyPr wrap="square" rtlCol="0">
+            <a:spAutoFit/>
+          </a:bodyPr>
+          <a:lstStyle/>
+          <a:p>
+            <a:r>
+              <a:rPr lang="en-US" sz="1100" b="1" dirty="0"/>
+              <a:t>Communication manager </a:t>
+            </a:r>
+            <a:endParaRPr lang="en-SG" sz="1100" b="1" dirty="0"/>
+          </a:p>
+        </p:txBody>
+      </p:sp>
+      <p:pic>
+        <p:nvPicPr>
+          <p:cNvPr id="106" name="Picture 105">
+            <a:extLst>
+              <a:ext uri="{FF2B5EF4-FFF2-40B4-BE49-F238E27FC236}">
+                <a16:creationId xmlns:a16="http://schemas.microsoft.com/office/drawing/2014/main" id="{A49D8497-35C7-7679-9283-2AD05ED78AB7}"/>
+              </a:ext>
+            </a:extLst>
+          </p:cNvPr>
+          <p:cNvPicPr>
+            <a:picLocks noChangeAspect="1"/>
+          </p:cNvPicPr>
+          <p:nvPr/>
+        </p:nvPicPr>
+        <p:blipFill>
+          <a:blip r:embed="rId4"/>
+          <a:stretch>
+            <a:fillRect/>
+          </a:stretch>
+        </p:blipFill>
+        <p:spPr>
+          <a:xfrm>
+            <a:off x="3428741" y="3277163"/>
+            <a:ext cx="511248" cy="522868"/>
+          </a:xfrm>
+          <a:prstGeom prst="rect">
+            <a:avLst/>
+          </a:prstGeom>
+          <a:ln w="6350">
+            <a:solidFill>
+              <a:schemeClr val="tx1"/>
+            </a:solidFill>
+          </a:ln>
+        </p:spPr>
+      </p:pic>
+      <p:sp>
+        <p:nvSpPr>
+          <p:cNvPr id="114" name="TextBox 113">
+            <a:extLst>
+              <a:ext uri="{FF2B5EF4-FFF2-40B4-BE49-F238E27FC236}">
+                <a16:creationId xmlns:a16="http://schemas.microsoft.com/office/drawing/2014/main" id="{F7AE1415-5151-093B-9229-D467C780AE56}"/>
+              </a:ext>
+            </a:extLst>
+          </p:cNvPr>
+          <p:cNvSpPr txBox="1"/>
+          <p:nvPr/>
+        </p:nvSpPr>
+        <p:spPr>
+          <a:xfrm>
+            <a:off x="3678381" y="3759867"/>
+            <a:ext cx="969258" cy="261610"/>
+          </a:xfrm>
+          <a:prstGeom prst="rect">
+            <a:avLst/>
+          </a:prstGeom>
+          <a:noFill/>
+        </p:spPr>
+        <p:txBody>
+          <a:bodyPr wrap="square" rtlCol="0">
+            <a:spAutoFit/>
+          </a:bodyPr>
+          <a:lstStyle/>
+          <a:p>
+            <a:r>
+              <a:rPr lang="en-US" sz="1100" b="1" dirty="0"/>
+              <a:t>Task Queue </a:t>
+            </a:r>
+            <a:endParaRPr lang="en-SG" sz="1100" b="1" dirty="0"/>
+          </a:p>
+        </p:txBody>
+      </p:sp>
+      <p:cxnSp>
+        <p:nvCxnSpPr>
+          <p:cNvPr id="116" name="Straight Arrow Connector 115">
+            <a:extLst>
+              <a:ext uri="{FF2B5EF4-FFF2-40B4-BE49-F238E27FC236}">
+                <a16:creationId xmlns:a16="http://schemas.microsoft.com/office/drawing/2014/main" id="{8938FB57-4B68-DEE0-BE40-217CF4BB0BD1}"/>
+              </a:ext>
+            </a:extLst>
+          </p:cNvPr>
+          <p:cNvCxnSpPr>
+            <a:cxnSpLocks/>
+            <a:stCxn id="106" idx="0"/>
+          </p:cNvCxnSpPr>
+          <p:nvPr/>
+        </p:nvCxnSpPr>
+        <p:spPr>
+          <a:xfrm flipH="1" flipV="1">
+            <a:off x="3677322" y="2905214"/>
+            <a:ext cx="7043" cy="371949"/>
+          </a:xfrm>
+          <a:prstGeom prst="straightConnector1">
+            <a:avLst/>
+          </a:prstGeom>
+          <a:ln w="19050">
+            <a:solidFill>
+              <a:schemeClr val="accent6">
+                <a:lumMod val="75000"/>
+              </a:schemeClr>
+            </a:solidFill>
+            <a:prstDash val="sysDash"/>
+            <a:tailEnd type="triangle"/>
+          </a:ln>
+        </p:spPr>
+        <p:style>
+          <a:lnRef idx="1">
+            <a:schemeClr val="accent1"/>
+          </a:lnRef>
+          <a:fillRef idx="0">
+            <a:schemeClr val="accent1"/>
+          </a:fillRef>
+          <a:effectRef idx="0">
+            <a:schemeClr val="accent1"/>
+          </a:effectRef>
+          <a:fontRef idx="minor">
+            <a:schemeClr val="tx1"/>
+          </a:fontRef>
+        </p:style>
+      </p:cxnSp>
+      <p:pic>
+        <p:nvPicPr>
+          <p:cNvPr id="120" name="Picture 119">
+            <a:extLst>
+              <a:ext uri="{FF2B5EF4-FFF2-40B4-BE49-F238E27FC236}">
+                <a16:creationId xmlns:a16="http://schemas.microsoft.com/office/drawing/2014/main" id="{971E5890-85F3-4F1B-E1EC-B1FF9F548184}"/>
+              </a:ext>
+            </a:extLst>
+          </p:cNvPr>
+          <p:cNvPicPr>
+            <a:picLocks noChangeAspect="1"/>
+          </p:cNvPicPr>
+          <p:nvPr/>
+        </p:nvPicPr>
+        <p:blipFill>
+          <a:blip r:embed="rId5"/>
+          <a:stretch>
+            <a:fillRect/>
+          </a:stretch>
+        </p:blipFill>
+        <p:spPr>
+          <a:xfrm>
+            <a:off x="350067" y="3199101"/>
+            <a:ext cx="501519" cy="521851"/>
+          </a:xfrm>
+          <a:prstGeom prst="rect">
+            <a:avLst/>
+          </a:prstGeom>
+        </p:spPr>
+      </p:pic>
+      <p:sp>
+        <p:nvSpPr>
+          <p:cNvPr id="121" name="TextBox 120">
+            <a:extLst>
+              <a:ext uri="{FF2B5EF4-FFF2-40B4-BE49-F238E27FC236}">
+                <a16:creationId xmlns:a16="http://schemas.microsoft.com/office/drawing/2014/main" id="{E0C2FAD1-C3E2-DF6D-084B-060E50D7CB31}"/>
+              </a:ext>
+            </a:extLst>
+          </p:cNvPr>
+          <p:cNvSpPr txBox="1"/>
+          <p:nvPr/>
+        </p:nvSpPr>
+        <p:spPr>
+          <a:xfrm>
+            <a:off x="367616" y="2972137"/>
+            <a:ext cx="969258" cy="261610"/>
+          </a:xfrm>
+          <a:prstGeom prst="rect">
+            <a:avLst/>
+          </a:prstGeom>
+          <a:noFill/>
+        </p:spPr>
+        <p:txBody>
+          <a:bodyPr wrap="square" rtlCol="0">
+            <a:spAutoFit/>
+          </a:bodyPr>
+          <a:lstStyle/>
+          <a:p>
+            <a:r>
+              <a:rPr lang="en-US" sz="1100" b="1" dirty="0"/>
+              <a:t>User</a:t>
+            </a:r>
+            <a:endParaRPr lang="en-SG" sz="1100" b="1" dirty="0"/>
+          </a:p>
+        </p:txBody>
+      </p:sp>
+      <p:sp>
+        <p:nvSpPr>
+          <p:cNvPr id="122" name="TextBox 121">
+            <a:extLst>
+              <a:ext uri="{FF2B5EF4-FFF2-40B4-BE49-F238E27FC236}">
+                <a16:creationId xmlns:a16="http://schemas.microsoft.com/office/drawing/2014/main" id="{BAB6C9A0-1C65-0442-9300-6A89084BBD99}"/>
+              </a:ext>
+            </a:extLst>
+          </p:cNvPr>
+          <p:cNvSpPr txBox="1"/>
+          <p:nvPr/>
+        </p:nvSpPr>
+        <p:spPr>
+          <a:xfrm>
+            <a:off x="9903406" y="3969439"/>
+            <a:ext cx="1111721" cy="261610"/>
+          </a:xfrm>
+          <a:prstGeom prst="rect">
+            <a:avLst/>
+          </a:prstGeom>
+          <a:noFill/>
+        </p:spPr>
+        <p:txBody>
+          <a:bodyPr wrap="square" rtlCol="0">
+            <a:spAutoFit/>
+          </a:bodyPr>
+          <a:lstStyle/>
+          <a:p>
+            <a:r>
+              <a:rPr lang="en-SG" sz="1100" b="1" dirty="0"/>
+              <a:t>Braccio ++ Arm </a:t>
+            </a:r>
+          </a:p>
+        </p:txBody>
+      </p:sp>
+      <p:pic>
+        <p:nvPicPr>
+          <p:cNvPr id="124" name="Picture 123">
+            <a:extLst>
+              <a:ext uri="{FF2B5EF4-FFF2-40B4-BE49-F238E27FC236}">
+                <a16:creationId xmlns:a16="http://schemas.microsoft.com/office/drawing/2014/main" id="{D6C755F1-C7F0-471A-FA9D-E78E4944B2CF}"/>
+              </a:ext>
+            </a:extLst>
+          </p:cNvPr>
+          <p:cNvPicPr>
+            <a:picLocks noChangeAspect="1"/>
+          </p:cNvPicPr>
+          <p:nvPr/>
+        </p:nvPicPr>
+        <p:blipFill>
+          <a:blip r:embed="rId6"/>
+          <a:stretch>
+            <a:fillRect/>
+          </a:stretch>
+        </p:blipFill>
+        <p:spPr>
+          <a:xfrm>
+            <a:off x="2100780" y="3792331"/>
+            <a:ext cx="266247" cy="345243"/>
+          </a:xfrm>
+          <a:prstGeom prst="rect">
+            <a:avLst/>
+          </a:prstGeom>
+          <a:ln w="6350">
+            <a:solidFill>
+              <a:schemeClr val="tx1"/>
+            </a:solidFill>
+          </a:ln>
+        </p:spPr>
+      </p:pic>
+      <p:sp>
+        <p:nvSpPr>
+          <p:cNvPr id="127" name="TextBox 126">
+            <a:extLst>
+              <a:ext uri="{FF2B5EF4-FFF2-40B4-BE49-F238E27FC236}">
+                <a16:creationId xmlns:a16="http://schemas.microsoft.com/office/drawing/2014/main" id="{B6F4024E-18D4-F674-FF23-C2F948F570B5}"/>
+              </a:ext>
+            </a:extLst>
+          </p:cNvPr>
+          <p:cNvSpPr txBox="1"/>
+          <p:nvPr/>
+        </p:nvSpPr>
+        <p:spPr>
+          <a:xfrm>
+            <a:off x="2311163" y="3753142"/>
+            <a:ext cx="1259776" cy="430887"/>
+          </a:xfrm>
+          <a:prstGeom prst="rect">
+            <a:avLst/>
+          </a:prstGeom>
+          <a:noFill/>
+        </p:spPr>
+        <p:txBody>
+          <a:bodyPr wrap="square" rtlCol="0">
+            <a:spAutoFit/>
+          </a:bodyPr>
+          <a:lstStyle/>
+          <a:p>
+            <a:r>
+              <a:rPr lang="en-US" sz="1100" b="1" dirty="0"/>
+              <a:t>Action playbook config files</a:t>
+            </a:r>
+            <a:endParaRPr lang="en-SG" sz="1100" b="1" dirty="0"/>
+          </a:p>
+        </p:txBody>
+      </p:sp>
+      <p:cxnSp>
+        <p:nvCxnSpPr>
+          <p:cNvPr id="128" name="Straight Arrow Connector 127">
+            <a:extLst>
+              <a:ext uri="{FF2B5EF4-FFF2-40B4-BE49-F238E27FC236}">
+                <a16:creationId xmlns:a16="http://schemas.microsoft.com/office/drawing/2014/main" id="{6B34D674-57F7-A852-DBD0-284CB23D1810}"/>
+              </a:ext>
+            </a:extLst>
+          </p:cNvPr>
+          <p:cNvCxnSpPr>
+            <a:cxnSpLocks/>
+            <a:stCxn id="124" idx="2"/>
+          </p:cNvCxnSpPr>
+          <p:nvPr/>
+        </p:nvCxnSpPr>
+        <p:spPr>
+          <a:xfrm>
+            <a:off x="2233904" y="4137574"/>
+            <a:ext cx="0" cy="285721"/>
+          </a:xfrm>
+          <a:prstGeom prst="straightConnector1">
+            <a:avLst/>
+          </a:prstGeom>
+          <a:ln w="19050">
+            <a:solidFill>
+              <a:schemeClr val="accent6">
+                <a:lumMod val="75000"/>
+              </a:schemeClr>
+            </a:solidFill>
+            <a:prstDash val="sysDash"/>
+            <a:tailEnd type="triangle"/>
+          </a:ln>
+        </p:spPr>
+        <p:style>
+          <a:lnRef idx="1">
+            <a:schemeClr val="accent1"/>
+          </a:lnRef>
+          <a:fillRef idx="0">
+            <a:schemeClr val="accent1"/>
+          </a:fillRef>
+          <a:effectRef idx="0">
+            <a:schemeClr val="accent1"/>
+          </a:effectRef>
+          <a:fontRef idx="minor">
+            <a:schemeClr val="tx1"/>
+          </a:fontRef>
+        </p:style>
+      </p:cxnSp>
+      <p:cxnSp>
+        <p:nvCxnSpPr>
+          <p:cNvPr id="133" name="Straight Arrow Connector 132">
+            <a:extLst>
+              <a:ext uri="{FF2B5EF4-FFF2-40B4-BE49-F238E27FC236}">
+                <a16:creationId xmlns:a16="http://schemas.microsoft.com/office/drawing/2014/main" id="{9CE5BD4D-4A2C-7050-43C5-300ACD61645B}"/>
+              </a:ext>
+            </a:extLst>
+          </p:cNvPr>
+          <p:cNvCxnSpPr>
+            <a:stCxn id="20" idx="1"/>
+            <a:endCxn id="120" idx="3"/>
+          </p:cNvCxnSpPr>
+          <p:nvPr/>
+        </p:nvCxnSpPr>
+        <p:spPr>
+          <a:xfrm flipH="1">
+            <a:off x="851586" y="3458239"/>
+            <a:ext cx="794210" cy="1788"/>
+          </a:xfrm>
+          <a:prstGeom prst="straightConnector1">
+            <a:avLst/>
+          </a:prstGeom>
+          <a:ln>
+            <a:solidFill>
+              <a:srgbClr val="7030A0"/>
+            </a:solidFill>
+            <a:prstDash val="dash"/>
+            <a:tailEnd type="triangle"/>
+          </a:ln>
+        </p:spPr>
+        <p:style>
+          <a:lnRef idx="1">
+            <a:schemeClr val="accent1"/>
+          </a:lnRef>
+          <a:fillRef idx="0">
+            <a:schemeClr val="accent1"/>
+          </a:fillRef>
+          <a:effectRef idx="0">
+            <a:schemeClr val="accent1"/>
+          </a:effectRef>
+          <a:fontRef idx="minor">
+            <a:schemeClr val="tx1"/>
+          </a:fontRef>
+        </p:style>
+      </p:cxnSp>
+      <p:sp>
+        <p:nvSpPr>
+          <p:cNvPr id="135" name="TextBox 134">
+            <a:extLst>
+              <a:ext uri="{FF2B5EF4-FFF2-40B4-BE49-F238E27FC236}">
+                <a16:creationId xmlns:a16="http://schemas.microsoft.com/office/drawing/2014/main" id="{1D012BF7-61DE-C6EC-3459-831189F0B746}"/>
+              </a:ext>
+            </a:extLst>
+          </p:cNvPr>
+          <p:cNvSpPr txBox="1"/>
+          <p:nvPr/>
+        </p:nvSpPr>
+        <p:spPr>
+          <a:xfrm>
+            <a:off x="837613" y="3218861"/>
+            <a:ext cx="486481" cy="261610"/>
+          </a:xfrm>
+          <a:prstGeom prst="rect">
+            <a:avLst/>
+          </a:prstGeom>
+          <a:noFill/>
+        </p:spPr>
+        <p:txBody>
+          <a:bodyPr wrap="square" rtlCol="0">
+            <a:spAutoFit/>
+          </a:bodyPr>
+          <a:lstStyle/>
+          <a:p>
+            <a:r>
+              <a:rPr lang="en-US" sz="1100" b="1" dirty="0"/>
+              <a:t>Read</a:t>
+            </a:r>
+            <a:endParaRPr lang="en-SG" sz="1100" b="1" dirty="0"/>
+          </a:p>
+        </p:txBody>
+      </p:sp>
+      <p:cxnSp>
+        <p:nvCxnSpPr>
+          <p:cNvPr id="137" name="Connector: Elbow 136">
+            <a:extLst>
+              <a:ext uri="{FF2B5EF4-FFF2-40B4-BE49-F238E27FC236}">
+                <a16:creationId xmlns:a16="http://schemas.microsoft.com/office/drawing/2014/main" id="{5884CFA5-1EEE-EC06-0B65-B72757576C6F}"/>
+              </a:ext>
+            </a:extLst>
+          </p:cNvPr>
+          <p:cNvCxnSpPr>
+            <a:stCxn id="120" idx="2"/>
+            <a:endCxn id="14" idx="1"/>
+          </p:cNvCxnSpPr>
+          <p:nvPr/>
+        </p:nvCxnSpPr>
+        <p:spPr>
+          <a:xfrm rot="16200000" flipH="1">
+            <a:off x="562322" y="3759456"/>
+            <a:ext cx="856601" cy="779591"/>
+          </a:xfrm>
+          <a:prstGeom prst="bentConnector2">
+            <a:avLst/>
+          </a:prstGeom>
+          <a:ln>
+            <a:solidFill>
+              <a:srgbClr val="7030A0"/>
+            </a:solidFill>
+            <a:prstDash val="dash"/>
+            <a:tailEnd type="triangle"/>
+          </a:ln>
+        </p:spPr>
+        <p:style>
+          <a:lnRef idx="1">
+            <a:schemeClr val="accent1"/>
+          </a:lnRef>
+          <a:fillRef idx="0">
+            <a:schemeClr val="accent1"/>
+          </a:fillRef>
+          <a:effectRef idx="0">
+            <a:schemeClr val="accent1"/>
+          </a:effectRef>
+          <a:fontRef idx="minor">
+            <a:schemeClr val="tx1"/>
+          </a:fontRef>
+        </p:style>
+      </p:cxnSp>
+      <p:sp>
+        <p:nvSpPr>
+          <p:cNvPr id="138" name="TextBox 137">
+            <a:extLst>
+              <a:ext uri="{FF2B5EF4-FFF2-40B4-BE49-F238E27FC236}">
+                <a16:creationId xmlns:a16="http://schemas.microsoft.com/office/drawing/2014/main" id="{1C28624C-BAD8-FDFF-E1E4-505340ECD68F}"/>
+              </a:ext>
+            </a:extLst>
+          </p:cNvPr>
+          <p:cNvSpPr txBox="1"/>
+          <p:nvPr/>
+        </p:nvSpPr>
+        <p:spPr>
+          <a:xfrm>
+            <a:off x="686610" y="4315943"/>
+            <a:ext cx="616550" cy="261610"/>
+          </a:xfrm>
+          <a:prstGeom prst="rect">
+            <a:avLst/>
+          </a:prstGeom>
+          <a:noFill/>
+        </p:spPr>
+        <p:txBody>
+          <a:bodyPr wrap="square" rtlCol="0">
+            <a:spAutoFit/>
+          </a:bodyPr>
+          <a:lstStyle/>
+          <a:p>
+            <a:r>
+              <a:rPr lang="en-US" sz="1100" b="1" dirty="0"/>
+              <a:t>Change</a:t>
+            </a:r>
+            <a:endParaRPr lang="en-SG" sz="1100" b="1" dirty="0"/>
+          </a:p>
+        </p:txBody>
+      </p:sp>
+      <p:cxnSp>
+        <p:nvCxnSpPr>
+          <p:cNvPr id="139" name="Connector: Elbow 138">
+            <a:extLst>
+              <a:ext uri="{FF2B5EF4-FFF2-40B4-BE49-F238E27FC236}">
+                <a16:creationId xmlns:a16="http://schemas.microsoft.com/office/drawing/2014/main" id="{C3F5D7A1-D723-F16C-9240-66D863A40C82}"/>
+              </a:ext>
+            </a:extLst>
+          </p:cNvPr>
+          <p:cNvCxnSpPr>
+            <a:cxnSpLocks/>
+            <a:endCxn id="124" idx="1"/>
+          </p:cNvCxnSpPr>
+          <p:nvPr/>
+        </p:nvCxnSpPr>
+        <p:spPr>
+          <a:xfrm>
+            <a:off x="753225" y="3720950"/>
+            <a:ext cx="1347555" cy="244003"/>
+          </a:xfrm>
+          <a:prstGeom prst="bentConnector3">
+            <a:avLst>
+              <a:gd name="adj1" fmla="val -214"/>
+            </a:avLst>
+          </a:prstGeom>
+          <a:ln>
+            <a:solidFill>
+              <a:srgbClr val="7030A0"/>
+            </a:solidFill>
+            <a:prstDash val="dash"/>
+            <a:tailEnd type="triangle"/>
+          </a:ln>
+        </p:spPr>
+        <p:style>
+          <a:lnRef idx="1">
+            <a:schemeClr val="accent1"/>
+          </a:lnRef>
+          <a:fillRef idx="0">
+            <a:schemeClr val="accent1"/>
+          </a:fillRef>
+          <a:effectRef idx="0">
+            <a:schemeClr val="accent1"/>
+          </a:effectRef>
+          <a:fontRef idx="minor">
+            <a:schemeClr val="tx1"/>
+          </a:fontRef>
+        </p:style>
+      </p:cxnSp>
+      <p:sp>
+        <p:nvSpPr>
+          <p:cNvPr id="143" name="TextBox 142">
+            <a:extLst>
+              <a:ext uri="{FF2B5EF4-FFF2-40B4-BE49-F238E27FC236}">
+                <a16:creationId xmlns:a16="http://schemas.microsoft.com/office/drawing/2014/main" id="{3B6CF125-C58C-F67B-14F2-03E0F0A88FAC}"/>
+              </a:ext>
+            </a:extLst>
+          </p:cNvPr>
+          <p:cNvSpPr txBox="1"/>
+          <p:nvPr/>
+        </p:nvSpPr>
+        <p:spPr>
+          <a:xfrm>
+            <a:off x="741012" y="3727195"/>
+            <a:ext cx="616550" cy="261610"/>
+          </a:xfrm>
+          <a:prstGeom prst="rect">
+            <a:avLst/>
+          </a:prstGeom>
+          <a:noFill/>
+        </p:spPr>
+        <p:txBody>
+          <a:bodyPr wrap="square" rtlCol="0">
+            <a:spAutoFit/>
+          </a:bodyPr>
+          <a:lstStyle/>
+          <a:p>
+            <a:r>
+              <a:rPr lang="en-US" sz="1100" b="1" dirty="0"/>
+              <a:t>Edit </a:t>
+            </a:r>
+            <a:endParaRPr lang="en-SG" sz="1100" b="1" dirty="0"/>
+          </a:p>
+        </p:txBody>
+      </p:sp>
+      <p:sp>
+        <p:nvSpPr>
+          <p:cNvPr id="144" name="Rectangle 143">
+            <a:extLst>
+              <a:ext uri="{FF2B5EF4-FFF2-40B4-BE49-F238E27FC236}">
+                <a16:creationId xmlns:a16="http://schemas.microsoft.com/office/drawing/2014/main" id="{60C07395-55F8-6D56-7EDF-34A488E9953D}"/>
+              </a:ext>
+            </a:extLst>
+          </p:cNvPr>
+          <p:cNvSpPr/>
+          <p:nvPr/>
+        </p:nvSpPr>
+        <p:spPr>
+          <a:xfrm>
+            <a:off x="1254744" y="1126500"/>
+            <a:ext cx="4788409" cy="4241596"/>
+          </a:xfrm>
+          <a:prstGeom prst="rect">
+            <a:avLst/>
+          </a:prstGeom>
+          <a:noFill/>
+          <a:ln w="12700">
+            <a:solidFill>
+              <a:schemeClr val="accent6">
+                <a:lumMod val="75000"/>
+              </a:schemeClr>
+            </a:solidFill>
+            <a:prstDash val="sysDash"/>
+          </a:ln>
+        </p:spPr>
+        <p:style>
+          <a:lnRef idx="2">
+            <a:schemeClr val="accent6"/>
+          </a:lnRef>
+          <a:fillRef idx="1">
+            <a:schemeClr val="lt1"/>
+          </a:fillRef>
+          <a:effectRef idx="0">
+            <a:schemeClr val="accent6"/>
+          </a:effectRef>
+          <a:fontRef idx="minor">
+            <a:schemeClr val="dk1"/>
+          </a:fontRef>
+        </p:style>
+        <p:txBody>
+          <a:bodyPr rtlCol="0" anchor="ctr"/>
+          <a:lstStyle/>
+          <a:p>
+            <a:pPr algn="ctr"/>
+            <a:endParaRPr lang="en-SG" dirty="0"/>
+          </a:p>
+        </p:txBody>
+      </p:sp>
+      <p:sp>
+        <p:nvSpPr>
+          <p:cNvPr id="145" name="TextBox 144">
+            <a:extLst>
+              <a:ext uri="{FF2B5EF4-FFF2-40B4-BE49-F238E27FC236}">
+                <a16:creationId xmlns:a16="http://schemas.microsoft.com/office/drawing/2014/main" id="{EE10A22C-1863-D498-263E-D2F69B51ACB3}"/>
+              </a:ext>
+            </a:extLst>
+          </p:cNvPr>
+          <p:cNvSpPr txBox="1"/>
+          <p:nvPr/>
+        </p:nvSpPr>
+        <p:spPr>
+          <a:xfrm>
+            <a:off x="1248691" y="846719"/>
+            <a:ext cx="1309453" cy="276999"/>
+          </a:xfrm>
+          <a:prstGeom prst="rect">
+            <a:avLst/>
+          </a:prstGeom>
+          <a:noFill/>
+        </p:spPr>
+        <p:txBody>
+          <a:bodyPr wrap="square" rtlCol="0">
+            <a:spAutoFit/>
+          </a:bodyPr>
+          <a:lstStyle/>
+          <a:p>
+            <a:r>
+              <a:rPr lang="en-US" sz="1200" b="1" dirty="0"/>
+              <a:t>User’s computer </a:t>
+            </a:r>
+            <a:endParaRPr lang="en-SG" sz="1200" b="1" dirty="0"/>
+          </a:p>
+        </p:txBody>
+      </p:sp>
+      <p:sp>
+        <p:nvSpPr>
+          <p:cNvPr id="146" name="Rectangle 145">
+            <a:extLst>
+              <a:ext uri="{FF2B5EF4-FFF2-40B4-BE49-F238E27FC236}">
+                <a16:creationId xmlns:a16="http://schemas.microsoft.com/office/drawing/2014/main" id="{45EE74DE-1F3C-60F1-1C27-E650694ABC90}"/>
+              </a:ext>
+            </a:extLst>
+          </p:cNvPr>
+          <p:cNvSpPr/>
+          <p:nvPr/>
+        </p:nvSpPr>
+        <p:spPr>
+          <a:xfrm>
+            <a:off x="7804594" y="1148937"/>
+            <a:ext cx="2076243" cy="3274358"/>
+          </a:xfrm>
+          <a:prstGeom prst="rect">
+            <a:avLst/>
+          </a:prstGeom>
+          <a:noFill/>
+          <a:ln w="12700">
+            <a:solidFill>
+              <a:schemeClr val="accent6">
+                <a:lumMod val="75000"/>
+              </a:schemeClr>
+            </a:solidFill>
+            <a:prstDash val="sysDash"/>
+          </a:ln>
+        </p:spPr>
+        <p:style>
+          <a:lnRef idx="2">
+            <a:schemeClr val="accent6"/>
+          </a:lnRef>
+          <a:fillRef idx="1">
+            <a:schemeClr val="lt1"/>
+          </a:fillRef>
+          <a:effectRef idx="0">
+            <a:schemeClr val="accent6"/>
+          </a:effectRef>
+          <a:fontRef idx="minor">
+            <a:schemeClr val="dk1"/>
+          </a:fontRef>
+        </p:style>
+        <p:txBody>
+          <a:bodyPr rtlCol="0" anchor="ctr"/>
+          <a:lstStyle/>
+          <a:p>
+            <a:pPr algn="ctr"/>
+            <a:endParaRPr lang="en-SG" dirty="0"/>
+          </a:p>
+        </p:txBody>
+      </p:sp>
+      <p:cxnSp>
+        <p:nvCxnSpPr>
+          <p:cNvPr id="148" name="Connector: Elbow 147">
+            <a:extLst>
+              <a:ext uri="{FF2B5EF4-FFF2-40B4-BE49-F238E27FC236}">
+                <a16:creationId xmlns:a16="http://schemas.microsoft.com/office/drawing/2014/main" id="{762C9696-BF47-8C42-DAEC-5A3EF5E3CBD4}"/>
+              </a:ext>
+            </a:extLst>
+          </p:cNvPr>
+          <p:cNvCxnSpPr>
+            <a:stCxn id="78" idx="2"/>
+            <a:endCxn id="80" idx="1"/>
+          </p:cNvCxnSpPr>
+          <p:nvPr/>
+        </p:nvCxnSpPr>
+        <p:spPr>
+          <a:xfrm rot="16200000" flipH="1">
+            <a:off x="9097047" y="3868296"/>
+            <a:ext cx="589438" cy="1250042"/>
+          </a:xfrm>
+          <a:prstGeom prst="bentConnector2">
+            <a:avLst/>
+          </a:prstGeom>
+          <a:ln>
+            <a:headEnd type="triangle"/>
+            <a:tailEnd type="triangle"/>
+          </a:ln>
+        </p:spPr>
+        <p:style>
+          <a:lnRef idx="1">
+            <a:schemeClr val="accent1"/>
+          </a:lnRef>
+          <a:fillRef idx="0">
+            <a:schemeClr val="accent1"/>
+          </a:fillRef>
+          <a:effectRef idx="0">
+            <a:schemeClr val="accent1"/>
+          </a:effectRef>
+          <a:fontRef idx="minor">
+            <a:schemeClr val="tx1"/>
+          </a:fontRef>
+        </p:style>
+      </p:cxnSp>
+      <p:sp>
+        <p:nvSpPr>
+          <p:cNvPr id="149" name="TextBox 148">
+            <a:extLst>
+              <a:ext uri="{FF2B5EF4-FFF2-40B4-BE49-F238E27FC236}">
+                <a16:creationId xmlns:a16="http://schemas.microsoft.com/office/drawing/2014/main" id="{C8E15B04-748B-A292-F106-373F3A2F32C3}"/>
+              </a:ext>
+            </a:extLst>
+          </p:cNvPr>
+          <p:cNvSpPr txBox="1"/>
+          <p:nvPr/>
+        </p:nvSpPr>
+        <p:spPr>
+          <a:xfrm>
+            <a:off x="7775893" y="816892"/>
+            <a:ext cx="1688935" cy="276999"/>
+          </a:xfrm>
+          <a:prstGeom prst="rect">
+            <a:avLst/>
+          </a:prstGeom>
+          <a:noFill/>
+        </p:spPr>
+        <p:txBody>
+          <a:bodyPr wrap="square" rtlCol="0">
+            <a:spAutoFit/>
+          </a:bodyPr>
+          <a:lstStyle/>
+          <a:p>
+            <a:r>
+              <a:rPr lang="en-US" sz="1200" b="1" dirty="0"/>
+              <a:t>Arduino Nano RP2040</a:t>
+            </a:r>
+            <a:endParaRPr lang="en-SG" sz="1200" b="1" dirty="0"/>
+          </a:p>
+        </p:txBody>
+      </p:sp>
     </p:spTree>
     <p:extLst>
       <p:ext uri="{BB962C8B-B14F-4D97-AF65-F5344CB8AC3E}">

</xml_diff>

<commit_message>
update the design doc and the read me file.
</commit_message>
<xml_diff>
--- a/doc/designDoc.pptx
+++ b/doc/designDoc.pptx
@@ -8778,9 +8778,9 @@
           <p:nvPr/>
         </p:nvCxnSpPr>
         <p:spPr>
-          <a:xfrm>
-            <a:off x="2907989" y="944524"/>
-            <a:ext cx="0" cy="4729110"/>
+          <a:xfrm flipH="1">
+            <a:off x="2906088" y="944524"/>
+            <a:ext cx="1901" cy="4977305"/>
           </a:xfrm>
           <a:prstGeom prst="straightConnector1">
             <a:avLst/>
@@ -8821,7 +8821,7 @@
         </p:nvSpPr>
         <p:spPr>
           <a:xfrm>
-            <a:off x="2322575" y="580909"/>
+            <a:off x="2337299" y="697209"/>
             <a:ext cx="1296281" cy="363615"/>
           </a:xfrm>
           <a:prstGeom prst="rect">
@@ -8849,52 +8849,6 @@
           </a:p>
         </p:txBody>
       </p:sp>
-      <p:sp>
-        <p:nvSpPr>
-          <p:cNvPr id="6" name="TextBox 5">
-            <a:extLst>
-              <a:ext uri="{FF2B5EF4-FFF2-40B4-BE49-F238E27FC236}">
-                <a16:creationId xmlns:a16="http://schemas.microsoft.com/office/drawing/2014/main" id="{0E2DF41D-0B84-26D9-A957-D4BAE948C207}"/>
-              </a:ext>
-            </a:extLst>
-          </p:cNvPr>
-          <p:cNvSpPr txBox="1"/>
-          <p:nvPr/>
-        </p:nvSpPr>
-        <p:spPr>
-          <a:xfrm>
-            <a:off x="6307395" y="540187"/>
-            <a:ext cx="1296282" cy="404337"/>
-          </a:xfrm>
-          <a:prstGeom prst="rect">
-            <a:avLst/>
-          </a:prstGeom>
-          <a:solidFill>
-            <a:schemeClr val="bg1"/>
-          </a:solidFill>
-          <a:ln w="19050">
-            <a:solidFill>
-              <a:srgbClr val="009297"/>
-            </a:solidFill>
-          </a:ln>
-        </p:spPr>
-        <p:txBody>
-          <a:bodyPr wrap="square" lIns="36000" tIns="36000" rIns="36000" bIns="36000" rtlCol="0">
-            <a:noAutofit/>
-          </a:bodyPr>
-          <a:lstStyle/>
-          <a:p>
-            <a:r>
-              <a:rPr lang="en-SG" sz="1100" b="1" dirty="0">
-                <a:solidFill>
-                  <a:srgbClr val="009297"/>
-                </a:solidFill>
-              </a:rPr>
-              <a:t>Braccio ++ Arduino firmware]</a:t>
-            </a:r>
-          </a:p>
-        </p:txBody>
-      </p:sp>
       <p:cxnSp>
         <p:nvCxnSpPr>
           <p:cNvPr id="7" name="Straight Arrow Connector 6">
@@ -8976,7 +8930,7 @@
           <a:p>
             <a:r>
               <a:rPr lang="en-US" sz="1000" dirty="0"/>
-              <a:t>Potentiometer reading fetch loop [no task in queue]</a:t>
+              <a:t>Potentiometer reading fetch [no task in action queue]</a:t>
             </a:r>
             <a:endParaRPr lang="en-SG" sz="1000" dirty="0"/>
           </a:p>
@@ -9201,7 +9155,7 @@
         </p:blipFill>
         <p:spPr>
           <a:xfrm>
-            <a:off x="1673498" y="2143296"/>
+            <a:off x="1335960" y="2130623"/>
             <a:ext cx="273546" cy="284636"/>
           </a:xfrm>
           <a:prstGeom prst="rect">
@@ -9223,7 +9177,7 @@
         </p:nvSpPr>
         <p:spPr>
           <a:xfrm>
-            <a:off x="1150003" y="1914724"/>
+            <a:off x="493666" y="2034149"/>
             <a:ext cx="1063384" cy="400110"/>
           </a:xfrm>
           <a:prstGeom prst="rect">
@@ -9239,7 +9193,7 @@
           <a:p>
             <a:r>
               <a:rPr lang="en-US" sz="1000" b="1" dirty="0"/>
-              <a:t>User control action</a:t>
+              <a:t>User control action added</a:t>
             </a:r>
             <a:endParaRPr lang="en-SG" sz="1000" b="1" dirty="0"/>
           </a:p>
@@ -9261,9 +9215,9 @@
           <p:nvPr/>
         </p:nvCxnSpPr>
         <p:spPr>
-          <a:xfrm>
-            <a:off x="1947044" y="2285614"/>
-            <a:ext cx="914484" cy="0"/>
+          <a:xfrm flipV="1">
+            <a:off x="1609506" y="2252512"/>
+            <a:ext cx="1252022" cy="0"/>
           </a:xfrm>
           <a:prstGeom prst="straightConnector1">
             <a:avLst/>
@@ -9301,7 +9255,7 @@
         </p:nvSpPr>
         <p:spPr>
           <a:xfrm>
-            <a:off x="2322575" y="2515329"/>
+            <a:off x="2322575" y="2427932"/>
             <a:ext cx="1490470" cy="363614"/>
           </a:xfrm>
           <a:prstGeom prst="rect">
@@ -9327,6 +9281,895 @@
               <a:t>Dequeue to get user’s control action </a:t>
             </a:r>
             <a:endParaRPr lang="en-SG" sz="1000" dirty="0"/>
+          </a:p>
+        </p:txBody>
+      </p:sp>
+      <p:cxnSp>
+        <p:nvCxnSpPr>
+          <p:cNvPr id="9" name="Straight Arrow Connector 8">
+            <a:extLst>
+              <a:ext uri="{FF2B5EF4-FFF2-40B4-BE49-F238E27FC236}">
+                <a16:creationId xmlns:a16="http://schemas.microsoft.com/office/drawing/2014/main" id="{FADFA85C-8F7D-3E1F-32BD-8C3768DFE025}"/>
+              </a:ext>
+            </a:extLst>
+          </p:cNvPr>
+          <p:cNvCxnSpPr>
+            <a:cxnSpLocks/>
+          </p:cNvCxnSpPr>
+          <p:nvPr/>
+        </p:nvCxnSpPr>
+        <p:spPr>
+          <a:xfrm>
+            <a:off x="2907989" y="3078437"/>
+            <a:ext cx="4047547" cy="0"/>
+          </a:xfrm>
+          <a:prstGeom prst="straightConnector1">
+            <a:avLst/>
+          </a:prstGeom>
+          <a:ln>
+            <a:tailEnd type="triangle"/>
+          </a:ln>
+        </p:spPr>
+        <p:style>
+          <a:lnRef idx="1">
+            <a:schemeClr val="accent1"/>
+          </a:lnRef>
+          <a:fillRef idx="0">
+            <a:schemeClr val="accent1"/>
+          </a:fillRef>
+          <a:effectRef idx="0">
+            <a:schemeClr val="accent1"/>
+          </a:effectRef>
+          <a:fontRef idx="minor">
+            <a:schemeClr val="tx1"/>
+          </a:fontRef>
+        </p:style>
+      </p:cxnSp>
+      <p:sp>
+        <p:nvSpPr>
+          <p:cNvPr id="11" name="TextBox 10">
+            <a:extLst>
+              <a:ext uri="{FF2B5EF4-FFF2-40B4-BE49-F238E27FC236}">
+                <a16:creationId xmlns:a16="http://schemas.microsoft.com/office/drawing/2014/main" id="{23B9C755-3217-EC63-3346-9AE2B63BE4CE}"/>
+              </a:ext>
+            </a:extLst>
+          </p:cNvPr>
+          <p:cNvSpPr txBox="1"/>
+          <p:nvPr/>
+        </p:nvSpPr>
+        <p:spPr>
+          <a:xfrm>
+            <a:off x="2907989" y="2835896"/>
+            <a:ext cx="1889746" cy="246221"/>
+          </a:xfrm>
+          <a:prstGeom prst="rect">
+            <a:avLst/>
+          </a:prstGeom>
+          <a:noFill/>
+        </p:spPr>
+        <p:txBody>
+          <a:bodyPr wrap="square" rtlCol="0">
+            <a:spAutoFit/>
+          </a:bodyPr>
+          <a:lstStyle/>
+          <a:p>
+            <a:r>
+              <a:rPr lang="en-US" sz="1000" dirty="0"/>
+              <a:t>Servo motor move request</a:t>
+            </a:r>
+            <a:endParaRPr lang="en-SG" sz="1000" dirty="0"/>
+          </a:p>
+        </p:txBody>
+      </p:sp>
+      <p:sp>
+        <p:nvSpPr>
+          <p:cNvPr id="14" name="TextBox 13">
+            <a:extLst>
+              <a:ext uri="{FF2B5EF4-FFF2-40B4-BE49-F238E27FC236}">
+                <a16:creationId xmlns:a16="http://schemas.microsoft.com/office/drawing/2014/main" id="{4368C4EB-8038-A459-63C8-C8429468D656}"/>
+              </a:ext>
+            </a:extLst>
+          </p:cNvPr>
+          <p:cNvSpPr txBox="1"/>
+          <p:nvPr/>
+        </p:nvSpPr>
+        <p:spPr>
+          <a:xfrm>
+            <a:off x="6391656" y="3185751"/>
+            <a:ext cx="1529051" cy="222701"/>
+          </a:xfrm>
+          <a:prstGeom prst="rect">
+            <a:avLst/>
+          </a:prstGeom>
+          <a:solidFill>
+            <a:schemeClr val="bg1"/>
+          </a:solidFill>
+          <a:ln w="9525">
+            <a:solidFill>
+              <a:schemeClr val="tx1"/>
+            </a:solidFill>
+          </a:ln>
+        </p:spPr>
+        <p:txBody>
+          <a:bodyPr wrap="square" lIns="36000" tIns="36000" rIns="36000" bIns="36000" rtlCol="0">
+            <a:noAutofit/>
+          </a:bodyPr>
+          <a:lstStyle/>
+          <a:p>
+            <a:r>
+              <a:rPr lang="en-US" sz="1100" dirty="0"/>
+              <a:t>Braccio++ engage API</a:t>
+            </a:r>
+            <a:endParaRPr lang="en-SG" sz="1100" dirty="0"/>
+          </a:p>
+        </p:txBody>
+      </p:sp>
+      <p:cxnSp>
+        <p:nvCxnSpPr>
+          <p:cNvPr id="19" name="Straight Arrow Connector 18">
+            <a:extLst>
+              <a:ext uri="{FF2B5EF4-FFF2-40B4-BE49-F238E27FC236}">
+                <a16:creationId xmlns:a16="http://schemas.microsoft.com/office/drawing/2014/main" id="{4DE95675-202B-CF2D-5280-C1B4B1007E0F}"/>
+              </a:ext>
+            </a:extLst>
+          </p:cNvPr>
+          <p:cNvCxnSpPr>
+            <a:cxnSpLocks/>
+          </p:cNvCxnSpPr>
+          <p:nvPr/>
+        </p:nvCxnSpPr>
+        <p:spPr>
+          <a:xfrm flipH="1">
+            <a:off x="2954451" y="3498563"/>
+            <a:ext cx="4001085" cy="0"/>
+          </a:xfrm>
+          <a:prstGeom prst="straightConnector1">
+            <a:avLst/>
+          </a:prstGeom>
+          <a:ln>
+            <a:tailEnd type="triangle"/>
+          </a:ln>
+        </p:spPr>
+        <p:style>
+          <a:lnRef idx="1">
+            <a:schemeClr val="accent1"/>
+          </a:lnRef>
+          <a:fillRef idx="0">
+            <a:schemeClr val="accent1"/>
+          </a:fillRef>
+          <a:effectRef idx="0">
+            <a:schemeClr val="accent1"/>
+          </a:effectRef>
+          <a:fontRef idx="minor">
+            <a:schemeClr val="tx1"/>
+          </a:fontRef>
+        </p:style>
+      </p:cxnSp>
+      <p:sp>
+        <p:nvSpPr>
+          <p:cNvPr id="23" name="TextBox 22">
+            <a:extLst>
+              <a:ext uri="{FF2B5EF4-FFF2-40B4-BE49-F238E27FC236}">
+                <a16:creationId xmlns:a16="http://schemas.microsoft.com/office/drawing/2014/main" id="{AF1F8E75-0654-6333-8A0C-EE59CA1D7F81}"/>
+              </a:ext>
+            </a:extLst>
+          </p:cNvPr>
+          <p:cNvSpPr txBox="1"/>
+          <p:nvPr/>
+        </p:nvSpPr>
+        <p:spPr>
+          <a:xfrm>
+            <a:off x="3746915" y="3215010"/>
+            <a:ext cx="2707825" cy="246220"/>
+          </a:xfrm>
+          <a:prstGeom prst="rect">
+            <a:avLst/>
+          </a:prstGeom>
+          <a:noFill/>
+        </p:spPr>
+        <p:txBody>
+          <a:bodyPr wrap="square" rtlCol="0">
+            <a:spAutoFit/>
+          </a:bodyPr>
+          <a:lstStyle/>
+          <a:p>
+            <a:r>
+              <a:rPr lang="en-US" sz="1000" dirty="0"/>
+              <a:t>Respond Arm moved to required angle/position </a:t>
+            </a:r>
+            <a:endParaRPr lang="en-SG" sz="1000" dirty="0"/>
+          </a:p>
+        </p:txBody>
+      </p:sp>
+      <p:cxnSp>
+        <p:nvCxnSpPr>
+          <p:cNvPr id="25" name="Connector: Elbow 24">
+            <a:extLst>
+              <a:ext uri="{FF2B5EF4-FFF2-40B4-BE49-F238E27FC236}">
+                <a16:creationId xmlns:a16="http://schemas.microsoft.com/office/drawing/2014/main" id="{D82E4F94-67B9-6F85-CAC9-517599840E4F}"/>
+              </a:ext>
+            </a:extLst>
+          </p:cNvPr>
+          <p:cNvCxnSpPr>
+            <a:cxnSpLocks/>
+            <a:endCxn id="33" idx="1"/>
+          </p:cNvCxnSpPr>
+          <p:nvPr/>
+        </p:nvCxnSpPr>
+        <p:spPr>
+          <a:xfrm rot="16200000" flipV="1">
+            <a:off x="2147642" y="2784673"/>
+            <a:ext cx="888823" cy="538956"/>
+          </a:xfrm>
+          <a:prstGeom prst="bentConnector4">
+            <a:avLst>
+              <a:gd name="adj1" fmla="val -643"/>
+              <a:gd name="adj2" fmla="val 142415"/>
+            </a:avLst>
+          </a:prstGeom>
+          <a:ln>
+            <a:prstDash val="dash"/>
+            <a:tailEnd type="triangle"/>
+          </a:ln>
+        </p:spPr>
+        <p:style>
+          <a:lnRef idx="1">
+            <a:schemeClr val="dk1"/>
+          </a:lnRef>
+          <a:fillRef idx="0">
+            <a:schemeClr val="dk1"/>
+          </a:fillRef>
+          <a:effectRef idx="0">
+            <a:schemeClr val="dk1"/>
+          </a:effectRef>
+          <a:fontRef idx="minor">
+            <a:schemeClr val="tx1"/>
+          </a:fontRef>
+        </p:style>
+      </p:cxnSp>
+      <p:pic>
+        <p:nvPicPr>
+          <p:cNvPr id="31" name="Picture 30">
+            <a:extLst>
+              <a:ext uri="{FF2B5EF4-FFF2-40B4-BE49-F238E27FC236}">
+                <a16:creationId xmlns:a16="http://schemas.microsoft.com/office/drawing/2014/main" id="{FFE20470-0BB7-13BF-598D-3A964AD793F7}"/>
+              </a:ext>
+            </a:extLst>
+          </p:cNvPr>
+          <p:cNvPicPr>
+            <a:picLocks noChangeAspect="1"/>
+          </p:cNvPicPr>
+          <p:nvPr/>
+        </p:nvPicPr>
+        <p:blipFill>
+          <a:blip r:embed="rId2"/>
+          <a:stretch>
+            <a:fillRect/>
+          </a:stretch>
+        </p:blipFill>
+        <p:spPr>
+          <a:xfrm>
+            <a:off x="1375424" y="3560128"/>
+            <a:ext cx="273546" cy="284636"/>
+          </a:xfrm>
+          <a:prstGeom prst="rect">
+            <a:avLst/>
+          </a:prstGeom>
+        </p:spPr>
+      </p:pic>
+      <p:sp>
+        <p:nvSpPr>
+          <p:cNvPr id="32" name="TextBox 31">
+            <a:extLst>
+              <a:ext uri="{FF2B5EF4-FFF2-40B4-BE49-F238E27FC236}">
+                <a16:creationId xmlns:a16="http://schemas.microsoft.com/office/drawing/2014/main" id="{133A22CF-454B-7432-50E5-53DF830C486E}"/>
+              </a:ext>
+            </a:extLst>
+          </p:cNvPr>
+          <p:cNvSpPr txBox="1"/>
+          <p:nvPr/>
+        </p:nvSpPr>
+        <p:spPr>
+          <a:xfrm>
+            <a:off x="507881" y="3515071"/>
+            <a:ext cx="840525" cy="400110"/>
+          </a:xfrm>
+          <a:prstGeom prst="rect">
+            <a:avLst/>
+          </a:prstGeom>
+          <a:noFill/>
+        </p:spPr>
+        <p:txBody>
+          <a:bodyPr wrap="square" rtlCol="0">
+            <a:spAutoFit/>
+          </a:bodyPr>
+          <a:lstStyle/>
+          <a:p>
+            <a:r>
+              <a:rPr lang="en-US" sz="1000" b="1" dirty="0"/>
+              <a:t>User press reset button</a:t>
+            </a:r>
+            <a:endParaRPr lang="en-SG" sz="1000" b="1" dirty="0"/>
+          </a:p>
+        </p:txBody>
+      </p:sp>
+      <p:cxnSp>
+        <p:nvCxnSpPr>
+          <p:cNvPr id="34" name="Straight Arrow Connector 33">
+            <a:extLst>
+              <a:ext uri="{FF2B5EF4-FFF2-40B4-BE49-F238E27FC236}">
+                <a16:creationId xmlns:a16="http://schemas.microsoft.com/office/drawing/2014/main" id="{B989FBB3-B813-45B1-9B4F-CDD2255C26E6}"/>
+              </a:ext>
+            </a:extLst>
+          </p:cNvPr>
+          <p:cNvCxnSpPr>
+            <a:cxnSpLocks/>
+            <a:stCxn id="31" idx="3"/>
+          </p:cNvCxnSpPr>
+          <p:nvPr/>
+        </p:nvCxnSpPr>
+        <p:spPr>
+          <a:xfrm>
+            <a:off x="1648970" y="3702446"/>
+            <a:ext cx="1257118" cy="0"/>
+          </a:xfrm>
+          <a:prstGeom prst="straightConnector1">
+            <a:avLst/>
+          </a:prstGeom>
+          <a:ln>
+            <a:tailEnd type="triangle"/>
+          </a:ln>
+        </p:spPr>
+        <p:style>
+          <a:lnRef idx="1">
+            <a:schemeClr val="dk1"/>
+          </a:lnRef>
+          <a:fillRef idx="0">
+            <a:schemeClr val="dk1"/>
+          </a:fillRef>
+          <a:effectRef idx="0">
+            <a:schemeClr val="dk1"/>
+          </a:effectRef>
+          <a:fontRef idx="minor">
+            <a:schemeClr val="tx1"/>
+          </a:fontRef>
+        </p:style>
+      </p:cxnSp>
+      <p:sp>
+        <p:nvSpPr>
+          <p:cNvPr id="36" name="TextBox 35">
+            <a:extLst>
+              <a:ext uri="{FF2B5EF4-FFF2-40B4-BE49-F238E27FC236}">
+                <a16:creationId xmlns:a16="http://schemas.microsoft.com/office/drawing/2014/main" id="{27F4ADCC-5C59-8316-BCED-ABEA17196CC2}"/>
+              </a:ext>
+            </a:extLst>
+          </p:cNvPr>
+          <p:cNvSpPr txBox="1"/>
+          <p:nvPr/>
+        </p:nvSpPr>
+        <p:spPr>
+          <a:xfrm>
+            <a:off x="2256445" y="3853170"/>
+            <a:ext cx="1490470" cy="363614"/>
+          </a:xfrm>
+          <a:prstGeom prst="rect">
+            <a:avLst/>
+          </a:prstGeom>
+          <a:solidFill>
+            <a:schemeClr val="bg1"/>
+          </a:solidFill>
+          <a:ln w="9525">
+            <a:solidFill>
+              <a:schemeClr val="tx1"/>
+            </a:solidFill>
+          </a:ln>
+        </p:spPr>
+        <p:txBody>
+          <a:bodyPr wrap="square" lIns="36000" tIns="36000" rIns="36000" bIns="36000" rtlCol="0">
+            <a:noAutofit/>
+          </a:bodyPr>
+          <a:lstStyle/>
+          <a:p>
+            <a:r>
+              <a:rPr lang="en-US" sz="1000" dirty="0"/>
+              <a:t>Clear all the tasks in action queue</a:t>
+            </a:r>
+            <a:endParaRPr lang="en-SG" sz="1000" dirty="0"/>
+          </a:p>
+        </p:txBody>
+      </p:sp>
+      <p:cxnSp>
+        <p:nvCxnSpPr>
+          <p:cNvPr id="37" name="Straight Arrow Connector 36">
+            <a:extLst>
+              <a:ext uri="{FF2B5EF4-FFF2-40B4-BE49-F238E27FC236}">
+                <a16:creationId xmlns:a16="http://schemas.microsoft.com/office/drawing/2014/main" id="{4D7B2BA3-F945-8397-8990-E4253F5126A1}"/>
+              </a:ext>
+            </a:extLst>
+          </p:cNvPr>
+          <p:cNvCxnSpPr>
+            <a:cxnSpLocks/>
+          </p:cNvCxnSpPr>
+          <p:nvPr/>
+        </p:nvCxnSpPr>
+        <p:spPr>
+          <a:xfrm>
+            <a:off x="2906088" y="4508864"/>
+            <a:ext cx="4047547" cy="0"/>
+          </a:xfrm>
+          <a:prstGeom prst="straightConnector1">
+            <a:avLst/>
+          </a:prstGeom>
+          <a:ln>
+            <a:tailEnd type="triangle"/>
+          </a:ln>
+        </p:spPr>
+        <p:style>
+          <a:lnRef idx="1">
+            <a:schemeClr val="accent1"/>
+          </a:lnRef>
+          <a:fillRef idx="0">
+            <a:schemeClr val="accent1"/>
+          </a:fillRef>
+          <a:effectRef idx="0">
+            <a:schemeClr val="accent1"/>
+          </a:effectRef>
+          <a:fontRef idx="minor">
+            <a:schemeClr val="tx1"/>
+          </a:fontRef>
+        </p:style>
+      </p:cxnSp>
+      <p:sp>
+        <p:nvSpPr>
+          <p:cNvPr id="38" name="TextBox 37">
+            <a:extLst>
+              <a:ext uri="{FF2B5EF4-FFF2-40B4-BE49-F238E27FC236}">
+                <a16:creationId xmlns:a16="http://schemas.microsoft.com/office/drawing/2014/main" id="{FF4E8D9D-A118-E8A0-749A-C693DE0D6269}"/>
+              </a:ext>
+            </a:extLst>
+          </p:cNvPr>
+          <p:cNvSpPr txBox="1"/>
+          <p:nvPr/>
+        </p:nvSpPr>
+        <p:spPr>
+          <a:xfrm>
+            <a:off x="2906088" y="4266323"/>
+            <a:ext cx="2196262" cy="246221"/>
+          </a:xfrm>
+          <a:prstGeom prst="rect">
+            <a:avLst/>
+          </a:prstGeom>
+          <a:noFill/>
+        </p:spPr>
+        <p:txBody>
+          <a:bodyPr wrap="square" rtlCol="0">
+            <a:spAutoFit/>
+          </a:bodyPr>
+          <a:lstStyle/>
+          <a:p>
+            <a:r>
+              <a:rPr lang="en-US" sz="1000" dirty="0"/>
+              <a:t>All moto change to default position </a:t>
+            </a:r>
+            <a:endParaRPr lang="en-SG" sz="1000" dirty="0"/>
+          </a:p>
+        </p:txBody>
+      </p:sp>
+      <p:pic>
+        <p:nvPicPr>
+          <p:cNvPr id="39" name="Picture 38">
+            <a:extLst>
+              <a:ext uri="{FF2B5EF4-FFF2-40B4-BE49-F238E27FC236}">
+                <a16:creationId xmlns:a16="http://schemas.microsoft.com/office/drawing/2014/main" id="{25A8EE79-405D-D240-8648-E2739DA6391C}"/>
+              </a:ext>
+            </a:extLst>
+          </p:cNvPr>
+          <p:cNvPicPr>
+            <a:picLocks noChangeAspect="1"/>
+          </p:cNvPicPr>
+          <p:nvPr/>
+        </p:nvPicPr>
+        <p:blipFill>
+          <a:blip r:embed="rId2"/>
+          <a:stretch>
+            <a:fillRect/>
+          </a:stretch>
+        </p:blipFill>
+        <p:spPr>
+          <a:xfrm>
+            <a:off x="1490917" y="4494817"/>
+            <a:ext cx="273546" cy="284636"/>
+          </a:xfrm>
+          <a:prstGeom prst="rect">
+            <a:avLst/>
+          </a:prstGeom>
+        </p:spPr>
+      </p:pic>
+      <p:sp>
+        <p:nvSpPr>
+          <p:cNvPr id="40" name="TextBox 39">
+            <a:extLst>
+              <a:ext uri="{FF2B5EF4-FFF2-40B4-BE49-F238E27FC236}">
+                <a16:creationId xmlns:a16="http://schemas.microsoft.com/office/drawing/2014/main" id="{42713527-DF24-14F7-8C76-ECEBAF976FDB}"/>
+              </a:ext>
+            </a:extLst>
+          </p:cNvPr>
+          <p:cNvSpPr txBox="1"/>
+          <p:nvPr/>
+        </p:nvSpPr>
+        <p:spPr>
+          <a:xfrm>
+            <a:off x="540518" y="4425692"/>
+            <a:ext cx="1068988" cy="400110"/>
+          </a:xfrm>
+          <a:prstGeom prst="rect">
+            <a:avLst/>
+          </a:prstGeom>
+          <a:noFill/>
+        </p:spPr>
+        <p:txBody>
+          <a:bodyPr wrap="square" rtlCol="0">
+            <a:spAutoFit/>
+          </a:bodyPr>
+          <a:lstStyle/>
+          <a:p>
+            <a:r>
+              <a:rPr lang="en-US" sz="1000" b="1" dirty="0"/>
+              <a:t>User load an action play book </a:t>
+            </a:r>
+            <a:endParaRPr lang="en-SG" sz="1000" b="1" dirty="0"/>
+          </a:p>
+        </p:txBody>
+      </p:sp>
+      <p:cxnSp>
+        <p:nvCxnSpPr>
+          <p:cNvPr id="41" name="Straight Arrow Connector 40">
+            <a:extLst>
+              <a:ext uri="{FF2B5EF4-FFF2-40B4-BE49-F238E27FC236}">
+                <a16:creationId xmlns:a16="http://schemas.microsoft.com/office/drawing/2014/main" id="{5F1041BA-5D55-CF3E-029C-580F7A6B3867}"/>
+              </a:ext>
+            </a:extLst>
+          </p:cNvPr>
+          <p:cNvCxnSpPr>
+            <a:cxnSpLocks/>
+            <a:stCxn id="39" idx="3"/>
+          </p:cNvCxnSpPr>
+          <p:nvPr/>
+        </p:nvCxnSpPr>
+        <p:spPr>
+          <a:xfrm>
+            <a:off x="1764463" y="4637135"/>
+            <a:ext cx="1152955" cy="0"/>
+          </a:xfrm>
+          <a:prstGeom prst="straightConnector1">
+            <a:avLst/>
+          </a:prstGeom>
+          <a:ln>
+            <a:tailEnd type="triangle"/>
+          </a:ln>
+        </p:spPr>
+        <p:style>
+          <a:lnRef idx="1">
+            <a:schemeClr val="dk1"/>
+          </a:lnRef>
+          <a:fillRef idx="0">
+            <a:schemeClr val="dk1"/>
+          </a:fillRef>
+          <a:effectRef idx="0">
+            <a:schemeClr val="dk1"/>
+          </a:effectRef>
+          <a:fontRef idx="minor">
+            <a:schemeClr val="tx1"/>
+          </a:fontRef>
+        </p:style>
+      </p:cxnSp>
+      <p:sp>
+        <p:nvSpPr>
+          <p:cNvPr id="42" name="TextBox 41">
+            <a:extLst>
+              <a:ext uri="{FF2B5EF4-FFF2-40B4-BE49-F238E27FC236}">
+                <a16:creationId xmlns:a16="http://schemas.microsoft.com/office/drawing/2014/main" id="{8C402052-CDBF-3CEE-4072-D55E4F4A369A}"/>
+              </a:ext>
+            </a:extLst>
+          </p:cNvPr>
+          <p:cNvSpPr txBox="1"/>
+          <p:nvPr/>
+        </p:nvSpPr>
+        <p:spPr>
+          <a:xfrm>
+            <a:off x="2238191" y="4761512"/>
+            <a:ext cx="1666833" cy="363614"/>
+          </a:xfrm>
+          <a:prstGeom prst="rect">
+            <a:avLst/>
+          </a:prstGeom>
+          <a:solidFill>
+            <a:schemeClr val="bg1"/>
+          </a:solidFill>
+          <a:ln w="9525">
+            <a:solidFill>
+              <a:schemeClr val="tx1"/>
+            </a:solidFill>
+          </a:ln>
+        </p:spPr>
+        <p:txBody>
+          <a:bodyPr wrap="square" lIns="36000" tIns="36000" rIns="36000" bIns="36000" rtlCol="0">
+            <a:noAutofit/>
+          </a:bodyPr>
+          <a:lstStyle/>
+          <a:p>
+            <a:r>
+              <a:rPr lang="en-US" sz="1000" dirty="0"/>
+              <a:t>Check task queue have enough slots to hold playbook</a:t>
+            </a:r>
+            <a:endParaRPr lang="en-SG" sz="1000" dirty="0"/>
+          </a:p>
+        </p:txBody>
+      </p:sp>
+      <p:sp>
+        <p:nvSpPr>
+          <p:cNvPr id="43" name="TextBox 42">
+            <a:extLst>
+              <a:ext uri="{FF2B5EF4-FFF2-40B4-BE49-F238E27FC236}">
+                <a16:creationId xmlns:a16="http://schemas.microsoft.com/office/drawing/2014/main" id="{CC982DDB-14CF-21BE-3131-71960C87983A}"/>
+              </a:ext>
+            </a:extLst>
+          </p:cNvPr>
+          <p:cNvSpPr txBox="1"/>
+          <p:nvPr/>
+        </p:nvSpPr>
+        <p:spPr>
+          <a:xfrm>
+            <a:off x="2238191" y="5249502"/>
+            <a:ext cx="1664931" cy="239239"/>
+          </a:xfrm>
+          <a:prstGeom prst="rect">
+            <a:avLst/>
+          </a:prstGeom>
+          <a:solidFill>
+            <a:schemeClr val="bg1"/>
+          </a:solidFill>
+          <a:ln w="9525">
+            <a:solidFill>
+              <a:schemeClr val="tx1"/>
+            </a:solidFill>
+          </a:ln>
+        </p:spPr>
+        <p:txBody>
+          <a:bodyPr wrap="square" lIns="36000" tIns="36000" rIns="36000" bIns="36000" rtlCol="0">
+            <a:noAutofit/>
+          </a:bodyPr>
+          <a:lstStyle/>
+          <a:p>
+            <a:r>
+              <a:rPr lang="en-US" sz="1000" dirty="0"/>
+              <a:t>Put all playbook tasks in queue</a:t>
+            </a:r>
+            <a:endParaRPr lang="en-SG" sz="1000" dirty="0"/>
+          </a:p>
+        </p:txBody>
+      </p:sp>
+      <p:cxnSp>
+        <p:nvCxnSpPr>
+          <p:cNvPr id="46" name="Connector: Elbow 45">
+            <a:extLst>
+              <a:ext uri="{FF2B5EF4-FFF2-40B4-BE49-F238E27FC236}">
+                <a16:creationId xmlns:a16="http://schemas.microsoft.com/office/drawing/2014/main" id="{9754474A-761B-1774-E8D1-DECBA1EDAD63}"/>
+              </a:ext>
+            </a:extLst>
+          </p:cNvPr>
+          <p:cNvCxnSpPr>
+            <a:cxnSpLocks/>
+            <a:stCxn id="43" idx="1"/>
+          </p:cNvCxnSpPr>
+          <p:nvPr/>
+        </p:nvCxnSpPr>
+        <p:spPr>
+          <a:xfrm rot="10800000" flipH="1">
+            <a:off x="2238190" y="2461240"/>
+            <a:ext cx="78679" cy="2907882"/>
+          </a:xfrm>
+          <a:prstGeom prst="bentConnector4">
+            <a:avLst>
+              <a:gd name="adj1" fmla="val -290548"/>
+              <a:gd name="adj2" fmla="val 99600"/>
+            </a:avLst>
+          </a:prstGeom>
+          <a:ln>
+            <a:prstDash val="dash"/>
+            <a:tailEnd type="triangle"/>
+          </a:ln>
+        </p:spPr>
+        <p:style>
+          <a:lnRef idx="1">
+            <a:schemeClr val="dk1"/>
+          </a:lnRef>
+          <a:fillRef idx="0">
+            <a:schemeClr val="dk1"/>
+          </a:fillRef>
+          <a:effectRef idx="0">
+            <a:schemeClr val="dk1"/>
+          </a:effectRef>
+          <a:fontRef idx="minor">
+            <a:schemeClr val="tx1"/>
+          </a:fontRef>
+        </p:style>
+      </p:cxnSp>
+      <p:cxnSp>
+        <p:nvCxnSpPr>
+          <p:cNvPr id="61" name="Connector: Elbow 60">
+            <a:extLst>
+              <a:ext uri="{FF2B5EF4-FFF2-40B4-BE49-F238E27FC236}">
+                <a16:creationId xmlns:a16="http://schemas.microsoft.com/office/drawing/2014/main" id="{369AE61F-B0C7-C8E5-CC55-1EB46E92A3FC}"/>
+              </a:ext>
+            </a:extLst>
+          </p:cNvPr>
+          <p:cNvCxnSpPr>
+            <a:cxnSpLocks/>
+            <a:endCxn id="10" idx="1"/>
+          </p:cNvCxnSpPr>
+          <p:nvPr/>
+        </p:nvCxnSpPr>
+        <p:spPr>
+          <a:xfrm rot="16200000" flipV="1">
+            <a:off x="659656" y="3524898"/>
+            <a:ext cx="3907451" cy="581612"/>
+          </a:xfrm>
+          <a:prstGeom prst="bentConnector4">
+            <a:avLst>
+              <a:gd name="adj1" fmla="val 3378"/>
+              <a:gd name="adj2" fmla="val 180482"/>
+            </a:avLst>
+          </a:prstGeom>
+          <a:ln>
+            <a:prstDash val="dash"/>
+            <a:tailEnd type="triangle"/>
+          </a:ln>
+        </p:spPr>
+        <p:style>
+          <a:lnRef idx="1">
+            <a:schemeClr val="dk1"/>
+          </a:lnRef>
+          <a:fillRef idx="0">
+            <a:schemeClr val="dk1"/>
+          </a:fillRef>
+          <a:effectRef idx="0">
+            <a:schemeClr val="dk1"/>
+          </a:effectRef>
+          <a:fontRef idx="minor">
+            <a:schemeClr val="tx1"/>
+          </a:fontRef>
+        </p:style>
+      </p:cxnSp>
+      <p:sp>
+        <p:nvSpPr>
+          <p:cNvPr id="6" name="TextBox 5">
+            <a:extLst>
+              <a:ext uri="{FF2B5EF4-FFF2-40B4-BE49-F238E27FC236}">
+                <a16:creationId xmlns:a16="http://schemas.microsoft.com/office/drawing/2014/main" id="{0E2DF41D-0B84-26D9-A957-D4BAE948C207}"/>
+              </a:ext>
+            </a:extLst>
+          </p:cNvPr>
+          <p:cNvSpPr txBox="1"/>
+          <p:nvPr/>
+        </p:nvSpPr>
+        <p:spPr>
+          <a:xfrm>
+            <a:off x="6391654" y="733340"/>
+            <a:ext cx="1296282" cy="404337"/>
+          </a:xfrm>
+          <a:prstGeom prst="rect">
+            <a:avLst/>
+          </a:prstGeom>
+          <a:solidFill>
+            <a:schemeClr val="bg1"/>
+          </a:solidFill>
+          <a:ln w="19050">
+            <a:solidFill>
+              <a:srgbClr val="009297"/>
+            </a:solidFill>
+          </a:ln>
+        </p:spPr>
+        <p:txBody>
+          <a:bodyPr wrap="square" lIns="36000" tIns="36000" rIns="36000" bIns="36000" rtlCol="0">
+            <a:noAutofit/>
+          </a:bodyPr>
+          <a:lstStyle/>
+          <a:p>
+            <a:r>
+              <a:rPr lang="en-SG" sz="1100" b="1" dirty="0">
+                <a:solidFill>
+                  <a:srgbClr val="009297"/>
+                </a:solidFill>
+              </a:rPr>
+              <a:t>Braccio ++ Arduino firmware]</a:t>
+            </a:r>
+          </a:p>
+        </p:txBody>
+      </p:sp>
+      <p:sp>
+        <p:nvSpPr>
+          <p:cNvPr id="70" name="TextBox 69">
+            <a:extLst>
+              <a:ext uri="{FF2B5EF4-FFF2-40B4-BE49-F238E27FC236}">
+                <a16:creationId xmlns:a16="http://schemas.microsoft.com/office/drawing/2014/main" id="{2B744C9D-077F-3431-4F3F-0DDE92B9B293}"/>
+              </a:ext>
+            </a:extLst>
+          </p:cNvPr>
+          <p:cNvSpPr txBox="1"/>
+          <p:nvPr/>
+        </p:nvSpPr>
+        <p:spPr>
+          <a:xfrm>
+            <a:off x="2316869" y="1237138"/>
+            <a:ext cx="1133902" cy="234305"/>
+          </a:xfrm>
+          <a:prstGeom prst="rect">
+            <a:avLst/>
+          </a:prstGeom>
+          <a:solidFill>
+            <a:schemeClr val="bg1"/>
+          </a:solidFill>
+          <a:ln w="9525">
+            <a:solidFill>
+              <a:schemeClr val="tx1"/>
+            </a:solidFill>
+          </a:ln>
+        </p:spPr>
+        <p:txBody>
+          <a:bodyPr wrap="square" lIns="36000" tIns="36000" rIns="36000" bIns="36000" rtlCol="0">
+            <a:noAutofit/>
+          </a:bodyPr>
+          <a:lstStyle/>
+          <a:p>
+            <a:r>
+              <a:rPr lang="en-US" sz="1100" dirty="0"/>
+              <a:t>Program initialize </a:t>
+            </a:r>
+            <a:endParaRPr lang="en-SG" sz="1100" dirty="0"/>
+          </a:p>
+        </p:txBody>
+      </p:sp>
+      <p:sp>
+        <p:nvSpPr>
+          <p:cNvPr id="71" name="TextBox 70">
+            <a:extLst>
+              <a:ext uri="{FF2B5EF4-FFF2-40B4-BE49-F238E27FC236}">
+                <a16:creationId xmlns:a16="http://schemas.microsoft.com/office/drawing/2014/main" id="{3F5A4AC1-26D6-4A56-5154-A73EAE5F3D09}"/>
+              </a:ext>
+            </a:extLst>
+          </p:cNvPr>
+          <p:cNvSpPr txBox="1"/>
+          <p:nvPr/>
+        </p:nvSpPr>
+        <p:spPr>
+          <a:xfrm>
+            <a:off x="6386395" y="1252690"/>
+            <a:ext cx="1613311" cy="222701"/>
+          </a:xfrm>
+          <a:prstGeom prst="rect">
+            <a:avLst/>
+          </a:prstGeom>
+          <a:solidFill>
+            <a:schemeClr val="bg1"/>
+          </a:solidFill>
+          <a:ln w="9525">
+            <a:solidFill>
+              <a:schemeClr val="tx1"/>
+            </a:solidFill>
+          </a:ln>
+        </p:spPr>
+        <p:txBody>
+          <a:bodyPr wrap="square" lIns="36000" tIns="36000" rIns="36000" bIns="36000" rtlCol="0">
+            <a:noAutofit/>
+          </a:bodyPr>
+          <a:lstStyle/>
+          <a:p>
+            <a:r>
+              <a:rPr lang="en-US" sz="1100" dirty="0"/>
+              <a:t>Arduino Setup [Carrier API] </a:t>
+            </a:r>
+            <a:endParaRPr lang="en-SG" sz="1100" dirty="0"/>
           </a:p>
         </p:txBody>
       </p:sp>

</xml_diff>

<commit_message>
update the design doc, readme and the code document.
</commit_message>
<xml_diff>
--- a/doc/designDoc.pptx
+++ b/doc/designDoc.pptx
@@ -9,6 +9,8 @@
     <p:sldId id="257" r:id="rId3"/>
     <p:sldId id="258" r:id="rId4"/>
     <p:sldId id="259" r:id="rId5"/>
+    <p:sldId id="260" r:id="rId6"/>
+    <p:sldId id="261" r:id="rId7"/>
   </p:sldIdLst>
   <p:sldSz cx="12192000" cy="6858000"/>
   <p:notesSz cx="6858000" cy="9144000"/>
@@ -264,7 +266,7 @@
           <a:p>
             <a:fld id="{812C36AB-F3D7-405F-BF47-DB86BB3C67A5}" type="datetimeFigureOut">
               <a:rPr lang="en-SG" smtClean="0"/>
-              <a:t>4/11/2023</a:t>
+              <a:t>5/11/2023</a:t>
             </a:fld>
             <a:endParaRPr lang="en-SG"/>
           </a:p>
@@ -464,7 +466,7 @@
           <a:p>
             <a:fld id="{812C36AB-F3D7-405F-BF47-DB86BB3C67A5}" type="datetimeFigureOut">
               <a:rPr lang="en-SG" smtClean="0"/>
-              <a:t>4/11/2023</a:t>
+              <a:t>5/11/2023</a:t>
             </a:fld>
             <a:endParaRPr lang="en-SG"/>
           </a:p>
@@ -674,7 +676,7 @@
           <a:p>
             <a:fld id="{812C36AB-F3D7-405F-BF47-DB86BB3C67A5}" type="datetimeFigureOut">
               <a:rPr lang="en-SG" smtClean="0"/>
-              <a:t>4/11/2023</a:t>
+              <a:t>5/11/2023</a:t>
             </a:fld>
             <a:endParaRPr lang="en-SG"/>
           </a:p>
@@ -874,7 +876,7 @@
           <a:p>
             <a:fld id="{812C36AB-F3D7-405F-BF47-DB86BB3C67A5}" type="datetimeFigureOut">
               <a:rPr lang="en-SG" smtClean="0"/>
-              <a:t>4/11/2023</a:t>
+              <a:t>5/11/2023</a:t>
             </a:fld>
             <a:endParaRPr lang="en-SG"/>
           </a:p>
@@ -1150,7 +1152,7 @@
           <a:p>
             <a:fld id="{812C36AB-F3D7-405F-BF47-DB86BB3C67A5}" type="datetimeFigureOut">
               <a:rPr lang="en-SG" smtClean="0"/>
-              <a:t>4/11/2023</a:t>
+              <a:t>5/11/2023</a:t>
             </a:fld>
             <a:endParaRPr lang="en-SG"/>
           </a:p>
@@ -1418,7 +1420,7 @@
           <a:p>
             <a:fld id="{812C36AB-F3D7-405F-BF47-DB86BB3C67A5}" type="datetimeFigureOut">
               <a:rPr lang="en-SG" smtClean="0"/>
-              <a:t>4/11/2023</a:t>
+              <a:t>5/11/2023</a:t>
             </a:fld>
             <a:endParaRPr lang="en-SG"/>
           </a:p>
@@ -1833,7 +1835,7 @@
           <a:p>
             <a:fld id="{812C36AB-F3D7-405F-BF47-DB86BB3C67A5}" type="datetimeFigureOut">
               <a:rPr lang="en-SG" smtClean="0"/>
-              <a:t>4/11/2023</a:t>
+              <a:t>5/11/2023</a:t>
             </a:fld>
             <a:endParaRPr lang="en-SG"/>
           </a:p>
@@ -1975,7 +1977,7 @@
           <a:p>
             <a:fld id="{812C36AB-F3D7-405F-BF47-DB86BB3C67A5}" type="datetimeFigureOut">
               <a:rPr lang="en-SG" smtClean="0"/>
-              <a:t>4/11/2023</a:t>
+              <a:t>5/11/2023</a:t>
             </a:fld>
             <a:endParaRPr lang="en-SG"/>
           </a:p>
@@ -2088,7 +2090,7 @@
           <a:p>
             <a:fld id="{812C36AB-F3D7-405F-BF47-DB86BB3C67A5}" type="datetimeFigureOut">
               <a:rPr lang="en-SG" smtClean="0"/>
-              <a:t>4/11/2023</a:t>
+              <a:t>5/11/2023</a:t>
             </a:fld>
             <a:endParaRPr lang="en-SG"/>
           </a:p>
@@ -2401,7 +2403,7 @@
           <a:p>
             <a:fld id="{812C36AB-F3D7-405F-BF47-DB86BB3C67A5}" type="datetimeFigureOut">
               <a:rPr lang="en-SG" smtClean="0"/>
-              <a:t>4/11/2023</a:t>
+              <a:t>5/11/2023</a:t>
             </a:fld>
             <a:endParaRPr lang="en-SG"/>
           </a:p>
@@ -2690,7 +2692,7 @@
           <a:p>
             <a:fld id="{812C36AB-F3D7-405F-BF47-DB86BB3C67A5}" type="datetimeFigureOut">
               <a:rPr lang="en-SG" smtClean="0"/>
-              <a:t>4/11/2023</a:t>
+              <a:t>5/11/2023</a:t>
             </a:fld>
             <a:endParaRPr lang="en-SG"/>
           </a:p>
@@ -2933,7 +2935,7 @@
           <a:p>
             <a:fld id="{812C36AB-F3D7-405F-BF47-DB86BB3C67A5}" type="datetimeFigureOut">
               <a:rPr lang="en-SG" smtClean="0"/>
-              <a:t>4/11/2023</a:t>
+              <a:t>5/11/2023</a:t>
             </a:fld>
             <a:endParaRPr lang="en-SG"/>
           </a:p>
@@ -10186,6 +10188,382 @@
 </p:sld>
 </file>
 
+<file path=ppt/slides/slide5.xml><?xml version="1.0" encoding="utf-8"?>
+<p:sld xmlns:a="http://schemas.openxmlformats.org/drawingml/2006/main" xmlns:r="http://schemas.openxmlformats.org/officeDocument/2006/relationships" xmlns:p="http://schemas.openxmlformats.org/presentationml/2006/main">
+  <p:cSld>
+    <p:spTree>
+      <p:nvGrpSpPr>
+        <p:cNvPr id="1" name=""/>
+        <p:cNvGrpSpPr/>
+        <p:nvPr/>
+      </p:nvGrpSpPr>
+      <p:grpSpPr>
+        <a:xfrm>
+          <a:off x="0" y="0"/>
+          <a:ext cx="0" cy="0"/>
+          <a:chOff x="0" y="0"/>
+          <a:chExt cx="0" cy="0"/>
+        </a:xfrm>
+      </p:grpSpPr>
+      <p:pic>
+        <p:nvPicPr>
+          <p:cNvPr id="5" name="Picture 4">
+            <a:extLst>
+              <a:ext uri="{FF2B5EF4-FFF2-40B4-BE49-F238E27FC236}">
+                <a16:creationId xmlns:a16="http://schemas.microsoft.com/office/drawing/2014/main" id="{FE83BC66-A2DC-814F-6E20-2874E15B007F}"/>
+              </a:ext>
+            </a:extLst>
+          </p:cNvPr>
+          <p:cNvPicPr>
+            <a:picLocks noChangeAspect="1"/>
+          </p:cNvPicPr>
+          <p:nvPr/>
+        </p:nvPicPr>
+        <p:blipFill>
+          <a:blip r:embed="rId2"/>
+          <a:stretch>
+            <a:fillRect/>
+          </a:stretch>
+        </p:blipFill>
+        <p:spPr>
+          <a:xfrm>
+            <a:off x="780698" y="1001485"/>
+            <a:ext cx="2618921" cy="4855029"/>
+          </a:xfrm>
+          <a:prstGeom prst="rect">
+            <a:avLst/>
+          </a:prstGeom>
+        </p:spPr>
+      </p:pic>
+      <p:pic>
+        <p:nvPicPr>
+          <p:cNvPr id="7" name="Picture 6">
+            <a:extLst>
+              <a:ext uri="{FF2B5EF4-FFF2-40B4-BE49-F238E27FC236}">
+                <a16:creationId xmlns:a16="http://schemas.microsoft.com/office/drawing/2014/main" id="{A7AE5916-71B2-A1D3-5BA3-5A3C4D8160EA}"/>
+              </a:ext>
+            </a:extLst>
+          </p:cNvPr>
+          <p:cNvPicPr>
+            <a:picLocks noChangeAspect="1"/>
+          </p:cNvPicPr>
+          <p:nvPr/>
+        </p:nvPicPr>
+        <p:blipFill>
+          <a:blip r:embed="rId3"/>
+          <a:stretch>
+            <a:fillRect/>
+          </a:stretch>
+        </p:blipFill>
+        <p:spPr>
+          <a:xfrm>
+            <a:off x="3649001" y="1001485"/>
+            <a:ext cx="8584254" cy="4855029"/>
+          </a:xfrm>
+          <a:prstGeom prst="rect">
+            <a:avLst/>
+          </a:prstGeom>
+        </p:spPr>
+      </p:pic>
+      <p:sp>
+        <p:nvSpPr>
+          <p:cNvPr id="8" name="TextBox 7">
+            <a:extLst>
+              <a:ext uri="{FF2B5EF4-FFF2-40B4-BE49-F238E27FC236}">
+                <a16:creationId xmlns:a16="http://schemas.microsoft.com/office/drawing/2014/main" id="{B263592E-FB6E-9CC5-27DB-DFD6A85740F0}"/>
+              </a:ext>
+            </a:extLst>
+          </p:cNvPr>
+          <p:cNvSpPr txBox="1"/>
+          <p:nvPr/>
+        </p:nvSpPr>
+        <p:spPr>
+          <a:xfrm>
+            <a:off x="1697779" y="4932068"/>
+            <a:ext cx="1388107" cy="400110"/>
+          </a:xfrm>
+          <a:prstGeom prst="rect">
+            <a:avLst/>
+          </a:prstGeom>
+          <a:noFill/>
+        </p:spPr>
+        <p:txBody>
+          <a:bodyPr wrap="square" rtlCol="0">
+            <a:spAutoFit/>
+          </a:bodyPr>
+          <a:lstStyle/>
+          <a:p>
+            <a:r>
+              <a:rPr lang="en-US" sz="1000" b="1" dirty="0"/>
+              <a:t>Arm action playbook execution button</a:t>
+            </a:r>
+            <a:endParaRPr lang="en-SG" sz="1000" b="1" dirty="0"/>
+          </a:p>
+        </p:txBody>
+      </p:sp>
+      <p:sp>
+        <p:nvSpPr>
+          <p:cNvPr id="9" name="TextBox 8">
+            <a:extLst>
+              <a:ext uri="{FF2B5EF4-FFF2-40B4-BE49-F238E27FC236}">
+                <a16:creationId xmlns:a16="http://schemas.microsoft.com/office/drawing/2014/main" id="{86838FF3-8D65-7744-8962-8A118D0483AB}"/>
+              </a:ext>
+            </a:extLst>
+          </p:cNvPr>
+          <p:cNvSpPr txBox="1"/>
+          <p:nvPr/>
+        </p:nvSpPr>
+        <p:spPr>
+          <a:xfrm>
+            <a:off x="780698" y="601374"/>
+            <a:ext cx="2305188" cy="276999"/>
+          </a:xfrm>
+          <a:prstGeom prst="rect">
+            <a:avLst/>
+          </a:prstGeom>
+          <a:noFill/>
+        </p:spPr>
+        <p:txBody>
+          <a:bodyPr wrap="square" rtlCol="0">
+            <a:spAutoFit/>
+          </a:bodyPr>
+          <a:lstStyle/>
+          <a:p>
+            <a:r>
+              <a:rPr lang="en-SG" sz="1200" b="1" i="0" dirty="0">
+                <a:solidFill>
+                  <a:srgbClr val="000000"/>
+                </a:solidFill>
+                <a:effectLst/>
+                <a:latin typeface="Open Sans" panose="020B0606030504020204" pitchFamily="34" charset="0"/>
+              </a:rPr>
+              <a:t>Assemble Braccio++ Arm </a:t>
+            </a:r>
+          </a:p>
+        </p:txBody>
+      </p:sp>
+      <p:sp>
+        <p:nvSpPr>
+          <p:cNvPr id="10" name="TextBox 9">
+            <a:extLst>
+              <a:ext uri="{FF2B5EF4-FFF2-40B4-BE49-F238E27FC236}">
+                <a16:creationId xmlns:a16="http://schemas.microsoft.com/office/drawing/2014/main" id="{822F8D51-90D6-93A4-F7E8-F8F2C82F62D3}"/>
+              </a:ext>
+            </a:extLst>
+          </p:cNvPr>
+          <p:cNvSpPr txBox="1"/>
+          <p:nvPr/>
+        </p:nvSpPr>
+        <p:spPr>
+          <a:xfrm>
+            <a:off x="3649001" y="601374"/>
+            <a:ext cx="3524388" cy="276999"/>
+          </a:xfrm>
+          <a:prstGeom prst="rect">
+            <a:avLst/>
+          </a:prstGeom>
+          <a:noFill/>
+        </p:spPr>
+        <p:txBody>
+          <a:bodyPr wrap="square" rtlCol="0">
+            <a:spAutoFit/>
+          </a:bodyPr>
+          <a:lstStyle/>
+          <a:p>
+            <a:r>
+              <a:rPr lang="en-US" sz="1200" b="1" i="0" dirty="0">
+                <a:solidFill>
+                  <a:srgbClr val="000000"/>
+                </a:solidFill>
+                <a:effectLst/>
+                <a:latin typeface="Open Sans" panose="020B0606030504020204" pitchFamily="34" charset="0"/>
+              </a:rPr>
+              <a:t>Link the Braccio++ Arm to your computer </a:t>
+            </a:r>
+            <a:endParaRPr lang="en-SG" sz="1200" b="1" i="0" dirty="0">
+              <a:solidFill>
+                <a:srgbClr val="000000"/>
+              </a:solidFill>
+              <a:effectLst/>
+              <a:latin typeface="Open Sans" panose="020B0606030504020204" pitchFamily="34" charset="0"/>
+            </a:endParaRPr>
+          </a:p>
+        </p:txBody>
+      </p:sp>
+    </p:spTree>
+    <p:extLst>
+      <p:ext uri="{BB962C8B-B14F-4D97-AF65-F5344CB8AC3E}">
+        <p14:creationId xmlns:p14="http://schemas.microsoft.com/office/powerpoint/2010/main" val="1670742667"/>
+      </p:ext>
+    </p:extLst>
+  </p:cSld>
+  <p:clrMapOvr>
+    <a:masterClrMapping/>
+  </p:clrMapOvr>
+</p:sld>
+</file>
+
+<file path=ppt/slides/slide6.xml><?xml version="1.0" encoding="utf-8"?>
+<p:sld xmlns:a="http://schemas.openxmlformats.org/drawingml/2006/main" xmlns:r="http://schemas.openxmlformats.org/officeDocument/2006/relationships" xmlns:p="http://schemas.openxmlformats.org/presentationml/2006/main">
+  <p:cSld>
+    <p:spTree>
+      <p:nvGrpSpPr>
+        <p:cNvPr id="1" name=""/>
+        <p:cNvGrpSpPr/>
+        <p:nvPr/>
+      </p:nvGrpSpPr>
+      <p:grpSpPr>
+        <a:xfrm>
+          <a:off x="0" y="0"/>
+          <a:ext cx="0" cy="0"/>
+          <a:chOff x="0" y="0"/>
+          <a:chExt cx="0" cy="0"/>
+        </a:xfrm>
+      </p:grpSpPr>
+      <p:pic>
+        <p:nvPicPr>
+          <p:cNvPr id="5" name="Picture 4" descr="A screen shot of a graph&#10;&#10;Description automatically generated">
+            <a:extLst>
+              <a:ext uri="{FF2B5EF4-FFF2-40B4-BE49-F238E27FC236}">
+                <a16:creationId xmlns:a16="http://schemas.microsoft.com/office/drawing/2014/main" id="{121F9FD9-930A-DCA5-B10C-123F213966A3}"/>
+              </a:ext>
+            </a:extLst>
+          </p:cNvPr>
+          <p:cNvPicPr>
+            <a:picLocks noChangeAspect="1"/>
+          </p:cNvPicPr>
+          <p:nvPr/>
+        </p:nvPicPr>
+        <p:blipFill>
+          <a:blip r:embed="rId2">
+            <a:extLst>
+              <a:ext uri="{28A0092B-C50C-407E-A947-70E740481C1C}">
+                <a14:useLocalDpi xmlns:a14="http://schemas.microsoft.com/office/drawing/2010/main" val="0"/>
+              </a:ext>
+            </a:extLst>
+          </a:blip>
+          <a:stretch>
+            <a:fillRect/>
+          </a:stretch>
+        </p:blipFill>
+        <p:spPr>
+          <a:xfrm>
+            <a:off x="1786119" y="614603"/>
+            <a:ext cx="2904762" cy="3857143"/>
+          </a:xfrm>
+          <a:prstGeom prst="rect">
+            <a:avLst/>
+          </a:prstGeom>
+        </p:spPr>
+      </p:pic>
+      <p:cxnSp>
+        <p:nvCxnSpPr>
+          <p:cNvPr id="6" name="Straight Arrow Connector 5">
+            <a:extLst>
+              <a:ext uri="{FF2B5EF4-FFF2-40B4-BE49-F238E27FC236}">
+                <a16:creationId xmlns:a16="http://schemas.microsoft.com/office/drawing/2014/main" id="{6D8950F6-D159-8767-8D4D-41C4D2D4A589}"/>
+              </a:ext>
+            </a:extLst>
+          </p:cNvPr>
+          <p:cNvCxnSpPr>
+            <a:cxnSpLocks/>
+          </p:cNvCxnSpPr>
+          <p:nvPr/>
+        </p:nvCxnSpPr>
+        <p:spPr>
+          <a:xfrm flipH="1">
+            <a:off x="2650289" y="4086225"/>
+            <a:ext cx="624020" cy="66734"/>
+          </a:xfrm>
+          <a:prstGeom prst="straightConnector1">
+            <a:avLst/>
+          </a:prstGeom>
+          <a:ln w="19050">
+            <a:solidFill>
+              <a:srgbClr val="FF0000"/>
+            </a:solidFill>
+            <a:tailEnd type="triangle"/>
+          </a:ln>
+        </p:spPr>
+        <p:style>
+          <a:lnRef idx="1">
+            <a:schemeClr val="accent1"/>
+          </a:lnRef>
+          <a:fillRef idx="0">
+            <a:schemeClr val="accent1"/>
+          </a:fillRef>
+          <a:effectRef idx="0">
+            <a:schemeClr val="accent1"/>
+          </a:effectRef>
+          <a:fontRef idx="minor">
+            <a:schemeClr val="tx1"/>
+          </a:fontRef>
+        </p:style>
+      </p:cxnSp>
+      <p:sp>
+        <p:nvSpPr>
+          <p:cNvPr id="7" name="Rectangle 6">
+            <a:extLst>
+              <a:ext uri="{FF2B5EF4-FFF2-40B4-BE49-F238E27FC236}">
+                <a16:creationId xmlns:a16="http://schemas.microsoft.com/office/drawing/2014/main" id="{B55A072C-50F2-F519-9CEC-65C633D9EB1F}"/>
+              </a:ext>
+            </a:extLst>
+          </p:cNvPr>
+          <p:cNvSpPr/>
+          <p:nvPr/>
+        </p:nvSpPr>
+        <p:spPr>
+          <a:xfrm>
+            <a:off x="1786119" y="3805598"/>
+            <a:ext cx="2976381" cy="694723"/>
+          </a:xfrm>
+          <a:prstGeom prst="rect">
+            <a:avLst/>
+          </a:prstGeom>
+          <a:noFill/>
+          <a:ln w="19050">
+            <a:solidFill>
+              <a:srgbClr val="FF0000"/>
+            </a:solidFill>
+            <a:prstDash val="sysDash"/>
+          </a:ln>
+        </p:spPr>
+        <p:style>
+          <a:lnRef idx="2">
+            <a:schemeClr val="accent6"/>
+          </a:lnRef>
+          <a:fillRef idx="1">
+            <a:schemeClr val="lt1"/>
+          </a:fillRef>
+          <a:effectRef idx="0">
+            <a:schemeClr val="accent6"/>
+          </a:effectRef>
+          <a:fontRef idx="minor">
+            <a:schemeClr val="dk1"/>
+          </a:fontRef>
+        </p:style>
+        <p:txBody>
+          <a:bodyPr rtlCol="0" anchor="ctr"/>
+          <a:lstStyle/>
+          <a:p>
+            <a:pPr algn="ctr"/>
+            <a:endParaRPr lang="en-SG" dirty="0"/>
+          </a:p>
+        </p:txBody>
+      </p:sp>
+    </p:spTree>
+    <p:extLst>
+      <p:ext uri="{BB962C8B-B14F-4D97-AF65-F5344CB8AC3E}">
+        <p14:creationId xmlns:p14="http://schemas.microsoft.com/office/powerpoint/2010/main" val="3295758729"/>
+      </p:ext>
+    </p:extLst>
+  </p:cSld>
+  <p:clrMapOvr>
+    <a:masterClrMapping/>
+  </p:clrMapOvr>
+</p:sld>
+</file>
+
 <file path=ppt/theme/theme1.xml><?xml version="1.0" encoding="utf-8"?>
 <a:theme xmlns:a="http://schemas.openxmlformats.org/drawingml/2006/main" name="Office Theme">
   <a:themeElements>

</xml_diff>

<commit_message>
Added the face and qrcode detector.
</commit_message>
<xml_diff>
--- a/doc/designDoc.pptx
+++ b/doc/designDoc.pptx
@@ -5,7 +5,7 @@
     <p:sldMasterId id="2147483648" r:id="rId1"/>
   </p:sldMasterIdLst>
   <p:notesMasterIdLst>
-    <p:notesMasterId r:id="rId11"/>
+    <p:notesMasterId r:id="rId12"/>
   </p:notesMasterIdLst>
   <p:sldIdLst>
     <p:sldId id="256" r:id="rId2"/>
@@ -15,8 +15,9 @@
     <p:sldId id="264" r:id="rId6"/>
     <p:sldId id="258" r:id="rId7"/>
     <p:sldId id="259" r:id="rId8"/>
-    <p:sldId id="260" r:id="rId9"/>
-    <p:sldId id="261" r:id="rId10"/>
+    <p:sldId id="265" r:id="rId9"/>
+    <p:sldId id="260" r:id="rId10"/>
+    <p:sldId id="261" r:id="rId11"/>
   </p:sldIdLst>
   <p:sldSz cx="12192000" cy="6858000"/>
   <p:notesSz cx="6858000" cy="9144000"/>
@@ -4517,6 +4518,167 @@
 </p:sld>
 </file>
 
+<file path=ppt/slides/slide10.xml><?xml version="1.0" encoding="utf-8"?>
+<p:sld xmlns:a="http://schemas.openxmlformats.org/drawingml/2006/main" xmlns:r="http://schemas.openxmlformats.org/officeDocument/2006/relationships" xmlns:p="http://schemas.openxmlformats.org/presentationml/2006/main">
+  <p:cSld>
+    <p:spTree>
+      <p:nvGrpSpPr>
+        <p:cNvPr id="1" name=""/>
+        <p:cNvGrpSpPr/>
+        <p:nvPr/>
+      </p:nvGrpSpPr>
+      <p:grpSpPr>
+        <a:xfrm>
+          <a:off x="0" y="0"/>
+          <a:ext cx="0" cy="0"/>
+          <a:chOff x="0" y="0"/>
+          <a:chExt cx="0" cy="0"/>
+        </a:xfrm>
+      </p:grpSpPr>
+      <p:pic>
+        <p:nvPicPr>
+          <p:cNvPr id="5" name="Picture 4" descr="A screen shot of a graph&#10;&#10;Description automatically generated">
+            <a:extLst>
+              <a:ext uri="{FF2B5EF4-FFF2-40B4-BE49-F238E27FC236}">
+                <a16:creationId xmlns:a16="http://schemas.microsoft.com/office/drawing/2014/main" id="{121F9FD9-930A-DCA5-B10C-123F213966A3}"/>
+              </a:ext>
+            </a:extLst>
+          </p:cNvPr>
+          <p:cNvPicPr>
+            <a:picLocks noChangeAspect="1"/>
+          </p:cNvPicPr>
+          <p:nvPr/>
+        </p:nvPicPr>
+        <p:blipFill>
+          <a:blip r:embed="rId2">
+            <a:extLst>
+              <a:ext uri="{28A0092B-C50C-407E-A947-70E740481C1C}">
+                <a14:useLocalDpi xmlns:a14="http://schemas.microsoft.com/office/drawing/2010/main" val="0"/>
+              </a:ext>
+            </a:extLst>
+          </a:blip>
+          <a:stretch>
+            <a:fillRect/>
+          </a:stretch>
+        </p:blipFill>
+        <p:spPr>
+          <a:xfrm>
+            <a:off x="1786119" y="614603"/>
+            <a:ext cx="2904762" cy="3857143"/>
+          </a:xfrm>
+          <a:prstGeom prst="rect">
+            <a:avLst/>
+          </a:prstGeom>
+        </p:spPr>
+      </p:pic>
+      <p:cxnSp>
+        <p:nvCxnSpPr>
+          <p:cNvPr id="6" name="Straight Arrow Connector 5">
+            <a:extLst>
+              <a:ext uri="{FF2B5EF4-FFF2-40B4-BE49-F238E27FC236}">
+                <a16:creationId xmlns:a16="http://schemas.microsoft.com/office/drawing/2014/main" id="{6D8950F6-D159-8767-8D4D-41C4D2D4A589}"/>
+              </a:ext>
+            </a:extLst>
+          </p:cNvPr>
+          <p:cNvCxnSpPr>
+            <a:cxnSpLocks/>
+          </p:cNvCxnSpPr>
+          <p:nvPr/>
+        </p:nvCxnSpPr>
+        <p:spPr>
+          <a:xfrm flipH="1">
+            <a:off x="2650289" y="4086225"/>
+            <a:ext cx="624020" cy="66734"/>
+          </a:xfrm>
+          <a:prstGeom prst="straightConnector1">
+            <a:avLst/>
+          </a:prstGeom>
+          <a:ln w="19050">
+            <a:solidFill>
+              <a:srgbClr val="FF0000"/>
+            </a:solidFill>
+            <a:tailEnd type="triangle"/>
+          </a:ln>
+        </p:spPr>
+        <p:style>
+          <a:lnRef idx="1">
+            <a:schemeClr val="accent1"/>
+          </a:lnRef>
+          <a:fillRef idx="0">
+            <a:schemeClr val="accent1"/>
+          </a:fillRef>
+          <a:effectRef idx="0">
+            <a:schemeClr val="accent1"/>
+          </a:effectRef>
+          <a:fontRef idx="minor">
+            <a:schemeClr val="tx1"/>
+          </a:fontRef>
+        </p:style>
+      </p:cxnSp>
+      <p:sp>
+        <p:nvSpPr>
+          <p:cNvPr id="7" name="Rectangle 6">
+            <a:extLst>
+              <a:ext uri="{FF2B5EF4-FFF2-40B4-BE49-F238E27FC236}">
+                <a16:creationId xmlns:a16="http://schemas.microsoft.com/office/drawing/2014/main" id="{B55A072C-50F2-F519-9CEC-65C633D9EB1F}"/>
+              </a:ext>
+            </a:extLst>
+          </p:cNvPr>
+          <p:cNvSpPr/>
+          <p:nvPr/>
+        </p:nvSpPr>
+        <p:spPr>
+          <a:xfrm>
+            <a:off x="1786119" y="3805598"/>
+            <a:ext cx="2976381" cy="694723"/>
+          </a:xfrm>
+          <a:prstGeom prst="rect">
+            <a:avLst/>
+          </a:prstGeom>
+          <a:noFill/>
+          <a:ln w="19050">
+            <a:solidFill>
+              <a:srgbClr val="FF0000"/>
+            </a:solidFill>
+            <a:prstDash val="sysDash"/>
+          </a:ln>
+        </p:spPr>
+        <p:style>
+          <a:lnRef idx="2">
+            <a:schemeClr val="accent6"/>
+          </a:lnRef>
+          <a:fillRef idx="1">
+            <a:schemeClr val="lt1"/>
+          </a:fillRef>
+          <a:effectRef idx="0">
+            <a:schemeClr val="accent6"/>
+          </a:effectRef>
+          <a:fontRef idx="minor">
+            <a:schemeClr val="dk1"/>
+          </a:fontRef>
+        </p:style>
+        <p:txBody>
+          <a:bodyPr rtlCol="0" anchor="ctr"/>
+          <a:lstStyle/>
+          <a:p>
+            <a:pPr algn="ctr"/>
+            <a:endParaRPr lang="en-SG" dirty="0"/>
+          </a:p>
+        </p:txBody>
+      </p:sp>
+    </p:spTree>
+    <p:extLst>
+      <p:ext uri="{BB962C8B-B14F-4D97-AF65-F5344CB8AC3E}">
+        <p14:creationId xmlns:p14="http://schemas.microsoft.com/office/powerpoint/2010/main" val="3295758729"/>
+      </p:ext>
+    </p:extLst>
+  </p:cSld>
+  <p:clrMapOvr>
+    <a:masterClrMapping/>
+  </p:clrMapOvr>
+</p:sld>
+</file>
+
 <file path=ppt/slides/slide2.xml><?xml version="1.0" encoding="utf-8"?>
 <p:sld xmlns:a="http://schemas.openxmlformats.org/drawingml/2006/main" xmlns:r="http://schemas.openxmlformats.org/officeDocument/2006/relationships" xmlns:p="http://schemas.openxmlformats.org/presentationml/2006/main">
   <p:cSld>
@@ -18571,10 +18733,10 @@
       </p:grpSpPr>
       <p:pic>
         <p:nvPicPr>
-          <p:cNvPr id="5" name="Picture 4">
-            <a:extLst>
-              <a:ext uri="{FF2B5EF4-FFF2-40B4-BE49-F238E27FC236}">
-                <a16:creationId xmlns:a16="http://schemas.microsoft.com/office/drawing/2014/main" id="{FE83BC66-A2DC-814F-6E20-2874E15B007F}"/>
+          <p:cNvPr id="5" name="Picture 4" descr="A screenshot of a computer&#10;&#10;Description automatically generated">
+            <a:extLst>
+              <a:ext uri="{FF2B5EF4-FFF2-40B4-BE49-F238E27FC236}">
+                <a16:creationId xmlns:a16="http://schemas.microsoft.com/office/drawing/2014/main" id="{FABC519A-0DD5-8CB0-5857-7B7600A39323}"/>
               </a:ext>
             </a:extLst>
           </p:cNvPr>
@@ -18584,57 +18746,133 @@
           <p:nvPr/>
         </p:nvPicPr>
         <p:blipFill>
-          <a:blip r:embed="rId2"/>
+          <a:blip r:embed="rId2">
+            <a:extLst>
+              <a:ext uri="{28A0092B-C50C-407E-A947-70E740481C1C}">
+                <a14:useLocalDpi xmlns:a14="http://schemas.microsoft.com/office/drawing/2010/main" val="0"/>
+              </a:ext>
+            </a:extLst>
+          </a:blip>
           <a:stretch>
             <a:fillRect/>
           </a:stretch>
         </p:blipFill>
         <p:spPr>
           <a:xfrm>
-            <a:off x="780698" y="1001485"/>
-            <a:ext cx="2618921" cy="4855029"/>
-          </a:xfrm>
-          <a:prstGeom prst="rect">
-            <a:avLst/>
-          </a:prstGeom>
+            <a:off x="2025285" y="1373184"/>
+            <a:ext cx="7664815" cy="4773616"/>
+          </a:xfrm>
+          <a:prstGeom prst="rect">
+            <a:avLst/>
+          </a:prstGeom>
+          <a:ln w="19050">
+            <a:solidFill>
+              <a:schemeClr val="tx1"/>
+            </a:solidFill>
+          </a:ln>
         </p:spPr>
       </p:pic>
-      <p:pic>
-        <p:nvPicPr>
-          <p:cNvPr id="7" name="Picture 6">
-            <a:extLst>
-              <a:ext uri="{FF2B5EF4-FFF2-40B4-BE49-F238E27FC236}">
-                <a16:creationId xmlns:a16="http://schemas.microsoft.com/office/drawing/2014/main" id="{A7AE5916-71B2-A1D3-5BA3-5A3C4D8160EA}"/>
-              </a:ext>
-            </a:extLst>
-          </p:cNvPr>
-          <p:cNvPicPr>
-            <a:picLocks noChangeAspect="1"/>
-          </p:cNvPicPr>
-          <p:nvPr/>
-        </p:nvPicPr>
-        <p:blipFill>
-          <a:blip r:embed="rId3"/>
-          <a:stretch>
-            <a:fillRect/>
-          </a:stretch>
-        </p:blipFill>
-        <p:spPr>
-          <a:xfrm>
-            <a:off x="3649001" y="1001485"/>
-            <a:ext cx="8584254" cy="4855029"/>
-          </a:xfrm>
-          <a:prstGeom prst="rect">
-            <a:avLst/>
-          </a:prstGeom>
-        </p:spPr>
-      </p:pic>
+      <p:sp>
+        <p:nvSpPr>
+          <p:cNvPr id="6" name="Rectangle 5">
+            <a:extLst>
+              <a:ext uri="{FF2B5EF4-FFF2-40B4-BE49-F238E27FC236}">
+                <a16:creationId xmlns:a16="http://schemas.microsoft.com/office/drawing/2014/main" id="{0C23E4D1-652C-2564-E07F-704D0CD83069}"/>
+              </a:ext>
+            </a:extLst>
+          </p:cNvPr>
+          <p:cNvSpPr/>
+          <p:nvPr/>
+        </p:nvSpPr>
+        <p:spPr>
+          <a:xfrm>
+            <a:off x="1920240" y="1298448"/>
+            <a:ext cx="4535424" cy="4526280"/>
+          </a:xfrm>
+          <a:prstGeom prst="rect">
+            <a:avLst/>
+          </a:prstGeom>
+          <a:noFill/>
+          <a:ln w="19050">
+            <a:solidFill>
+              <a:srgbClr val="7030A0"/>
+            </a:solidFill>
+            <a:prstDash val="sysDash"/>
+          </a:ln>
+        </p:spPr>
+        <p:style>
+          <a:lnRef idx="2">
+            <a:schemeClr val="accent6"/>
+          </a:lnRef>
+          <a:fillRef idx="1">
+            <a:schemeClr val="lt1"/>
+          </a:fillRef>
+          <a:effectRef idx="0">
+            <a:schemeClr val="accent6"/>
+          </a:effectRef>
+          <a:fontRef idx="minor">
+            <a:schemeClr val="dk1"/>
+          </a:fontRef>
+        </p:style>
+        <p:txBody>
+          <a:bodyPr rtlCol="0" anchor="ctr"/>
+          <a:lstStyle/>
+          <a:p>
+            <a:pPr algn="ctr"/>
+            <a:endParaRPr lang="en-SG" dirty="0"/>
+          </a:p>
+        </p:txBody>
+      </p:sp>
+      <p:cxnSp>
+        <p:nvCxnSpPr>
+          <p:cNvPr id="7" name="Straight Arrow Connector 6">
+            <a:extLst>
+              <a:ext uri="{FF2B5EF4-FFF2-40B4-BE49-F238E27FC236}">
+                <a16:creationId xmlns:a16="http://schemas.microsoft.com/office/drawing/2014/main" id="{29785052-1D63-010C-1645-F386CD5AC333}"/>
+              </a:ext>
+            </a:extLst>
+          </p:cNvPr>
+          <p:cNvCxnSpPr>
+            <a:cxnSpLocks/>
+          </p:cNvCxnSpPr>
+          <p:nvPr/>
+        </p:nvCxnSpPr>
+        <p:spPr>
+          <a:xfrm>
+            <a:off x="2350008" y="1133856"/>
+            <a:ext cx="0" cy="138604"/>
+          </a:xfrm>
+          <a:prstGeom prst="straightConnector1">
+            <a:avLst/>
+          </a:prstGeom>
+          <a:ln w="19050">
+            <a:solidFill>
+              <a:srgbClr val="7030A0"/>
+            </a:solidFill>
+            <a:tailEnd type="triangle"/>
+          </a:ln>
+        </p:spPr>
+        <p:style>
+          <a:lnRef idx="1">
+            <a:schemeClr val="accent1"/>
+          </a:lnRef>
+          <a:fillRef idx="0">
+            <a:schemeClr val="accent1"/>
+          </a:fillRef>
+          <a:effectRef idx="0">
+            <a:schemeClr val="accent1"/>
+          </a:effectRef>
+          <a:fontRef idx="minor">
+            <a:schemeClr val="tx1"/>
+          </a:fontRef>
+        </p:style>
+      </p:cxnSp>
       <p:sp>
         <p:nvSpPr>
           <p:cNvPr id="8" name="TextBox 7">
             <a:extLst>
               <a:ext uri="{FF2B5EF4-FFF2-40B4-BE49-F238E27FC236}">
-                <a16:creationId xmlns:a16="http://schemas.microsoft.com/office/drawing/2014/main" id="{B263592E-FB6E-9CC5-27DB-DFD6A85740F0}"/>
+                <a16:creationId xmlns:a16="http://schemas.microsoft.com/office/drawing/2014/main" id="{CDB21C70-A78F-61AF-68EC-D7FB4661AFB5}"/>
               </a:ext>
             </a:extLst>
           </p:cNvPr>
@@ -18643,8 +18881,8 @@
         </p:nvSpPr>
         <p:spPr>
           <a:xfrm>
-            <a:off x="1697779" y="4932068"/>
-            <a:ext cx="1388107" cy="400110"/>
+            <a:off x="1838754" y="916482"/>
+            <a:ext cx="2842974" cy="276999"/>
           </a:xfrm>
           <a:prstGeom prst="rect">
             <a:avLst/>
@@ -18658,19 +18896,129 @@
           <a:lstStyle/>
           <a:p>
             <a:r>
-              <a:rPr lang="en-US" sz="1000" b="1" dirty="0"/>
-              <a:t>Arm action playbook execution button</a:t>
-            </a:r>
-            <a:endParaRPr lang="en-SG" sz="1000" b="1" dirty="0"/>
-          </a:p>
-        </p:txBody>
-      </p:sp>
-      <p:sp>
-        <p:nvSpPr>
-          <p:cNvPr id="9" name="TextBox 8">
-            <a:extLst>
-              <a:ext uri="{FF2B5EF4-FFF2-40B4-BE49-F238E27FC236}">
-                <a16:creationId xmlns:a16="http://schemas.microsoft.com/office/drawing/2014/main" id="{86838FF3-8D65-7744-8962-8A118D0483AB}"/>
+              <a:rPr lang="en-US" sz="1200" b="1" dirty="0">
+                <a:solidFill>
+                  <a:srgbClr val="7030A0"/>
+                </a:solidFill>
+              </a:rPr>
+              <a:t>Robot Braccio Plus Arm controllers UI</a:t>
+            </a:r>
+            <a:endParaRPr lang="en-SG" sz="1200" b="1" dirty="0">
+              <a:solidFill>
+                <a:srgbClr val="7030A0"/>
+              </a:solidFill>
+            </a:endParaRPr>
+          </a:p>
+        </p:txBody>
+      </p:sp>
+      <p:sp>
+        <p:nvSpPr>
+          <p:cNvPr id="10" name="Rectangle 9">
+            <a:extLst>
+              <a:ext uri="{FF2B5EF4-FFF2-40B4-BE49-F238E27FC236}">
+                <a16:creationId xmlns:a16="http://schemas.microsoft.com/office/drawing/2014/main" id="{61FD834B-8166-9854-5F88-4B7D5BB5C46A}"/>
+              </a:ext>
+            </a:extLst>
+          </p:cNvPr>
+          <p:cNvSpPr/>
+          <p:nvPr/>
+        </p:nvSpPr>
+        <p:spPr>
+          <a:xfrm>
+            <a:off x="6560710" y="1272460"/>
+            <a:ext cx="3234436" cy="2558876"/>
+          </a:xfrm>
+          <a:prstGeom prst="rect">
+            <a:avLst/>
+          </a:prstGeom>
+          <a:noFill/>
+          <a:ln w="19050">
+            <a:solidFill>
+              <a:srgbClr val="7030A0"/>
+            </a:solidFill>
+            <a:prstDash val="sysDash"/>
+          </a:ln>
+        </p:spPr>
+        <p:style>
+          <a:lnRef idx="2">
+            <a:schemeClr val="accent6"/>
+          </a:lnRef>
+          <a:fillRef idx="1">
+            <a:schemeClr val="lt1"/>
+          </a:fillRef>
+          <a:effectRef idx="0">
+            <a:schemeClr val="accent6"/>
+          </a:effectRef>
+          <a:fontRef idx="minor">
+            <a:schemeClr val="dk1"/>
+          </a:fontRef>
+        </p:style>
+        <p:txBody>
+          <a:bodyPr rtlCol="0" anchor="ctr"/>
+          <a:lstStyle/>
+          <a:p>
+            <a:pPr algn="ctr"/>
+            <a:endParaRPr lang="en-SG" dirty="0"/>
+          </a:p>
+        </p:txBody>
+      </p:sp>
+      <p:sp>
+        <p:nvSpPr>
+          <p:cNvPr id="11" name="Rectangle 10">
+            <a:extLst>
+              <a:ext uri="{FF2B5EF4-FFF2-40B4-BE49-F238E27FC236}">
+                <a16:creationId xmlns:a16="http://schemas.microsoft.com/office/drawing/2014/main" id="{ED0AF360-854C-94EA-008B-36DC6E42CB84}"/>
+              </a:ext>
+            </a:extLst>
+          </p:cNvPr>
+          <p:cNvSpPr/>
+          <p:nvPr/>
+        </p:nvSpPr>
+        <p:spPr>
+          <a:xfrm>
+            <a:off x="6560709" y="3932060"/>
+            <a:ext cx="3214227" cy="2315464"/>
+          </a:xfrm>
+          <a:prstGeom prst="rect">
+            <a:avLst/>
+          </a:prstGeom>
+          <a:noFill/>
+          <a:ln w="19050">
+            <a:solidFill>
+              <a:srgbClr val="7030A0"/>
+            </a:solidFill>
+            <a:prstDash val="sysDash"/>
+          </a:ln>
+        </p:spPr>
+        <p:style>
+          <a:lnRef idx="2">
+            <a:schemeClr val="accent6"/>
+          </a:lnRef>
+          <a:fillRef idx="1">
+            <a:schemeClr val="lt1"/>
+          </a:fillRef>
+          <a:effectRef idx="0">
+            <a:schemeClr val="accent6"/>
+          </a:effectRef>
+          <a:fontRef idx="minor">
+            <a:schemeClr val="dk1"/>
+          </a:fontRef>
+        </p:style>
+        <p:txBody>
+          <a:bodyPr rtlCol="0" anchor="ctr"/>
+          <a:lstStyle/>
+          <a:p>
+            <a:pPr algn="ctr"/>
+            <a:endParaRPr lang="en-SG" dirty="0"/>
+          </a:p>
+        </p:txBody>
+      </p:sp>
+      <p:sp>
+        <p:nvSpPr>
+          <p:cNvPr id="12" name="TextBox 11">
+            <a:extLst>
+              <a:ext uri="{FF2B5EF4-FFF2-40B4-BE49-F238E27FC236}">
+                <a16:creationId xmlns:a16="http://schemas.microsoft.com/office/drawing/2014/main" id="{0E932BF5-0C8B-5CE8-7EB4-22164AAF2D3C}"/>
               </a:ext>
             </a:extLst>
           </p:cNvPr>
@@ -18679,8 +19027,8 @@
         </p:nvSpPr>
         <p:spPr>
           <a:xfrm>
-            <a:off x="780698" y="601374"/>
-            <a:ext cx="2305188" cy="276999"/>
+            <a:off x="6455664" y="848853"/>
+            <a:ext cx="2842974" cy="276999"/>
           </a:xfrm>
           <a:prstGeom prst="rect">
             <a:avLst/>
@@ -18694,24 +19042,71 @@
           <a:lstStyle/>
           <a:p>
             <a:r>
-              <a:rPr lang="en-SG" sz="1200" b="1" i="0" dirty="0">
+              <a:rPr lang="en-US" sz="1200" b="1" dirty="0">
                 <a:solidFill>
-                  <a:srgbClr val="000000"/>
+                  <a:srgbClr val="7030A0"/>
                 </a:solidFill>
-                <a:effectLst/>
-                <a:latin typeface="Open Sans" panose="020B0606030504020204" pitchFamily="34" charset="0"/>
               </a:rPr>
-              <a:t>Assemble Braccio++ Arm </a:t>
-            </a:r>
-          </a:p>
-        </p:txBody>
-      </p:sp>
-      <p:sp>
-        <p:nvSpPr>
-          <p:cNvPr id="10" name="TextBox 9">
-            <a:extLst>
-              <a:ext uri="{FF2B5EF4-FFF2-40B4-BE49-F238E27FC236}">
-                <a16:creationId xmlns:a16="http://schemas.microsoft.com/office/drawing/2014/main" id="{822F8D51-90D6-93A4-F7E8-F8F2C82F62D3}"/>
+              <a:t>Robot face / info-broadcast UI</a:t>
+            </a:r>
+            <a:endParaRPr lang="en-SG" sz="1200" b="1" dirty="0">
+              <a:solidFill>
+                <a:srgbClr val="7030A0"/>
+              </a:solidFill>
+            </a:endParaRPr>
+          </a:p>
+        </p:txBody>
+      </p:sp>
+      <p:cxnSp>
+        <p:nvCxnSpPr>
+          <p:cNvPr id="13" name="Straight Arrow Connector 12">
+            <a:extLst>
+              <a:ext uri="{FF2B5EF4-FFF2-40B4-BE49-F238E27FC236}">
+                <a16:creationId xmlns:a16="http://schemas.microsoft.com/office/drawing/2014/main" id="{D4F929FF-CEF3-2CCD-9CC3-1C57E1588801}"/>
+              </a:ext>
+            </a:extLst>
+          </p:cNvPr>
+          <p:cNvCxnSpPr>
+            <a:cxnSpLocks/>
+          </p:cNvCxnSpPr>
+          <p:nvPr/>
+        </p:nvCxnSpPr>
+        <p:spPr>
+          <a:xfrm>
+            <a:off x="7001256" y="1088077"/>
+            <a:ext cx="0" cy="138604"/>
+          </a:xfrm>
+          <a:prstGeom prst="straightConnector1">
+            <a:avLst/>
+          </a:prstGeom>
+          <a:ln w="19050">
+            <a:solidFill>
+              <a:srgbClr val="7030A0"/>
+            </a:solidFill>
+            <a:tailEnd type="triangle"/>
+          </a:ln>
+        </p:spPr>
+        <p:style>
+          <a:lnRef idx="1">
+            <a:schemeClr val="accent1"/>
+          </a:lnRef>
+          <a:fillRef idx="0">
+            <a:schemeClr val="accent1"/>
+          </a:fillRef>
+          <a:effectRef idx="0">
+            <a:schemeClr val="accent1"/>
+          </a:effectRef>
+          <a:fontRef idx="minor">
+            <a:schemeClr val="tx1"/>
+          </a:fontRef>
+        </p:style>
+      </p:cxnSp>
+      <p:sp>
+        <p:nvSpPr>
+          <p:cNvPr id="14" name="TextBox 13">
+            <a:extLst>
+              <a:ext uri="{FF2B5EF4-FFF2-40B4-BE49-F238E27FC236}">
+                <a16:creationId xmlns:a16="http://schemas.microsoft.com/office/drawing/2014/main" id="{029F27B0-2FBD-4EB0-9072-62961EDFC26C}"/>
               </a:ext>
             </a:extLst>
           </p:cNvPr>
@@ -18720,8 +19115,8 @@
         </p:nvSpPr>
         <p:spPr>
           <a:xfrm>
-            <a:off x="3649001" y="601374"/>
-            <a:ext cx="3524388" cy="276999"/>
+            <a:off x="4340352" y="6116049"/>
+            <a:ext cx="1621536" cy="276999"/>
           </a:xfrm>
           <a:prstGeom prst="rect">
             <a:avLst/>
@@ -18735,29 +19130,69 @@
           <a:lstStyle/>
           <a:p>
             <a:r>
-              <a:rPr lang="en-US" sz="1200" b="1" i="0" dirty="0">
+              <a:rPr lang="en-US" sz="1200" b="1" dirty="0">
                 <a:solidFill>
-                  <a:srgbClr val="000000"/>
+                  <a:srgbClr val="7030A0"/>
                 </a:solidFill>
-                <a:effectLst/>
-                <a:latin typeface="Open Sans" panose="020B0606030504020204" pitchFamily="34" charset="0"/>
               </a:rPr>
-              <a:t>Link the Braccio++ Arm to your computer </a:t>
-            </a:r>
-            <a:endParaRPr lang="en-SG" sz="1200" b="1" i="0" dirty="0">
+              <a:t>Robot eye/sense UI</a:t>
+            </a:r>
+            <a:endParaRPr lang="en-SG" sz="1200" b="1" dirty="0">
               <a:solidFill>
-                <a:srgbClr val="000000"/>
+                <a:srgbClr val="7030A0"/>
               </a:solidFill>
-              <a:effectLst/>
-              <a:latin typeface="Open Sans" panose="020B0606030504020204" pitchFamily="34" charset="0"/>
             </a:endParaRPr>
           </a:p>
         </p:txBody>
       </p:sp>
+      <p:cxnSp>
+        <p:nvCxnSpPr>
+          <p:cNvPr id="15" name="Straight Arrow Connector 14">
+            <a:extLst>
+              <a:ext uri="{FF2B5EF4-FFF2-40B4-BE49-F238E27FC236}">
+                <a16:creationId xmlns:a16="http://schemas.microsoft.com/office/drawing/2014/main" id="{3700D573-8B5B-A96F-1CD6-9E41F3C6CD42}"/>
+              </a:ext>
+            </a:extLst>
+          </p:cNvPr>
+          <p:cNvCxnSpPr>
+            <a:cxnSpLocks/>
+          </p:cNvCxnSpPr>
+          <p:nvPr/>
+        </p:nvCxnSpPr>
+        <p:spPr>
+          <a:xfrm>
+            <a:off x="5760720" y="6247524"/>
+            <a:ext cx="694944" cy="0"/>
+          </a:xfrm>
+          <a:prstGeom prst="straightConnector1">
+            <a:avLst/>
+          </a:prstGeom>
+          <a:ln w="19050">
+            <a:solidFill>
+              <a:srgbClr val="7030A0"/>
+            </a:solidFill>
+            <a:tailEnd type="triangle"/>
+          </a:ln>
+        </p:spPr>
+        <p:style>
+          <a:lnRef idx="1">
+            <a:schemeClr val="accent1"/>
+          </a:lnRef>
+          <a:fillRef idx="0">
+            <a:schemeClr val="accent1"/>
+          </a:fillRef>
+          <a:effectRef idx="0">
+            <a:schemeClr val="accent1"/>
+          </a:effectRef>
+          <a:fontRef idx="minor">
+            <a:schemeClr val="tx1"/>
+          </a:fontRef>
+        </p:style>
+      </p:cxnSp>
     </p:spTree>
     <p:extLst>
       <p:ext uri="{BB962C8B-B14F-4D97-AF65-F5344CB8AC3E}">
-        <p14:creationId xmlns:p14="http://schemas.microsoft.com/office/powerpoint/2010/main" val="1670742667"/>
+        <p14:creationId xmlns:p14="http://schemas.microsoft.com/office/powerpoint/2010/main" val="1262942452"/>
       </p:ext>
     </p:extLst>
   </p:cSld>
@@ -18786,10 +19221,10 @@
       </p:grpSpPr>
       <p:pic>
         <p:nvPicPr>
-          <p:cNvPr id="5" name="Picture 4" descr="A screen shot of a graph&#10;&#10;Description automatically generated">
-            <a:extLst>
-              <a:ext uri="{FF2B5EF4-FFF2-40B4-BE49-F238E27FC236}">
-                <a16:creationId xmlns:a16="http://schemas.microsoft.com/office/drawing/2014/main" id="{121F9FD9-930A-DCA5-B10C-123F213966A3}"/>
+          <p:cNvPr id="5" name="Picture 4">
+            <a:extLst>
+              <a:ext uri="{FF2B5EF4-FFF2-40B4-BE49-F238E27FC236}">
+                <a16:creationId xmlns:a16="http://schemas.microsoft.com/office/drawing/2014/main" id="{FE83BC66-A2DC-814F-6E20-2874E15B007F}"/>
               </a:ext>
             </a:extLst>
           </p:cNvPr>
@@ -18799,126 +19234,180 @@
           <p:nvPr/>
         </p:nvPicPr>
         <p:blipFill>
-          <a:blip r:embed="rId2">
-            <a:extLst>
-              <a:ext uri="{28A0092B-C50C-407E-A947-70E740481C1C}">
-                <a14:useLocalDpi xmlns:a14="http://schemas.microsoft.com/office/drawing/2010/main" val="0"/>
-              </a:ext>
-            </a:extLst>
-          </a:blip>
+          <a:blip r:embed="rId2"/>
           <a:stretch>
             <a:fillRect/>
           </a:stretch>
         </p:blipFill>
         <p:spPr>
           <a:xfrm>
-            <a:off x="1786119" y="614603"/>
-            <a:ext cx="2904762" cy="3857143"/>
+            <a:off x="780698" y="1001485"/>
+            <a:ext cx="2618921" cy="4855029"/>
           </a:xfrm>
           <a:prstGeom prst="rect">
             <a:avLst/>
           </a:prstGeom>
         </p:spPr>
       </p:pic>
-      <p:cxnSp>
-        <p:nvCxnSpPr>
-          <p:cNvPr id="6" name="Straight Arrow Connector 5">
-            <a:extLst>
-              <a:ext uri="{FF2B5EF4-FFF2-40B4-BE49-F238E27FC236}">
-                <a16:creationId xmlns:a16="http://schemas.microsoft.com/office/drawing/2014/main" id="{6D8950F6-D159-8767-8D4D-41C4D2D4A589}"/>
-              </a:ext>
-            </a:extLst>
-          </p:cNvPr>
-          <p:cNvCxnSpPr>
-            <a:cxnSpLocks/>
-          </p:cNvCxnSpPr>
-          <p:nvPr/>
-        </p:nvCxnSpPr>
-        <p:spPr>
-          <a:xfrm flipH="1">
-            <a:off x="2650289" y="4086225"/>
-            <a:ext cx="624020" cy="66734"/>
-          </a:xfrm>
-          <a:prstGeom prst="straightConnector1">
-            <a:avLst/>
-          </a:prstGeom>
-          <a:ln w="19050">
-            <a:solidFill>
-              <a:srgbClr val="FF0000"/>
-            </a:solidFill>
-            <a:tailEnd type="triangle"/>
-          </a:ln>
-        </p:spPr>
-        <p:style>
-          <a:lnRef idx="1">
-            <a:schemeClr val="accent1"/>
-          </a:lnRef>
-          <a:fillRef idx="0">
-            <a:schemeClr val="accent1"/>
-          </a:fillRef>
-          <a:effectRef idx="0">
-            <a:schemeClr val="accent1"/>
-          </a:effectRef>
-          <a:fontRef idx="minor">
-            <a:schemeClr val="tx1"/>
-          </a:fontRef>
-        </p:style>
-      </p:cxnSp>
-      <p:sp>
-        <p:nvSpPr>
-          <p:cNvPr id="7" name="Rectangle 6">
-            <a:extLst>
-              <a:ext uri="{FF2B5EF4-FFF2-40B4-BE49-F238E27FC236}">
-                <a16:creationId xmlns:a16="http://schemas.microsoft.com/office/drawing/2014/main" id="{B55A072C-50F2-F519-9CEC-65C633D9EB1F}"/>
-              </a:ext>
-            </a:extLst>
-          </p:cNvPr>
-          <p:cNvSpPr/>
-          <p:nvPr/>
-        </p:nvSpPr>
-        <p:spPr>
-          <a:xfrm>
-            <a:off x="1786119" y="3805598"/>
-            <a:ext cx="2976381" cy="694723"/>
+      <p:pic>
+        <p:nvPicPr>
+          <p:cNvPr id="7" name="Picture 6">
+            <a:extLst>
+              <a:ext uri="{FF2B5EF4-FFF2-40B4-BE49-F238E27FC236}">
+                <a16:creationId xmlns:a16="http://schemas.microsoft.com/office/drawing/2014/main" id="{A7AE5916-71B2-A1D3-5BA3-5A3C4D8160EA}"/>
+              </a:ext>
+            </a:extLst>
+          </p:cNvPr>
+          <p:cNvPicPr>
+            <a:picLocks noChangeAspect="1"/>
+          </p:cNvPicPr>
+          <p:nvPr/>
+        </p:nvPicPr>
+        <p:blipFill>
+          <a:blip r:embed="rId3"/>
+          <a:stretch>
+            <a:fillRect/>
+          </a:stretch>
+        </p:blipFill>
+        <p:spPr>
+          <a:xfrm>
+            <a:off x="3649001" y="1001485"/>
+            <a:ext cx="8584254" cy="4855029"/>
+          </a:xfrm>
+          <a:prstGeom prst="rect">
+            <a:avLst/>
+          </a:prstGeom>
+        </p:spPr>
+      </p:pic>
+      <p:sp>
+        <p:nvSpPr>
+          <p:cNvPr id="8" name="TextBox 7">
+            <a:extLst>
+              <a:ext uri="{FF2B5EF4-FFF2-40B4-BE49-F238E27FC236}">
+                <a16:creationId xmlns:a16="http://schemas.microsoft.com/office/drawing/2014/main" id="{B263592E-FB6E-9CC5-27DB-DFD6A85740F0}"/>
+              </a:ext>
+            </a:extLst>
+          </p:cNvPr>
+          <p:cNvSpPr txBox="1"/>
+          <p:nvPr/>
+        </p:nvSpPr>
+        <p:spPr>
+          <a:xfrm>
+            <a:off x="1697779" y="4932068"/>
+            <a:ext cx="1388107" cy="400110"/>
           </a:xfrm>
           <a:prstGeom prst="rect">
             <a:avLst/>
           </a:prstGeom>
           <a:noFill/>
-          <a:ln w="19050">
-            <a:solidFill>
-              <a:srgbClr val="FF0000"/>
-            </a:solidFill>
-            <a:prstDash val="sysDash"/>
-          </a:ln>
-        </p:spPr>
-        <p:style>
-          <a:lnRef idx="2">
-            <a:schemeClr val="accent6"/>
-          </a:lnRef>
-          <a:fillRef idx="1">
-            <a:schemeClr val="lt1"/>
-          </a:fillRef>
-          <a:effectRef idx="0">
-            <a:schemeClr val="accent6"/>
-          </a:effectRef>
-          <a:fontRef idx="minor">
-            <a:schemeClr val="dk1"/>
-          </a:fontRef>
-        </p:style>
-        <p:txBody>
-          <a:bodyPr rtlCol="0" anchor="ctr"/>
-          <a:lstStyle/>
-          <a:p>
-            <a:pPr algn="ctr"/>
-            <a:endParaRPr lang="en-SG" dirty="0"/>
+        </p:spPr>
+        <p:txBody>
+          <a:bodyPr wrap="square" rtlCol="0">
+            <a:spAutoFit/>
+          </a:bodyPr>
+          <a:lstStyle/>
+          <a:p>
+            <a:r>
+              <a:rPr lang="en-US" sz="1000" b="1" dirty="0"/>
+              <a:t>Arm action playbook execution button</a:t>
+            </a:r>
+            <a:endParaRPr lang="en-SG" sz="1000" b="1" dirty="0"/>
+          </a:p>
+        </p:txBody>
+      </p:sp>
+      <p:sp>
+        <p:nvSpPr>
+          <p:cNvPr id="9" name="TextBox 8">
+            <a:extLst>
+              <a:ext uri="{FF2B5EF4-FFF2-40B4-BE49-F238E27FC236}">
+                <a16:creationId xmlns:a16="http://schemas.microsoft.com/office/drawing/2014/main" id="{86838FF3-8D65-7744-8962-8A118D0483AB}"/>
+              </a:ext>
+            </a:extLst>
+          </p:cNvPr>
+          <p:cNvSpPr txBox="1"/>
+          <p:nvPr/>
+        </p:nvSpPr>
+        <p:spPr>
+          <a:xfrm>
+            <a:off x="780698" y="601374"/>
+            <a:ext cx="2305188" cy="276999"/>
+          </a:xfrm>
+          <a:prstGeom prst="rect">
+            <a:avLst/>
+          </a:prstGeom>
+          <a:noFill/>
+        </p:spPr>
+        <p:txBody>
+          <a:bodyPr wrap="square" rtlCol="0">
+            <a:spAutoFit/>
+          </a:bodyPr>
+          <a:lstStyle/>
+          <a:p>
+            <a:r>
+              <a:rPr lang="en-SG" sz="1200" b="1" i="0" dirty="0">
+                <a:solidFill>
+                  <a:srgbClr val="000000"/>
+                </a:solidFill>
+                <a:effectLst/>
+                <a:latin typeface="Open Sans" panose="020B0606030504020204" pitchFamily="34" charset="0"/>
+              </a:rPr>
+              <a:t>Assemble Braccio++ Arm </a:t>
+            </a:r>
+          </a:p>
+        </p:txBody>
+      </p:sp>
+      <p:sp>
+        <p:nvSpPr>
+          <p:cNvPr id="10" name="TextBox 9">
+            <a:extLst>
+              <a:ext uri="{FF2B5EF4-FFF2-40B4-BE49-F238E27FC236}">
+                <a16:creationId xmlns:a16="http://schemas.microsoft.com/office/drawing/2014/main" id="{822F8D51-90D6-93A4-F7E8-F8F2C82F62D3}"/>
+              </a:ext>
+            </a:extLst>
+          </p:cNvPr>
+          <p:cNvSpPr txBox="1"/>
+          <p:nvPr/>
+        </p:nvSpPr>
+        <p:spPr>
+          <a:xfrm>
+            <a:off x="3649001" y="601374"/>
+            <a:ext cx="3524388" cy="276999"/>
+          </a:xfrm>
+          <a:prstGeom prst="rect">
+            <a:avLst/>
+          </a:prstGeom>
+          <a:noFill/>
+        </p:spPr>
+        <p:txBody>
+          <a:bodyPr wrap="square" rtlCol="0">
+            <a:spAutoFit/>
+          </a:bodyPr>
+          <a:lstStyle/>
+          <a:p>
+            <a:r>
+              <a:rPr lang="en-US" sz="1200" b="1" i="0" dirty="0">
+                <a:solidFill>
+                  <a:srgbClr val="000000"/>
+                </a:solidFill>
+                <a:effectLst/>
+                <a:latin typeface="Open Sans" panose="020B0606030504020204" pitchFamily="34" charset="0"/>
+              </a:rPr>
+              <a:t>Link the Braccio++ Arm to your computer </a:t>
+            </a:r>
+            <a:endParaRPr lang="en-SG" sz="1200" b="1" i="0" dirty="0">
+              <a:solidFill>
+                <a:srgbClr val="000000"/>
+              </a:solidFill>
+              <a:effectLst/>
+              <a:latin typeface="Open Sans" panose="020B0606030504020204" pitchFamily="34" charset="0"/>
+            </a:endParaRPr>
           </a:p>
         </p:txBody>
       </p:sp>
     </p:spTree>
     <p:extLst>
       <p:ext uri="{BB962C8B-B14F-4D97-AF65-F5344CB8AC3E}">
-        <p14:creationId xmlns:p14="http://schemas.microsoft.com/office/powerpoint/2010/main" val="3295758729"/>
+        <p14:creationId xmlns:p14="http://schemas.microsoft.com/office/powerpoint/2010/main" val="1670742667"/>
       </p:ext>
     </p:extLst>
   </p:cSld>

</xml_diff>